<commit_message>
Updated demo content and scripts
</commit_message>
<xml_diff>
--- a/docs/Serverless Orchestration with Durable Functions.pptx
+++ b/docs/Serverless Orchestration with Durable Functions.pptx
@@ -35,11 +35,11 @@
     <p:sldId id="1654" r:id="rId26"/>
     <p:sldId id="363" r:id="rId27"/>
     <p:sldId id="1635" r:id="rId28"/>
-    <p:sldId id="1636" r:id="rId29"/>
-    <p:sldId id="1637" r:id="rId30"/>
-    <p:sldId id="366" r:id="rId31"/>
-    <p:sldId id="362" r:id="rId32"/>
-    <p:sldId id="1639" r:id="rId33"/>
+    <p:sldId id="1639" r:id="rId29"/>
+    <p:sldId id="1636" r:id="rId30"/>
+    <p:sldId id="1637" r:id="rId31"/>
+    <p:sldId id="366" r:id="rId32"/>
+    <p:sldId id="362" r:id="rId33"/>
     <p:sldId id="1638" r:id="rId34"/>
     <p:sldId id="273" r:id="rId35"/>
     <p:sldId id="1650" r:id="rId36"/>
@@ -186,6 +186,7 @@
             <p14:sldId id="1654"/>
             <p14:sldId id="363"/>
             <p14:sldId id="1635"/>
+            <p14:sldId id="1639"/>
             <p14:sldId id="1636"/>
             <p14:sldId id="1637"/>
             <p14:sldId id="366"/>
@@ -194,7 +195,6 @@
         <p14:section name="Demo 1a" id="{0D19CC27-1A1D-43A9-832E-5BAD8D2A1B4F}">
           <p14:sldIdLst>
             <p14:sldId id="362"/>
-            <p14:sldId id="1639"/>
           </p14:sldIdLst>
         </p14:section>
         <p14:section name="Demo 1b - Looking behind the curtain" id="{770D1424-9CF9-47B4-8AAA-BF9F74F52615}">
@@ -251,7 +251,28 @@
     <pc:chgData name="Callon Campbell" userId="c0fd8b2c1dc026c3" providerId="LiveId" clId="{58AA0A0C-21B3-4E8C-8DB6-122F01C8166D}"/>
   </pc:docChgLst>
   <pc:docChgLst>
-    <pc:chgData name="Callon Campbell" userId="c0fd8b2c1dc026c3" providerId="LiveId" clId="{DE851591-31E6-4535-B49A-64561468A233}"/>
+    <pc:chgData name="Callon Campbell" userId="c0fd8b2c1dc026c3" providerId="LiveId" clId="{5A5E49AA-F409-4D3E-967B-AFD0CBAF23D1}"/>
+    <pc:docChg chg="modSld">
+      <pc:chgData name="Callon Campbell" userId="c0fd8b2c1dc026c3" providerId="LiveId" clId="{5A5E49AA-F409-4D3E-967B-AFD0CBAF23D1}" dt="2019-03-29T04:30:32.763" v="0" actId="207"/>
+      <pc:docMkLst>
+        <pc:docMk/>
+      </pc:docMkLst>
+      <pc:sldChg chg="modSp">
+        <pc:chgData name="Callon Campbell" userId="c0fd8b2c1dc026c3" providerId="LiveId" clId="{5A5E49AA-F409-4D3E-967B-AFD0CBAF23D1}" dt="2019-03-29T04:30:32.763" v="0" actId="207"/>
+        <pc:sldMkLst>
+          <pc:docMk/>
+          <pc:sldMk cId="3674603976" sldId="256"/>
+        </pc:sldMkLst>
+        <pc:spChg chg="mod">
+          <ac:chgData name="Callon Campbell" userId="c0fd8b2c1dc026c3" providerId="LiveId" clId="{5A5E49AA-F409-4D3E-967B-AFD0CBAF23D1}" dt="2019-03-29T04:30:32.763" v="0" actId="207"/>
+          <ac:spMkLst>
+            <pc:docMk/>
+            <pc:sldMk cId="3674603976" sldId="256"/>
+            <ac:spMk id="2" creationId="{00000000-0000-0000-0000-000000000000}"/>
+          </ac:spMkLst>
+        </pc:spChg>
+      </pc:sldChg>
+    </pc:docChg>
   </pc:docChgLst>
   <pc:docChgLst>
     <pc:chgData name="Callon Campbell" userId="c0fd8b2c1dc026c3" providerId="LiveId" clId="{FA73BD0D-4098-4852-B2DE-5FFB0D1B488E}"/>
@@ -2688,28 +2709,7 @@
     </pc:docChg>
   </pc:docChgLst>
   <pc:docChgLst>
-    <pc:chgData name="Callon Campbell" userId="c0fd8b2c1dc026c3" providerId="LiveId" clId="{5A5E49AA-F409-4D3E-967B-AFD0CBAF23D1}"/>
-    <pc:docChg chg="modSld">
-      <pc:chgData name="Callon Campbell" userId="c0fd8b2c1dc026c3" providerId="LiveId" clId="{5A5E49AA-F409-4D3E-967B-AFD0CBAF23D1}" dt="2019-03-29T04:30:32.763" v="0" actId="207"/>
-      <pc:docMkLst>
-        <pc:docMk/>
-      </pc:docMkLst>
-      <pc:sldChg chg="modSp">
-        <pc:chgData name="Callon Campbell" userId="c0fd8b2c1dc026c3" providerId="LiveId" clId="{5A5E49AA-F409-4D3E-967B-AFD0CBAF23D1}" dt="2019-03-29T04:30:32.763" v="0" actId="207"/>
-        <pc:sldMkLst>
-          <pc:docMk/>
-          <pc:sldMk cId="3674603976" sldId="256"/>
-        </pc:sldMkLst>
-        <pc:spChg chg="mod">
-          <ac:chgData name="Callon Campbell" userId="c0fd8b2c1dc026c3" providerId="LiveId" clId="{5A5E49AA-F409-4D3E-967B-AFD0CBAF23D1}" dt="2019-03-29T04:30:32.763" v="0" actId="207"/>
-          <ac:spMkLst>
-            <pc:docMk/>
-            <pc:sldMk cId="3674603976" sldId="256"/>
-            <ac:spMk id="2" creationId="{00000000-0000-0000-0000-000000000000}"/>
-          </ac:spMkLst>
-        </pc:spChg>
-      </pc:sldChg>
-    </pc:docChg>
+    <pc:chgData name="Callon Campbell" userId="c0fd8b2c1dc026c3" providerId="LiveId" clId="{DE851591-31E6-4535-B49A-64561468A233}"/>
   </pc:docChgLst>
   <pc:docChgLst>
     <pc:chgData name="Callon Campbell" userId="c0fd8b2c1dc026c3" providerId="LiveId" clId="{E84175E7-23D0-4D10-A144-C0ACC55D06ED}"/>
@@ -2775,7 +2775,7 @@
     </inkml:brush>
   </inkml:definitions>
   <inkml:trace contextRef="#ctx0" brushRef="#br0">51 349 992,'-7'-3'129,"0"0"0,0 0 0,1-1 0,-1 0-1,1-1 1,-3-1-129,7 4 1222,2 2-188,16-8 1958,-3 5-2574,6 0 88,0 0 0,0 1 0,11 0-506,292 14 725,197-30 581,-304 8-948,658 9-470,-541 4 242,128 5 167,-198-3-9,26-12-288,-236 3-1686,0-3-1,50-14 1687,-33 6-2424,-23 7-840</inkml:trace>
-  <inkml:trace contextRef="#ctx0" brushRef="#br0" timeOffset="661.35">3922 28 3232,'-15'-5'224,"1"0"0,-1 0 0,0 1 0,0 1 0,-1 1 0,1 0 0,-7 1-224,-8 2 420,1 1 0,0 2 1,0 1-1,0 1 0,-26 10-420,52-15 13,1 0-1,-1 0 0,1 0 1,-1 0-1,1 1 1,0-1-1,-1 1 0,1-1 1,0 1-1,0 0 1,0 0-1,0 0 0,0 1-12,1-2 13,1 0 0,-1 0-1,1 0 1,-1-1-1,1 1 1,0 0 0,-1 0-1,1 0 1,0 0-1,0 0 1,0 0 0,0 0-1,0 0 1,0 0-1,0 0 1,0 0 0,0 0-1,0 0 1,1 0-1,-1 0 1,0 0 0,1 0-1,-1 0 1,0 0-1,1 0 1,-1-1 0,1 1-1,0 0 1,-1 0-1,1 0 1,0-1 0,-1 1-1,1 0 1,0-1-1,0 1 1,-1-1 0,1 1-1,0-1-12,4 3 51,0 0 1,0-1-1,0 1 0,0-1 0,0-1 1,1 1-1,2 0-51,12 4 105,109 34 338,-71-25-331,-2 4 0,0 1 0,32 19-112,120 68-70,-196-101 79,-1 1 0,1 1 1,-1 0-1,0 0 0,-1 1 0,0 0 0,-1 1 0,1 0-9,-8-7 18,1 0 0,-1 0 0,0 0 1,0 0-1,0 0 0,0 1 0,0-1 0,-1 1 1,1-1-1,-1 1 0,0-1 0,0 1 1,-1 0-1,1 0 0,-1-1 0,1 1 0,-1 0 1,0 0-1,-1-1 0,1 1 0,-1 0 0,1 0 1,-1-1-1,0 1 0,-1-1 0,1 1 0,-1-1 1,1 1-1,-1-1 0,0 1-18,-6 6 68,0 0 0,0-1 0,-1 0 0,0 0 0,-1-1 0,0 0 0,0-1 0,-1 0 1,1 0-1,-2-1 0,-2 1-68,-26 10 124,-1-1 0,-27 5-124,16-5 64,-117 36-549,85-25 144</inkml:trace>
+  <inkml:trace contextRef="#ctx0" brushRef="#br0" timeOffset="661.349">3922 28 3232,'-15'-5'224,"1"0"0,-1 0 0,0 1 0,0 1 0,-1 1 0,1 0 0,-7 1-224,-8 2 420,1 1 0,0 2 1,0 1-1,0 1 0,-26 10-420,52-15 13,1 0-1,-1 0 0,1 0 1,-1 0-1,1 1 1,0-1-1,-1 1 0,1-1 1,0 1-1,0 0 1,0 0-1,0 0 0,0 1-12,1-2 13,1 0 0,-1 0-1,1 0 1,-1-1-1,1 1 1,0 0 0,-1 0-1,1 0 1,0 0-1,0 0 1,0 0 0,0 0-1,0 0 1,0 0-1,0 0 1,0 0 0,0 0-1,0 0 1,1 0-1,-1 0 1,0 0 0,1 0-1,-1 0 1,0 0-1,1 0 1,-1-1 0,1 1-1,0 0 1,-1 0-1,1 0 1,0-1 0,-1 1-1,1 0 1,0-1-1,0 1 1,-1-1 0,1 1-1,0-1-12,4 3 51,0 0 1,0-1-1,0 1 0,0-1 0,0-1 1,1 1-1,2 0-51,12 4 105,109 34 338,-71-25-331,-2 4 0,0 1 0,32 19-112,120 68-70,-196-101 79,-1 1 0,1 1 1,-1 0-1,0 0 0,-1 1 0,0 0 0,-1 1 0,1 0-9,-8-7 18,1 0 0,-1 0 0,0 0 1,0 0-1,0 0 0,0 1 0,0-1 0,-1 1 1,1-1-1,-1 1 0,0-1 0,0 1 1,-1 0-1,1 0 0,-1-1 0,1 1 0,-1 0 1,0 0-1,-1-1 0,1 1 0,-1 0 0,1 0 1,-1-1-1,0 1 0,-1-1 0,1 1 0,-1-1 1,1 1-1,-1-1 0,0 1-18,-6 6 68,0 0 0,0-1 0,-1 0 0,0 0 0,-1-1 0,0 0 0,0-1 0,-1 0 1,1 0-1,-2-1 0,-2 1-68,-26 10 124,-1-1 0,-27 5-124,16-5 64,-117 36-549,85-25 144</inkml:trace>
 </inkml:ink>
 </file>
 
@@ -2863,7 +2863,7 @@
     </inkml:brush>
   </inkml:definitions>
   <inkml:trace contextRef="#ctx0" brushRef="#br0">11107 4703 6240,'-1'-1'169,"0"-1"-1,1 1 1,0 0 0,-1-1-1,1 1 1,0 0 0,0-1-1,0 1 1,0 0 0,0-1 0,0 1-1,0-2-168,1 2 63,-1 1-1,1-1 0,-1 0 0,1 1 1,0-1-1,-1 1 0,1-1 0,0 1 0,0-1 1,0 1-1,-1-1 0,1 1 0,0 0 1,0-1-1,0 1 0,0 0 0,0 0-62,0 0-13,-1-1 1,1 1-1,-1 0 0,1 0 0,-1 0 0,1 0 0,-1 0 0,1 0 0,0 0 0,-1 0 0,1 0 0,-1 0 0,1 0 0,-1 0 0,1 0 1,-1 1-1,1-1 0,-1 0 0,1 0 0,-1 1 0,1-1 0,-1 0 0,1 1 0,-1-1 0,0 0 0,1 1 0,-1-1 0,1 0 0,-1 1 1,0-1-1,1 1 0,-1-1 13,7 18-144,-5-11 579,-1-4-208,0 0 0,-1 0 0,0 1 0,1-1 0,-1 0 0,0 0 0,0 0 0,0 1 0,-1 2-227,0 7 389,4 39-267,-1-36-149,-1 0 1,-1 1-1,0 7 27,-4 4 140,0 0 0,-2 0 0,0 0 0,-2-1 0,-2 0 0,0 0 0,-1-1 0,-11 16-140,-43 87 106,-6 32-106,23-49 14,-5-3 0,-12 11-14,-20 8 860,-87 99-860,134-179 57,-103 126 108,74-90-173,-4-3-1,-15 9 9,-165 140-41,131-132 302,-4-7 0,-52 26-261,-272 136 555,191-124-480,186-97-49,-1-3 1,-43 10-27,-155 35 70,203-56-65,-131 27 556,-151 14-561,-206 0 425,280-45-376,-82-15-49,129-1 106,-94-6-79,204 2 145,-107-19-172,-114-36 252,227 39-213,109 22-38,-447-89 213,5-26 323,346 81-104,-63-32-433,-90-53 251,189 88-188,-51-19-108,-104-28 45,55 21-14,48 14 106,-168-64 275,87 35-408,-6-2-31,154 54 67,2-2 0,1-2 0,-7-7 5,-134-92 752,-97-89-752,179 130 293,-74-43-293,130 94 37,2-2 0,1-2-1,2-2 1,1-2-1,2-2 1,2-1-1,-20-31-36,-151-250 259,68 98-123,38 77-18,42 63-73,4-2 0,-32-68-45,4-35 123,-21-88-123,103 271 5,-20-63 3,3 0-1,3-2 1,2-9-8,-25-219 66,34 242-38,-5-74-45,6 0-1,6-1 0,14-97 18,-7 137 25,17-131-45,-21 197 19,6-41-27,3 0 0,4 1 0,2-1 28,23-40 38,5 1 0,6 1-38,30-70-7,-26 46-92,133-276 188,-97 242-79,40-70-122,-109 188 102,67-121-121,-70 134 103,1 0 1,2 1-1,20-20 28,-16 23 45,3 2-1,0 0 1,1 2-1,3 1-44,139-83-23,-92 59 162,51-40-139,-73 41-123,-9 8-3365,17-9 3488,-62 43-1000,3-1-2292,-9 6 3222,0 0 0,0 0 0,0 0 0,0-1 0,1 1 1,-1 0-1,0 0 0,0 0 0,0 0 0,0 0 0,0 0 1,1 0-1,-1 0 0,0 0 0,0 0 0,0 0 0,0 0 1,0 0-1,1 0 0,-1 0 0,0 0 0,0 0 0,0 0 1,0 0-1,1 0 0,-1 0 0,0 0 0,0 1 0,0-1 1,0 0-1,0 0 0,0 0 0,1 0 0,-1 0 1,0 0-1,0 0 0,0 1 0,0-1 0,0 0 0,0 0 1,0 0-1,0 0 0,0 0 0,0 1 70,-1 14-5189</inkml:trace>
-  <inkml:trace contextRef="#ctx0" brushRef="#br0" timeOffset="714.844">1017 144 5216,'-6'-11'1075,"8"8"-249,-2 3-805,0 0 0,0 0 0,0 0 0,1 0 0,-1 0-1,0 0 1,0 0 0,0 0 0,0 0 0,1 0 0,-1 0 0,0 0-1,0 0 1,0 0 0,0 0 0,0-1 0,1 1 0,-1 0 0,0 0-1,0 0 1,0 0 0,0 0 0,0 0 0,0-1 0,0 1 0,0 0 0,0 0-1,1 0 1,-1 0 0,0-1 0,0 1 0,0 0 0,0 0 0,0 0-1,0 0 1,0-1 0,0 1 0,0 0 0,0 0 0,0 0-21,14 6 421,-3-4-253,0 0 0,0 0 0,0-1 0,0-1 0,0 0 0,0 0 0,0-1 0,10-3-168,8 1 208,55-8 112,-1-4 0,33-12-320,-10 2 315,14 3-315,-51 11 16,-34 4 3,1 1-1,-1 3 1,1 0-1,-1 2 1,1 2 0,3 1-19,-33-1-6,1 1 1,0-1 0,0 1-1,0 0 1,-1 1 0,1-1-1,-1 1 1,0 1 0,0-1-1,1 2 6,-5-4-1,1 1 1,-1 0-1,0 0 0,0 0 0,0 1 0,0-1 0,0 0 0,0 1 0,-1 0 0,1-1 1,-1 1-1,0 0 0,0-1 0,0 1 0,0 0 0,0 0 0,-1 0 0,1 0 0,-1 0 1,0 0-1,0 0 0,0 0 0,0 0 0,-1 3 1,-18 116 466,4-30-200,3-1-1,1 74-265,10-67-806,0 67-4393,2-157 4382,0 0 0,1 0-1,0 0 1,1 5 817</inkml:trace>
+  <inkml:trace contextRef="#ctx0" brushRef="#br0" timeOffset="714.843">1017 144 5216,'-6'-11'1075,"8"8"-249,-2 3-805,0 0 0,0 0 0,0 0 0,1 0 0,-1 0-1,0 0 1,0 0 0,0 0 0,0 0 0,1 0 0,-1 0 0,0 0-1,0 0 1,0 0 0,0 0 0,0-1 0,1 1 0,-1 0 0,0 0-1,0 0 1,0 0 0,0 0 0,0 0 0,0-1 0,0 1 0,0 0 0,0 0-1,1 0 1,-1 0 0,0-1 0,0 1 0,0 0 0,0 0 0,0 0-1,0 0 1,0-1 0,0 1 0,0 0 0,0 0 0,0 0-21,14 6 421,-3-4-253,0 0 0,0 0 0,0-1 0,0-1 0,0 0 0,0 0 0,0-1 0,10-3-168,8 1 208,55-8 112,-1-4 0,33-12-320,-10 2 315,14 3-315,-51 11 16,-34 4 3,1 1-1,-1 3 1,1 0-1,-1 2 1,1 2 0,3 1-19,-33-1-6,1 1 1,0-1 0,0 1-1,0 0 1,-1 1 0,1-1-1,-1 1 1,0 1 0,0-1-1,1 2 6,-5-4-1,1 1 1,-1 0-1,0 0 0,0 0 0,0 1 0,0-1 0,0 0 0,0 1 0,-1 0 0,1-1 1,-1 1-1,0 0 0,0-1 0,0 1 0,0 0 0,0 0 0,-1 0 0,1 0 0,-1 0 1,0 0-1,0 0 0,0 0 0,0 0 0,-1 3 1,-18 116 466,4-30-200,3-1-1,1 74-265,10-67-806,0 67-4393,2-157 4382,0 0 0,1 0-1,0 0 1,1 5 817</inkml:trace>
 </inkml:ink>
 </file>
 
@@ -2950,7 +2950,7 @@
     </inkml:brush>
   </inkml:definitions>
   <inkml:trace contextRef="#ctx0" brushRef="#br0">123 427 5824,'-101'-40'2602,"100"40"-2558,-1-1 0,1 1 0,-1-1-1,1 0 1,0 1 0,-1-1 0,1 0-1,0 0 1,0 0 0,0 0 0,-1 0-1,1 0 1,0 0 0,0 0 0,1 0-1,-1 0 1,0-1-44,1 1 9,0 1 0,0-1 0,0 0-1,0 1 1,0-1 0,0 0 0,0 1-1,0-1 1,1 1 0,-1-1 0,0 0 0,0 1-1,1-1 1,-1 1 0,1-1 0,-1 1-1,0-1 1,1 1 0,-1-1 0,1 1 0,-1-1-1,1 1 1,-1 0 0,1-1 0,-1 1-1,1 0 1,0-1 0,-1 1 0,1 0-1,-1 0 1,1-1 0,0 1 0,-1 0 0,1 0-1,0 0 1,-1 0 0,1 0 0,0 0-9,19-6 115,1 0 172,1 0 0,0 1 0,12 0-287,255-27 1157,270-20-53,-182 28-719,38-2-183,-284 25-45,0 4 0,10 8-157,32 10-5696,-130-16 3504,0-1-970</inkml:trace>
-  <inkml:trace contextRef="#ctx0" brushRef="#br0" timeOffset="434.963">2293 48 3488,'-10'-12'402,"8"9"-313,0 0-1,-1 1 1,1-1 0,0 1 0,-1 0 0,0 0 0,1 0 0,-1 0 0,0 0 0,0 1-1,0-1 1,0 1 0,-1-1-89,-4-2 1428,13 2-679,18 4-286,-14 2-413,-1 1 0,0-1-1,0 1 1,0 1 0,-1-1 0,1 1-1,-1 1 1,-1-1 0,4 5-50,22 19 32,-13-14-31,3 1-4,-1 1 0,-1 1 0,0 1 0,9 14 3,-26-30 59,-1-1 0,0 1-1,0-1 1,0 1 0,0 0-1,0 0 1,-1 0 0,0 0-1,0 0 1,0 0 0,0 0-1,-1 0 1,1 1 0,-1-1-1,0 0 1,0 0 0,-1 0-1,1 1 1,-1-1 0,0 0-1,0 0 1,-1 0 0,1 0-1,-1 0 1,0 0 0,0-1-1,0 1 1,0-1 0,-1 1-1,1-1 1,-4 3-59,-25 25 431,-3-2 0,0-1 0,-24 13-431,26-18-66,-17 12-590,-8 2 160</inkml:trace>
+  <inkml:trace contextRef="#ctx0" brushRef="#br0" timeOffset="434.962">2293 48 3488,'-10'-12'402,"8"9"-313,0 0-1,-1 1 1,1-1 0,0 1 0,-1 0 0,0 0 0,1 0 0,-1 0 0,0 0 0,0 1-1,0-1 1,0 1 0,-1-1-89,-4-2 1428,13 2-679,18 4-286,-14 2-413,-1 1 0,0-1-1,0 1 1,0 1 0,-1-1 0,1 1-1,-1 1 1,-1-1 0,4 5-50,22 19 32,-13-14-31,3 1-4,-1 1 0,-1 1 0,0 1 0,9 14 3,-26-30 59,-1-1 0,0 1-1,0-1 1,0 1 0,0 0-1,0 0 1,-1 0 0,0 0-1,0 0 1,0 0 0,0 0-1,-1 0 1,1 1 0,-1-1-1,0 0 1,0 0 0,-1 0-1,1 1 1,-1-1 0,0 0-1,0 0 1,-1 0 0,1 0-1,-1 0 1,0 0 0,0-1-1,0 1 1,0-1 0,-1 1-1,1-1 1,-4 3-59,-25 25 431,-3-2 0,0-1 0,-24 13-431,26-18-66,-17 12-590,-8 2 160</inkml:trace>
 </inkml:ink>
 </file>
 
@@ -3036,7 +3036,7 @@
     </inkml:brush>
   </inkml:definitions>
   <inkml:trace contextRef="#ctx0" brushRef="#br0">461 1720 3136,'-3'2'228,"1"0"-133,0-1 1,1 0-1,-1 1 1,0-1-1,1 1 1,0-1-1,-1 1 0,1 0 1,0 0-1,-1-1 1,1 1-1,0 0 1,1 0-1,-1 0 1,0 0-1,0 0 1,0 2-96,-11 4 4138,9-12-3765,0 0-1,0 0 1,0 0 0,1 0-1,0-1 1,0 1 0,-1-3-373,-13-25 852,-16-24-271,2-1 0,2-2-581,22 47 38,-42-99 135,4-2 0,-10-54-173,-49-241 44,87 331-207,-3-43 163,16 89-14,1-1 1,2 0 0,1 1 0,1-1-1,3-9 14,-2 24-9,1-1 0,1 2 0,1-1 0,0 1 0,1-1-1,1 2 1,7-13 9,-9 20-14,-1 0-1,1 0 1,0 0-1,1 0 1,0 1-1,0 1 1,0-1-1,1 1 1,0 0 0,1 1-1,-1-1 1,1 2-1,0-1 1,4 0 14,17-4-13,0 1 1,1 1-1,-1 2 1,22 0 12,124-1-198,-86 5-184,5-4 382,-80 4-24,102-9-1930,8 5 1954,-60 3-1376,4-8 416</inkml:trace>
-  <inkml:trace contextRef="#ctx0" brushRef="#br0" timeOffset="677.864">247 924 4160,'0'0'62,"-1"1"0,1-1 0,-1 0 0,1 0 1,0 0-1,-1 0 0,1 0 0,-1 0 0,1 0 0,0-1 1,-1 1-1,1 0 0,-1 0 0,1 0 0,0 0 0,-1 0 1,1-1-1,0 1 0,-1 0 0,1 0 0,0-1 0,-1 1 0,1 0 1,0 0-1,-1-1 0,1 1 0,0 0 0,0-1 0,-1 1 1,1 0-1,0-1-62,2-12 1716,0 0-517,-2 12-831,0 1 123,0 0-171,0 0-69,0 0-145,8 1-105,0 0-1,0 0 1,0 1 0,0 0-1,0 1 1,0 0-1,19 5 60,53 12 170,7 2 301,1-4-1,27 0-530,-64-16 88,-39-3-694,0 2 1,-1-1-1,1 1 0,-1 1 1,0 0-1,1 1 0,-1 0 1,5 2 605,2 6-3776</inkml:trace>
+  <inkml:trace contextRef="#ctx0" brushRef="#br0" timeOffset="677.863">247 924 4160,'0'0'62,"-1"1"0,1-1 0,-1 0 0,1 0 1,0 0-1,-1 0 0,1 0 0,-1 0 0,1 0 0,0-1 1,-1 1-1,1 0 0,-1 0 0,1 0 0,0 0 0,-1 0 1,1-1-1,0 1 0,-1 0 0,1 0 0,0-1 0,-1 1 0,1 0 1,0 0-1,-1-1 0,1 1 0,0 0 0,0-1 0,-1 1 1,1 0-1,0-1-62,2-12 1716,0 0-517,-2 12-831,0 1 123,0 0-171,0 0-69,0 0-145,8 1-105,0 0-1,0 0 1,0 1 0,0 0-1,0 1 1,0 0-1,19 5 60,53 12 170,7 2 301,1-4-1,27 0-530,-64-16 88,-39-3-694,0 2 1,-1-1-1,1 1 0,-1 1 1,0 0-1,1 1 0,-1 0 1,5 2 605,2 6-3776</inkml:trace>
   <inkml:trace contextRef="#ctx0" brushRef="#br0" timeOffset="1807.368">1738 1334 3392,'-1'-3'286,"1"0"0,-1 0 0,1 0 0,0 0 0,0 1 1,0-1-1,0 0 0,0 0 0,1-1-286,-1 2 143,1 0-1,-1 0 1,0 0 0,0 0 0,0 0 0,0 0-1,0 0 1,0 0 0,0 0 0,-1 0-1,1 0 1,-1 0 0,1 0 0,-1 0-1,0 0 1,0 0 0,0 0 0,0 0 0,0 1-1,0-1 1,-2-1-143,1 1 32,0 0 0,0 0 1,-1 1-1,1-1 0,-1 1 0,1-1 0,-1 1 0,0 0 1,1 0-1,-1 0 0,0 1 0,0-1 0,0 1 0,1-1 1,-1 1-1,0 0 0,0 0 0,0 0 0,-2 1-32,4-1 8,-32 1-20,0 2 0,-1 1 0,1 1 0,1 2 0,0 1 1,0 2-1,0 1 0,1 2 0,-16 9 12,44-20-6,-1 0 0,1 0 0,-1 1 0,1 0 0,0-1 0,0 1 0,0 0 0,0 1 0,0-1-1,1 0 1,0 1 0,-1 0 0,1-1 0,1 1 0,-1 0 0,0 0 0,1 0 0,0 0 0,0 0 0,0 0 0,1 1 0,-1-1 0,1 0 0,0 0 0,0 0-1,0 1 1,1-1 0,-1 0 0,1 0 0,0 0 0,1 0 0,-1 0 0,1 0 0,-1 0 0,1 0 0,0 0 0,0-1 0,1 1 0,-1-1 0,1 0 0,0 0 0,0 0-1,0 0 1,3 3 6,49 30-117,-37-26 149,0 2 0,-1 0 0,0 1-32,28 23 33,-31-26-32,-1 0 1,0 0 0,-1 1-1,0 1 1,-1 0 0,7 11-2,26 48 128,-43-69-102,0 0 1,0 1-1,0-1 1,0 0-1,-1 1 1,1-1 0,-1 1-1,0-1 1,1 1-1,-1-1 1,0 1-1,0-1 1,-1 1-1,1-1 1,0 1-1,-1-1 1,1 1-1,-1-1 1,0 0 0,0 1-1,0-1 1,0 0-1,-1 0 1,1 0-1,0 0 1,-1 0-1,1 0 1,-1 0-1,0 0 1,0 0 0,0-1-1,0 1 1,0-1-1,0 1 1,0-1-1,0 0 1,0 0-1,-1 0 1,1 0-1,-1 0 1,1-1-1,0 1 1,-2-1-27,-88-1-36,5 0-328,-81 9 364,136-6-795,2 2-1887</inkml:trace>
 </inkml:ink>
 </file>
@@ -3127,7 +3127,7 @@
     </inkml:brush>
   </inkml:definitions>
   <inkml:trace contextRef="#ctx0" brushRef="#br0">1808 91 3648,'-3'-4'221,"0"0"-1,0 0 1,1-1 0,-1 1-1,1 0 1,0-1 0,1 1-1,-1-1 1,1 0-1,0 0 1,0 0 0,0 1-1,0-1 1,1 0 0,0 0-1,0-1-220,-3-5 358,6 17-177,23 33-127,2-2 1,1-1-1,7 4-54,-10-11-13,0 2 1,-2 0-1,-1 2 0,10 22 13,12 36 144,-14-27-45,2-1-1,5 1-98,0 2 92,-28-46-107,1-1 0,1 0 0,1-1 0,15 17 15,-14-20 70,0 1-1,-1 1 0,0 0 1,-2 0-1,5 11-69,-14-25 16,0-1 0,-1 1 0,1-1 0,0 1 0,0-1 0,0 0 0,0 0 0,1 0 0,-1 0 0,1 0 0,-1 0-1,1-1 1,0 1-16,30 23 60,-32-24-33,0-1 1,0 1 0,0 0 0,0 0 0,0-1-1,0 1 1,0-1 0,0 1 0,0-1-1,0 1 1,0-1 0,0 0 0,0 1-1,0-1 1,0 0 0,1 0 0,-1 0-1,0 0 1,0 0 0,0 0 0,0 0 0,0 0-1,1 0 1,-1-1 0,0 1 0,0 0-1,0-1 1,0 1 0,0-1 0,0 1-1,0-1 1,0 1 0,0-1 0,0 0-28,0 0 144,-1 1-38,0 0-42,-16 1 82,-1 0-1,1 1 1,-1 1-1,1 1 1,0 0-1,0 1 1,1 1-1,-3 1-145,-32 17-88,-37 24 88,61-34 119,-58 38 8,3 3-1,1 3 1,4 4 0,-42 45-127,-95 77 170,43-38-26,56-51-74,77-70-80,30-21-177,0 0 1,-1 1 0,2 0-1,-1 0 1,1 0 0,-1 1 0,1 0-1,1 0 1,-1 1 0,1-1-1,1 1 1,-1 1 0,0 0 186,0 9-896</inkml:trace>
-  <inkml:trace contextRef="#ctx0" brushRef="#br0" timeOffset="1038.897">2140 907 416,'-83'-2'6983,"34"-1"-6436,-33 4-547,-288 25 1424,321-25-1096,-1-3 0,-39-6-328,12 0 166,-234-5 193,50 4-105,147 3-314,0 5-1,0 5 1,-53 11 60,29 10 0,126-22 0,-33 3-1483,31-2 598</inkml:trace>
+  <inkml:trace contextRef="#ctx0" brushRef="#br0" timeOffset="1038.896">2140 907 416,'-83'-2'6983,"34"-1"-6436,-33 4-547,-288 25 1424,321-25-1096,-1-3 0,-39-6-328,12 0 166,-234-5 193,50 4-105,147 3-314,0 5-1,0 5 1,-53 11 60,29 10 0,126-22 0,-33 3-1483,31-2 598</inkml:trace>
 </inkml:ink>
 </file>
 
@@ -3187,7 +3187,7 @@
   </inkml:definitions>
   <inkml:trace contextRef="#ctx0" brushRef="#br0">731 112 3392,'5'-1'1059,"-8"-1"-698,3 2-331,0 0-1,-1 0 1,1 0 0,0 0 0,0-1-1,-1 1 1,1 0 0,0 0-1,0 0 1,-1-1 0,1 1 0,0 0-1,0 0 1,0 0 0,-1-1 0,1 1-1,0 0 1,0 0 0,0-1-1,0 1 1,-1 0 0,1-1 0,0 1-1,0 0 1,0 0 0,0-1 0,0 1-1,0 0 1,0-1 0,0 1 0,0 0-1,0-1 1,0 1 0,0 0-1,0 0 1,0-1 0,0 1 0,0 0-1,1-1 1,-1 1 0,0 0 0,0 0-1,0-1 1,0 1 0,0 0-1,1 0 1,-1-1 0,0 1 0,0 0-1,1 0 1,-1 0 0,0-1 0,0 1-1,1 0 1,-1 0 0,0 0-1,1 0-29,29-26 1050,-25 21-1013,0 0 0,1 0-1,-1 1 1,1-1 0,0 1-1,0 1 1,2-2-37,6-1 112,1 0 0,1 1 0,-1 0 0,0 1 0,1 1 0,14-1-112,-28 4 117,-2 0-53,0 0 0,0 0 86,2 11 340,5 4-145,-6-14-327,-1 0 0,1 0 0,0 0 1,-1 0-1,1 1 0,-1-1 0,1 0 0,-1 0 1,0 1-1,1-1 0,-1 0 0,0 0 0,0 1 0,0-1 1,0 0-1,0 0 0,0 1 0,0-1 0,-1 0 0,1 1 1,0-1-1,-1 0 0,0 1-18,-3 6 60,0 0 0,-1 0-1,0 0 1,0-1 0,-1 0-1,-2 2-59,-12 15 165,-12 12 173,-2-1 1,-1-1 0,-1-2-1,-41 27-338,-73 45 176,115-79-33,-38 20-143,29-19 140,-6 8-140,15-9 6,-3 2-7,-33 31 1,8-7 171,26-22-208,35-28 44,1 0 1,-1 0-1,1 0 1,-1-1 0,1 1-1,-1 0 1,1-1-1,-1 1 1,1-1 0,-1 0-1,0 0 1,1 1-1,-1-1 1,0 0 0,-1 0-8,-2 0 6,0 0 1,-1 1-1,1 0 1,0 0-1,-1 0 1,1 1 0,0 0-7,-2-1 37,6-1 16,1 0-31,17-4-102,-15 4 71,0-1 0,-1 0-1,1 1 1,0-1 0,0 1 0,-1 0 0,1 0 0,0 0-1,0 0 1,0 0 0,-1 0 0,1 0 0,0 1 0,0-1 9,132 33-141,-52-15-58,-1 5 0,2 4 199,117 44-64,-94-31-176,78 17 240,-104-37-2917,8-2 2917,-68-17-3120</inkml:trace>
   <inkml:trace contextRef="#ctx0" brushRef="#br0" timeOffset="522.219">222 805 1312,'11'-4'480,"-4"-3"-352</inkml:trace>
-  <inkml:trace contextRef="#ctx0" brushRef="#br0" timeOffset="948.046">410 729 2912,'68'-7'1520,"-42"2"-1121,1 1 1,19 1-400,-17 1 433,28-6-433,72-9 611,-69 10 47,29-8-658,310-54 751,-233 43-601,350-53-251,-449 68-480,-8 1-1835</inkml:trace>
+  <inkml:trace contextRef="#ctx0" brushRef="#br0" timeOffset="948.045">410 729 2912,'68'-7'1520,"-42"2"-1121,1 1 1,19 1-400,-17 1 433,28-6-433,72-9 611,-69 10 47,29-8-658,310-54 751,-233 43-601,350-53-251,-449 68-480,-8 1-1835</inkml:trace>
 </inkml:ink>
 </file>
 
@@ -3276,8 +3276,8 @@
     </inkml:brush>
   </inkml:definitions>
   <inkml:trace contextRef="#ctx0" brushRef="#br0">10 1291 3808,'0'8'1281,"0"-16"1160,0 8-1534,0 0-235,0 7 1611,-1-50-305,-4-33-1978,2 44 240,2-1 0,3-20-240,-1-3 75,10-490 896,-11 537-952,0-6-2,0 1-1,1 0 0,1 0 0,0 0-16,-1 9 0,0 0 0,1 1-1,0-1 1,-1 1 0,1-1-1,1 1 1,-1 0-1,1 0 1,0 0 0,0 0-1,0 0 1,0 1 0,3-3 0,58-46 87,3 2 0,31-15-87,12-9-57,-107 72 10,68-44-1311,-63 41 645,2 1-1,-1 0 0,0 0 1,1 1-1,0 0 1,0 0-1,0 1 714,3 1-4245</inkml:trace>
-  <inkml:trace contextRef="#ctx0" brushRef="#br0" timeOffset="348.995">47 782 6720,'-10'-2'1258,"-11"-4"689,19 0-1100,11-2 141,33-15-780,0 2 0,2 1 0,22-5-208,7-3 32,-16 3-107,-31 12-246,0 2 1,1 1-1,0 1 0,0 1 0,1 1 0,1 2 321,-10 4-5264</inkml:trace>
-  <inkml:trace contextRef="#ctx0" brushRef="#br0" timeOffset="2036.894">789 1147 3232,'-5'1'1140,"16"2"-772,14-2-15,-17-6-214,-8 5-133,1 0 1,-1 0 0,0 0-1,0 0 1,0-1 0,1 1-1,-1 0 1,0 0 0,0 0-1,0 0 1,1 0-1,-1 0 1,0 0 0,0 0-1,0-1 1,0 1 0,1 0-1,-1 0 1,0 0-1,0 0 1,0-1 0,0 1-1,0 0 1,1 0 0,-1 0-1,0 0 1,0-1 0,0 1-1,0 0 1,0 0-1,0 0 1,0-1 0,0 1-1,0 0 1,0 0 0,0-1-1,0 1-6,0-1 651,0 1-616,0 0-1,0 0 1,0-1 0,0 1-1,0 0 1,-1 0 0,1 0 0,0 0-1,0 0 1,0 0 0,0 0-1,0 0 1,0 0 0,0 0 0,-1 0-1,1 0 1,0 0 0,0-1-1,0 1 1,0 0 0,0 0 0,-1 0-1,1 0 1,0 0 0,0 0-1,0 0 1,0 0 0,0 0 0,-1 1-1,1-1 1,0 0 0,0 0-1,0 0 1,0 0 0,0 0 0,0 0-1,0 0 1,-1 0 0,1 0-1,0 0 1,0 0 0,0 0 0,0 1-1,0-1 1,0 0 0,0 0-1,0 0 1,0 0 0,-1 0 0,1 0-1,0 1 1,0-1 0,0 0-1,0 0 1,0 0-35,-2 6 251,2-5-214,-1 0 1,1 0-1,-1 1 0,1-1 1,-1 0-1,1 0 0,-1 0 1,0 0-1,0 0 0,1 0 0,-1 0 1,0 0-1,0 0 0,0-1 1,0 1-1,0 0 0,0 0 1,0-1-1,0 1 0,-1-1 1,1 1-1,0-1-37,-13 7 72,2-1 0,-1 2 0,1 0 0,0 0 0,0 1 0,1 0 0,1 1 0,-1 1 0,2-1 0,-1 1 0,2 1 0,-1 0 0,1 0 0,-2 6-72,7-12 18,0 1 0,0-1 1,1 0-1,0 1 0,0 0 0,0 1-18,1-5 25,1 1-1,0-1 0,0 0 0,1 0 0,-1 1 1,0-1-1,1 0 0,0 0 0,0 0 0,0 0 0,0 0 1,1 0-1,-1 0 0,2 2-24,0 0 18,1 0 0,-1-1-1,1 0 1,0 0 0,0 0 0,0 0 0,1-1 0,-1 0-1,1 1 1,0-2 0,3 3-18,14 5 22,-1-1 1,6 1-23,-7-3-17,-15-5 37,-1-1 0,1 0 0,0 0 0,-1 0-1,1-1 1,0 1 0,0-1 0,-1 0 0,1-1 0,0 1 0,0-1 0,-1 0 0,1 0-1,-1 0 1,3-2-20,5-2 197,0 0-1,-1-1 0,0 0 1,0-1-1,0-1-196,-6 4 67,-1 0 0,0 0 0,0-1 0,0 1 0,0-1 0,-1 0 0,0 0-1,0 0 1,0-1 0,-1 1 0,2-4-67,1-6 194,0 0 0,-1 0-1,2-12-193,-5 20 152,0 0-1,0 0 0,-1 0 1,0-1-1,0 1 1,-1 0-1,0 0 0,0 0 1,-1 0-1,0 0 1,0 0-1,0 0 0,-4-6-151,4 10 82,0-1-1,0 1 1,-1 0-1,1-1 1,-1 1-1,0 0 1,0 0-1,0 1 1,0-1-1,0 0 1,-1 1-1,1 0 1,-1 0-1,0 0 1,1 0-1,-1 1 1,0 0-1,0-1 1,0 1-1,0 1 1,0-1-1,0 0 0,0 1 1,-1 0-1,1 0-81,-7 1 33,0 0-1,0 1 0,0 0 0,0 1 1,0 0-1,0 0 0,-9 6-32,-3 1-1513,1 2-1,0 0 1,-2 4 1513,-13 10-2421</inkml:trace>
+  <inkml:trace contextRef="#ctx0" brushRef="#br0" timeOffset="348.994">47 782 6720,'-10'-2'1258,"-11"-4"689,19 0-1100,11-2 141,33-15-780,0 2 0,2 1 0,22-5-208,7-3 32,-16 3-107,-31 12-246,0 2 1,1 1-1,0 1 0,0 1 0,1 1 0,1 2 321,-10 4-5264</inkml:trace>
+  <inkml:trace contextRef="#ctx0" brushRef="#br0" timeOffset="2036.893">789 1147 3232,'-5'1'1140,"16"2"-772,14-2-15,-17-6-214,-8 5-133,1 0 1,-1 0 0,0 0-1,0 0 1,0-1 0,1 1-1,-1 0 1,0 0 0,0 0-1,0 0 1,1 0-1,-1 0 1,0 0 0,0 0-1,0-1 1,0 1 0,1 0-1,-1 0 1,0 0-1,0 0 1,0-1 0,0 1-1,0 0 1,1 0 0,-1 0-1,0 0 1,0-1 0,0 1-1,0 0 1,0 0-1,0 0 1,0-1 0,0 1-1,0 0 1,0 0 0,0-1-1,0 1-6,0-1 651,0 1-616,0 0-1,0 0 1,0-1 0,0 1-1,0 0 1,-1 0 0,1 0 0,0 0-1,0 0 1,0 0 0,0 0-1,0 0 1,0 0 0,0 0 0,-1 0-1,1 0 1,0 0 0,0-1-1,0 1 1,0 0 0,0 0 0,-1 0-1,1 0 1,0 0 0,0 0-1,0 0 1,0 0 0,0 0 0,-1 1-1,1-1 1,0 0 0,0 0-1,0 0 1,0 0 0,0 0 0,0 0-1,0 0 1,-1 0 0,1 0-1,0 0 1,0 0 0,0 0 0,0 1-1,0-1 1,0 0 0,0 0-1,0 0 1,0 0 0,-1 0 0,1 0-1,0 1 1,0-1 0,0 0-1,0 0 1,0 0-35,-2 6 251,2-5-214,-1 0 1,1 0-1,-1 1 0,1-1 1,-1 0-1,1 0 0,-1 0 1,0 0-1,0 0 0,1 0 0,-1 0 1,0 0-1,0 0 0,0-1 1,0 1-1,0 0 0,0 0 1,0-1-1,0 1 0,-1-1 1,1 1-1,0-1-37,-13 7 72,2-1 0,-1 2 0,1 0 0,0 0 0,0 1 0,1 0 0,1 1 0,-1 1 0,2-1 0,-1 1 0,2 1 0,-1 0 0,1 0 0,-2 6-72,7-12 18,0 1 0,0-1 1,1 0-1,0 1 0,0 0 0,0 1-18,1-5 25,1 1-1,0-1 0,0 0 0,1 0 0,-1 1 1,0-1-1,1 0 0,0 0 0,0 0 0,0 0 0,0 0 1,1 0-1,-1 0 0,2 2-24,0 0 18,1 0 0,-1-1-1,1 0 1,0 0 0,0 0 0,0 0 0,1-1 0,-1 0-1,1 1 1,0-2 0,3 3-18,14 5 22,-1-1 1,6 1-23,-7-3-17,-15-5 37,-1-1 0,1 0 0,0 0 0,-1 0-1,1-1 1,0 1 0,0-1 0,-1 0 0,1-1 0,0 1 0,0-1 0,-1 0 0,1 0-1,-1 0 1,3-2-20,5-2 197,0 0-1,-1-1 0,0 0 1,0-1-1,0-1-196,-6 4 67,-1 0 0,0 0 0,0-1 0,0 1 0,0-1 0,-1 0 0,0 0-1,0 0 1,0-1 0,-1 1 0,2-4-67,1-6 194,0 0 0,-1 0-1,2-12-193,-5 20 152,0 0-1,0 0 0,-1 0 1,0-1-1,0 1 1,-1 0-1,0 0 0,0 0 1,-1 0-1,0 0 1,0 0-1,0 0 0,-4-6-151,4 10 82,0-1-1,0 1 1,-1 0-1,1-1 1,-1 1-1,0 0 1,0 0-1,0 1 1,0-1-1,0 0 1,-1 1-1,1 0 1,-1 0-1,0 0 1,1 0-1,-1 1 1,0 0-1,0-1 1,0 1-1,0 1 1,0-1-1,0 0 0,0 1 1,-1 0-1,1 0-81,-7 1 33,0 0-1,0 1 0,0 0 0,0 1 1,0 0-1,0 0 0,-9 6-32,-3 1-1513,1 2-1,0 0 1,-2 4 1513,-13 10-2421</inkml:trace>
 </inkml:ink>
 </file>
 
@@ -3369,7 +3369,7 @@
   </inkml:definitions>
   <inkml:trace contextRef="#ctx0" brushRef="#br0">29 1433 3968,'-1'0'115,"0"0"0,1 0 0,-1 0 0,0-1 0,1 1 0,-1 0 0,1 0 0,-1-1 0,1 1 1,-1 0-1,1-1 0,-1 1 0,1 0 0,-1-1 0,1 1 0,-1-1 0,1 1 0,-1-1-115,1 0 13,0 1 0,0 0 0,0 0 0,-1 0 0,1-1-1,0 1 1,0 0 0,0 0 0,0 0 0,0-1 0,0 1 0,0 0 0,0 0-1,0-1 1,0 1 0,0 0 0,0 0 0,0 0 0,0-1 0,0 1 0,0 0 0,0 0-1,0-1 1,0 1 0,0 0 0,0 0 0,0 0 0,1-1 0,-1 1 0,0 0 0,0 0-1,0 0 1,0-1 0,0 1 0,1 0 0,-1 0 0,0 0 0,0 0 0,0-1 0,1 1-1,-1 0 1,0 0 0,0 0 0,0 0 0,1 0 0,-1 0 0,0 0 0,0 0-1,1 0 1,-1 0 0,0 0 0,0 0-13,4-1 5,1 0 70,-1 0 0,1 0 1,-1 0-1,1-1 0,-1 1 0,0-1 0,1 0 0,-1-1 0,0 1 0,0-1 1,-1 1-1,4-4-75,-4 2 182,-1 0 1,0 0 0,0 0 0,0 0-1,-1-1 1,1 1 0,-1 0-1,0-1 1,0 1 0,-1-1 0,0 1-1,1-1 1,-1-2-183,2-21 526,-1 18-342,0 0-1,-1 0 0,-1 0 1,1 0-1,-2-1 1,0-5-184,-4-25 179,0-15 269,-7-18-448,3 14 235,-4-16 84,5 28-196,2 0 0,0-16-123,-8-196 91,8 200-149,4 45 32,1 0 0,1 0 0,0 0 0,1 0 0,1-1 0,2-14 26,-1 25-2,0 0 0,0 0 1,0 0-1,1 1 0,-1-1 0,1 1 0,1-1 0,-1 1 0,0 0 0,1 0 0,0 0 0,0 1 0,0-1 0,2 0 2,13-10-41,1 1 0,13-6 41,-22 12-61,56-29 77,1 4 0,60-21-16,-97 44-236,0 2-1,0 1 1,0 1 0,1 2 0,12 1 236,51-7-729,62-14-1447,-118 12 1446</inkml:trace>
   <inkml:trace contextRef="#ctx0" brushRef="#br0" timeOffset="383.258">140 789 5472,'14'0'2016,"-7"-9"-1536,5-3-160,6 5 192,8 2-352,11-6 416,14-6-320,-2 1-128,14-2-64,-5-3-64,12-7 0,-3 4-96,-4-3 64,-5-1-384,-2 7 192,-5 2-1216,-7-2 800,-6 3-3328</inkml:trace>
-  <inkml:trace contextRef="#ctx0" brushRef="#br0" timeOffset="1300.534">1368 768 3648,'-7'2'1458,"19"-4"-1002,-10 2-29,-2 0-118,-14 0 811,-7 1-714,1 0-1,0 2 0,0 0 1,0 2-1,-14 4-405,-3 4 195,0 1-1,-15 9-194,33-14 15,0 1 0,0 1-1,1 0 1,-10 9-15,26-18-2,0 0-1,1 0 1,-1 0 0,1 0 0,0 0-1,0 0 1,0 0 0,0 1-1,0-1 1,0 0 0,1 1-1,-1-1 1,1 1 0,0-1 0,-1 1-1,1-1 1,0 1 0,1-1-1,-1 0 1,0 1 0,1-1-1,0 2 3,-1-1 9,1 1 0,0-1 0,0 1-1,0-1 1,0 1 0,1-1-1,-1 0 1,1 1 0,0-1-1,0 0 1,0 0 0,1-1 0,-1 1-1,1 0 1,1 1-9,21 11 37,1 0-1,0-2 1,1-1 0,7 1-37,-23-8-8,8 4 4,0 1 1,-1 0 0,0 2-1,-1 0 1,0 1 0,-1 1-1,-1 0 1,9 11 3,-22-23 23,0-1 1,-1 1-1,1 0 0,-1 0 1,1 0-1,-1 0 0,0 0 1,0 0-1,0 0 0,0 0 1,0 0-1,-1 1 1,1-1-1,-1 0 0,1 1 1,-1-1-1,0 0 0,0 1 1,0-1-1,0 0 0,0 1 1,-1-1-1,1 1-23,-1-1 26,0 1 1,-1-1-1,1 0 1,0 0-1,-1 0 1,1 0-1,-1 0 1,0 0-1,0 0 1,1 0-1,-1 0 1,0-1-1,-1 1 1,1-1-1,0 0 1,0 0-1,-1 1 1,1-1-1,0-1 1,-1 1-1,-1 0-26,-51 23 821,44-18-704,1-1 0,-1 0-1,0-1 1,0 0-1,0-1 1,0 0 0,-4 0-117,1-2 119,-13 2 5,1 1 0,0 0-1,-10 5-123,20-5-247,1 0-1,-1-2 1,0 0-1,-9 0 248,0 0-1303,-1-1-2382</inkml:trace>
+  <inkml:trace contextRef="#ctx0" brushRef="#br0" timeOffset="1300.533">1368 768 3648,'-7'2'1458,"19"-4"-1002,-10 2-29,-2 0-118,-14 0 811,-7 1-714,1 0-1,0 2 0,0 0 1,0 2-1,-14 4-405,-3 4 195,0 1-1,-15 9-194,33-14 15,0 1 0,0 1-1,1 0 1,-10 9-15,26-18-2,0 0-1,1 0 1,-1 0 0,1 0 0,0 0-1,0 0 1,0 0 0,0 1-1,0-1 1,0 0 0,1 1-1,-1-1 1,1 1 0,0-1 0,-1 1-1,1-1 1,0 1 0,1-1-1,-1 0 1,0 1 0,1-1-1,0 2 3,-1-1 9,1 1 0,0-1 0,0 1-1,0-1 1,0 1 0,1-1-1,-1 0 1,1 1 0,0-1-1,0 0 1,0 0 0,1-1 0,-1 1-1,1 0 1,1 1-9,21 11 37,1 0-1,0-2 1,1-1 0,7 1-37,-23-8-8,8 4 4,0 1 1,-1 0 0,0 2-1,-1 0 1,0 1 0,-1 1-1,-1 0 1,9 11 3,-22-23 23,0-1 1,-1 1-1,1 0 0,-1 0 1,1 0-1,-1 0 0,0 0 1,0 0-1,0 0 0,0 0 1,0 0-1,-1 1 1,1-1-1,-1 0 0,1 1 1,-1-1-1,0 0 0,0 1 1,0-1-1,0 0 0,0 1 1,-1-1-1,1 1-23,-1-1 26,0 1 1,-1-1-1,1 0 1,0 0-1,-1 0 1,1 0-1,-1 0 1,0 0-1,0 0 1,1 0-1,-1 0 1,0-1-1,-1 1 1,1-1-1,0 0 1,0 0-1,-1 1 1,1-1-1,0-1 1,-1 1-1,-1 0-26,-51 23 821,44-18-704,1-1 0,-1 0-1,0-1 1,0 0-1,0-1 1,0 0 0,-4 0-117,1-2 119,-13 2 5,1 1 0,0 0-1,-10 5-123,20-5-247,1 0-1,-1-2 1,0 0-1,-9 0 248,0 0-1303,-1-1-2382</inkml:trace>
 </inkml:ink>
 </file>
 
@@ -3487,7 +3487,7 @@
     </inkml:brush>
   </inkml:definitions>
   <inkml:trace contextRef="#ctx0" brushRef="#br0">88 2232 4800,'-1'-1'132,"0"-1"1,-1 1-1,1 0 1,-1-1-1,0 1 1,1 0-1,-1 0 1,0 0-1,1 0 1,-1 0-1,0 1 1,0-1-1,0 0 1,0 1-1,0-1 1,-1 1-133,-12-3 797,13 2-734,-1-1 1,0 1-1,1 0 1,-1-1-1,1 0 0,0 0 1,-1 1-1,1-1 0,0-1 1,0 1-1,0 0 0,1 0 1,-1-1-1,0 1 0,1-1 1,0 1-1,-1-1 0,1 0 1,0 0-1,0 1 0,1-1 1,-1 0-1,1 0 1,-1 0-1,1 0 0,0 0 1,0 0-1,0 0 0,0 0 1,1 0-1,-1 0 0,1 1 1,0-3-64,6-8 185,0-1 1,0 2-1,1-1 1,1 1 0,0 0-186,1 0 21,2-2 62,0 0 1,-2-1 0,9-14-84,-1-1 161,2 1 0,0 1 0,2 1 0,1 1 0,2 1 0,9-8-161,37-28 79,61-38-79,-39 37 82,3 5 0,2 4-1,76-29-81,68-30 45,169-70 81,-328 149-99,66-25-49,17 2 22,470-145-149,-449 141 155,-53 15 36,3 5 1,52-4-43,572-79 117,-170 43-288,-217 33 156,71-5 190,299-9-276,-97 14 74,126 10 170,-268 17-248,-23 0 126,111-7 59,333 15-155,-667 24 56,-75-2 49,138 11-99,214 46 69,-330-36-90,200 34 249,-113-4-108,-2 13-1,90 44-50,-299-88 135,0 4 0,-2 3-1,-2 4 1,46 33-135,152 96 63,26 18 103,-179-110 224,26 8-390,-89-57 18,-34-17-1811,0 1 0,0 1 1793,-7 2-5264</inkml:trace>
-  <inkml:trace contextRef="#ctx0" brushRef="#br0" timeOffset="1220.554">14560 1006 3552,'-2'-3'234,"-8"-13"436,10 16-657,0-1-1,0 1 1,-1 0 0,1 0-1,0 0 1,0 0-1,0 0 1,0-1 0,0 1-1,0 0 1,0 0-1,0 0 1,-1-1 0,1 1-1,0 0 1,0 0 0,0 0-1,0-1 1,0 1-1,0 0 1,0 0 0,0 0-1,0-1 1,0 1-1,1 0 1,-1 0 0,0 0-1,0-1 1,0 1 0,0 0-1,0 0 1,0 0-1,0 0 1,0-1 0,0 1-1,1 0 1,-1 0-1,0 0 1,0 0 0,0-1-1,0 1 1,1 0 0,-1 0-1,0 0 1,0 0-1,0 0 1,0 0 0,1 0-1,-1 0 1,0 0-1,0 0 1,0 0 0,1 0-1,-1 0 1,0 0 0,0 0-13,-5-24 1599,3 21-1481,1-1-1,-1 0 0,0 1 0,1 0 0,-2-1 0,1 1 0,0 0 1,-1 0-1,1 0 0,-1 0-117,0 0 99,1 1 0,-1-1 0,1 0-1,0 0 1,0 0 0,0 0 0,1-1 0,-2-2-99,-9-29 1191,11 34-1143,1 0 1,-1-1-1,1 1 0,-1-1 0,0 1 0,0-1 1,0 1-1,1 0 0,-1 0 0,0-1 0,-1 1 1,1 0-1,0 0 0,0 0 0,0 0 0,-1 0 1,0 0-49,1 1 128,1 0-43,0 0 0,18 23 193,24 44-305,23 28 27,-17-37 75,-29-37-64,-1 1-1,-1 1 1,-1 0-1,0 4-10,-11-16 6,-1 1 0,0 1 0,-1-1 0,0 0 0,-1 1 0,-1 0 0,1 10-6,3 18-36,-5-36 47,1 0 1,0-1-1,-1 1 1,0 0-1,0 0 1,0-1 0,-1 1-1,1 0 1,-1-1-1,-1 1 1,1-1-1,-1 2-11,-43 67 352,41-68-266,-1-1-1,1 0 1,-1 0-1,0 0 0,0-1 1,-1 0-1,1 0 1,0 0-1,-1 0 1,0-1-1,0 0 0,0 0 1,0-1-1,0 1 1,-4-1-86,-16 2 395,-1-1 0,0-1 0,-2-1-395,7-1 131,-64 0 58,28-1-679,0 3 0,0 2 1,-28 6 489,-90 19-7765,-24-5 7765,142-18-2891</inkml:trace>
+  <inkml:trace contextRef="#ctx0" brushRef="#br0" timeOffset="1220.553">14560 1006 3552,'-2'-3'234,"-8"-13"436,10 16-657,0-1-1,0 1 1,-1 0 0,1 0-1,0 0 1,0 0-1,0 0 1,0-1 0,0 1-1,0 0 1,0 0-1,0 0 1,-1-1 0,1 1-1,0 0 1,0 0 0,0 0-1,0-1 1,0 1-1,0 0 1,0 0 0,0 0-1,0-1 1,0 1-1,1 0 1,-1 0 0,0 0-1,0-1 1,0 1 0,0 0-1,0 0 1,0 0-1,0 0 1,0-1 0,0 1-1,1 0 1,-1 0-1,0 0 1,0 0 0,0-1-1,0 1 1,1 0 0,-1 0-1,0 0 1,0 0-1,0 0 1,0 0 0,1 0-1,-1 0 1,0 0-1,0 0 1,0 0 0,1 0-1,-1 0 1,0 0 0,0 0-13,-5-24 1599,3 21-1481,1-1-1,-1 0 0,0 1 0,1 0 0,-2-1 0,1 1 0,0 0 1,-1 0-1,1 0 0,-1 0-117,0 0 99,1 1 0,-1-1 0,1 0-1,0 0 1,0 0 0,0 0 0,1-1 0,-2-2-99,-9-29 1191,11 34-1143,1 0 1,-1-1-1,1 1 0,-1-1 0,0 1 0,0-1 1,0 1-1,1 0 0,-1 0 0,0-1 0,-1 1 1,1 0-1,0 0 0,0 0 0,0 0 0,-1 0 1,0 0-49,1 1 128,1 0-43,0 0 0,18 23 193,24 44-305,23 28 27,-17-37 75,-29-37-64,-1 1-1,-1 1 1,-1 0-1,0 4-10,-11-16 6,-1 1 0,0 1 0,-1-1 0,0 0 0,-1 1 0,-1 0 0,1 10-6,3 18-36,-5-36 47,1 0 1,0-1-1,-1 1 1,0 0-1,0 0 1,0-1 0,-1 1-1,1 0 1,-1-1-1,-1 1 1,1-1-1,-1 2-11,-43 67 352,41-68-266,-1-1-1,1 0 1,-1 0-1,0 0 0,0-1 1,-1 0-1,1 0 1,0 0-1,-1 0 1,0-1-1,0 0 0,0 0 1,0-1-1,0 1 1,-4-1-86,-16 2 395,-1-1 0,0-1 0,-2-1-395,7-1 131,-64 0 58,28-1-679,0 3 0,0 2 1,-28 6 489,-90 19-7765,-24-5 7765,142-18-2891</inkml:trace>
 </inkml:ink>
 </file>
 
@@ -3573,8 +3573,8 @@
     </inkml:brush>
   </inkml:definitions>
   <inkml:trace contextRef="#ctx0" brushRef="#br0">10 1291 3808,'0'8'1281,"0"-16"1160,0 8-1534,0 0-235,0 7 1611,-1-50-305,-4-33-1978,2 44 240,2-1 0,3-20-240,-1-3 75,10-490 896,-11 537-952,0-6-2,0 1-1,1 0 0,1 0 0,0 0-16,-1 9 0,0 0 0,1 1-1,0-1 1,-1 1 0,1-1-1,1 1 1,-1 0-1,1 0 1,0 0 0,0 0-1,0 0 1,0 1 0,3-3 0,58-46 87,3 2 0,31-15-87,12-9-57,-107 72 10,68-44-1311,-63 41 645,2 1-1,-1 0 0,0 0 1,1 1-1,0 0 1,0 0-1,0 1 714,3 1-4245</inkml:trace>
-  <inkml:trace contextRef="#ctx0" brushRef="#br0" timeOffset="348.995">47 782 6720,'-10'-2'1258,"-11"-4"689,19 0-1100,11-2 141,33-15-780,0 2 0,2 1 0,22-5-208,7-3 32,-16 3-107,-31 12-246,0 2 1,1 1-1,0 1 0,0 1 0,1 1 0,1 2 321,-10 4-5264</inkml:trace>
-  <inkml:trace contextRef="#ctx0" brushRef="#br0" timeOffset="2036.894">789 1147 3232,'-5'1'1140,"16"2"-772,14-2-15,-17-6-214,-8 5-133,1 0 1,-1 0 0,0 0-1,0 0 1,0-1 0,1 1-1,-1 0 1,0 0 0,0 0-1,0 0 1,1 0-1,-1 0 1,0 0 0,0 0-1,0-1 1,0 1 0,1 0-1,-1 0 1,0 0-1,0 0 1,0-1 0,0 1-1,0 0 1,1 0 0,-1 0-1,0 0 1,0-1 0,0 1-1,0 0 1,0 0-1,0 0 1,0-1 0,0 1-1,0 0 1,0 0 0,0-1-1,0 1-6,0-1 651,0 1-616,0 0-1,0 0 1,0-1 0,0 1-1,0 0 1,-1 0 0,1 0 0,0 0-1,0 0 1,0 0 0,0 0-1,0 0 1,0 0 0,0 0 0,-1 0-1,1 0 1,0 0 0,0-1-1,0 1 1,0 0 0,0 0 0,-1 0-1,1 0 1,0 0 0,0 0-1,0 0 1,0 0 0,0 0 0,-1 1-1,1-1 1,0 0 0,0 0-1,0 0 1,0 0 0,0 0 0,0 0-1,0 0 1,-1 0 0,1 0-1,0 0 1,0 0 0,0 0 0,0 1-1,0-1 1,0 0 0,0 0-1,0 0 1,0 0 0,-1 0 0,1 0-1,0 1 1,0-1 0,0 0-1,0 0 1,0 0-35,-2 6 251,2-5-214,-1 0 1,1 0-1,-1 1 0,1-1 1,-1 0-1,1 0 0,-1 0 1,0 0-1,0 0 0,1 0 0,-1 0 1,0 0-1,0 0 0,0-1 1,0 1-1,0 0 0,0 0 1,0-1-1,0 1 0,-1-1 1,1 1-1,0-1-37,-13 7 72,2-1 0,-1 2 0,1 0 0,0 0 0,0 1 0,1 0 0,1 1 0,-1 1 0,2-1 0,-1 1 0,2 1 0,-1 0 0,1 0 0,-2 6-72,7-12 18,0 1 0,0-1 1,1 0-1,0 1 0,0 0 0,0 1-18,1-5 25,1 1-1,0-1 0,0 0 0,1 0 0,-1 1 1,0-1-1,1 0 0,0 0 0,0 0 0,0 0 0,0 0 1,1 0-1,-1 0 0,2 2-24,0 0 18,1 0 0,-1-1-1,1 0 1,0 0 0,0 0 0,0 0 0,1-1 0,-1 0-1,1 1 1,0-2 0,3 3-18,14 5 22,-1-1 1,6 1-23,-7-3-17,-15-5 37,-1-1 0,1 0 0,0 0 0,-1 0-1,1-1 1,0 1 0,0-1 0,-1 0 0,1-1 0,0 1 0,0-1 0,-1 0 0,1 0-1,-1 0 1,3-2-20,5-2 197,0 0-1,-1-1 0,0 0 1,0-1-1,0-1-196,-6 4 67,-1 0 0,0 0 0,0-1 0,0 1 0,0-1 0,-1 0 0,0 0-1,0 0 1,0-1 0,-1 1 0,2-4-67,1-6 194,0 0 0,-1 0-1,2-12-193,-5 20 152,0 0-1,0 0 0,-1 0 1,0-1-1,0 1 1,-1 0-1,0 0 0,0 0 1,-1 0-1,0 0 1,0 0-1,0 0 0,-4-6-151,4 10 82,0-1-1,0 1 1,-1 0-1,1-1 1,-1 1-1,0 0 1,0 0-1,0 1 1,0-1-1,0 0 1,-1 1-1,1 0 1,-1 0-1,0 0 1,1 0-1,-1 1 1,0 0-1,0-1 1,0 1-1,0 1 1,0-1-1,0 0 0,0 1 1,-1 0-1,1 0-81,-7 1 33,0 0-1,0 1 0,0 0 0,0 1 1,0 0-1,0 0 0,-9 6-32,-3 1-1513,1 2-1,0 0 1,-2 4 1513,-13 10-2421</inkml:trace>
+  <inkml:trace contextRef="#ctx0" brushRef="#br0" timeOffset="348.994">47 782 6720,'-10'-2'1258,"-11"-4"689,19 0-1100,11-2 141,33-15-780,0 2 0,2 1 0,22-5-208,7-3 32,-16 3-107,-31 12-246,0 2 1,1 1-1,0 1 0,0 1 0,1 1 0,1 2 321,-10 4-5264</inkml:trace>
+  <inkml:trace contextRef="#ctx0" brushRef="#br0" timeOffset="2036.893">789 1147 3232,'-5'1'1140,"16"2"-772,14-2-15,-17-6-214,-8 5-133,1 0 1,-1 0 0,0 0-1,0 0 1,0-1 0,1 1-1,-1 0 1,0 0 0,0 0-1,0 0 1,1 0-1,-1 0 1,0 0 0,0 0-1,0-1 1,0 1 0,1 0-1,-1 0 1,0 0-1,0 0 1,0-1 0,0 1-1,0 0 1,1 0 0,-1 0-1,0 0 1,0-1 0,0 1-1,0 0 1,0 0-1,0 0 1,0-1 0,0 1-1,0 0 1,0 0 0,0-1-1,0 1-6,0-1 651,0 1-616,0 0-1,0 0 1,0-1 0,0 1-1,0 0 1,-1 0 0,1 0 0,0 0-1,0 0 1,0 0 0,0 0-1,0 0 1,0 0 0,0 0 0,-1 0-1,1 0 1,0 0 0,0-1-1,0 1 1,0 0 0,0 0 0,-1 0-1,1 0 1,0 0 0,0 0-1,0 0 1,0 0 0,0 0 0,-1 1-1,1-1 1,0 0 0,0 0-1,0 0 1,0 0 0,0 0 0,0 0-1,0 0 1,-1 0 0,1 0-1,0 0 1,0 0 0,0 0 0,0 1-1,0-1 1,0 0 0,0 0-1,0 0 1,0 0 0,-1 0 0,1 0-1,0 1 1,0-1 0,0 0-1,0 0 1,0 0-35,-2 6 251,2-5-214,-1 0 1,1 0-1,-1 1 0,1-1 1,-1 0-1,1 0 0,-1 0 1,0 0-1,0 0 0,1 0 0,-1 0 1,0 0-1,0 0 0,0-1 1,0 1-1,0 0 0,0 0 1,0-1-1,0 1 0,-1-1 1,1 1-1,0-1-37,-13 7 72,2-1 0,-1 2 0,1 0 0,0 0 0,0 1 0,1 0 0,1 1 0,-1 1 0,2-1 0,-1 1 0,2 1 0,-1 0 0,1 0 0,-2 6-72,7-12 18,0 1 0,0-1 1,1 0-1,0 1 0,0 0 0,0 1-18,1-5 25,1 1-1,0-1 0,0 0 0,1 0 0,-1 1 1,0-1-1,1 0 0,0 0 0,0 0 0,0 0 0,0 0 1,1 0-1,-1 0 0,2 2-24,0 0 18,1 0 0,-1-1-1,1 0 1,0 0 0,0 0 0,0 0 0,1-1 0,-1 0-1,1 1 1,0-2 0,3 3-18,14 5 22,-1-1 1,6 1-23,-7-3-17,-15-5 37,-1-1 0,1 0 0,0 0 0,-1 0-1,1-1 1,0 1 0,0-1 0,-1 0 0,1-1 0,0 1 0,0-1 0,-1 0 0,1 0-1,-1 0 1,3-2-20,5-2 197,0 0-1,-1-1 0,0 0 1,0-1-1,0-1-196,-6 4 67,-1 0 0,0 0 0,0-1 0,0 1 0,0-1 0,-1 0 0,0 0-1,0 0 1,0-1 0,-1 1 0,2-4-67,1-6 194,0 0 0,-1 0-1,2-12-193,-5 20 152,0 0-1,0 0 0,-1 0 1,0-1-1,0 1 1,-1 0-1,0 0 0,0 0 1,-1 0-1,0 0 1,0 0-1,0 0 0,-4-6-151,4 10 82,0-1-1,0 1 1,-1 0-1,1-1 1,-1 1-1,0 0 1,0 0-1,0 1 1,0-1-1,0 0 1,-1 1-1,1 0 1,-1 0-1,0 0 1,1 0-1,-1 1 1,0 0-1,0-1 1,0 1-1,0 1 1,0-1-1,0 0 0,0 1 1,-1 0-1,1 0-81,-7 1 33,0 0-1,0 1 0,0 0 0,0 1 1,0 0-1,0 0 0,-9 6-32,-3 1-1513,1 2-1,0 0 1,-2 4 1513,-13 10-2421</inkml:trace>
 </inkml:ink>
 </file>
 
@@ -3666,7 +3666,7 @@
   </inkml:definitions>
   <inkml:trace contextRef="#ctx0" brushRef="#br0">29 1433 3968,'-1'0'115,"0"0"0,1 0 0,-1 0 0,0-1 0,1 1 0,-1 0 0,1 0 0,-1-1 0,1 1 1,-1 0-1,1-1 0,-1 1 0,1 0 0,-1-1 0,1 1 0,-1-1 0,1 1 0,-1-1-115,1 0 13,0 1 0,0 0 0,0 0 0,-1 0 0,1-1-1,0 1 1,0 0 0,0 0 0,0 0 0,0-1 0,0 1 0,0 0 0,0 0-1,0-1 1,0 1 0,0 0 0,0 0 0,0 0 0,0-1 0,0 1 0,0 0 0,0 0-1,0-1 1,0 1 0,0 0 0,0 0 0,0 0 0,1-1 0,-1 1 0,0 0 0,0 0-1,0 0 1,0-1 0,0 1 0,1 0 0,-1 0 0,0 0 0,0 0 0,0-1 0,1 1-1,-1 0 1,0 0 0,0 0 0,0 0 0,1 0 0,-1 0 0,0 0 0,0 0-1,1 0 1,-1 0 0,0 0 0,0 0-13,4-1 5,1 0 70,-1 0 0,1 0 1,-1 0-1,1-1 0,-1 1 0,0-1 0,1 0 0,-1-1 0,0 1 0,0-1 1,-1 1-1,4-4-75,-4 2 182,-1 0 1,0 0 0,0 0 0,0 0-1,-1-1 1,1 1 0,-1 0-1,0-1 1,0 1 0,-1-1 0,0 1-1,1-1 1,-1-2-183,2-21 526,-1 18-342,0 0-1,-1 0 0,-1 0 1,1 0-1,-2-1 1,0-5-184,-4-25 179,0-15 269,-7-18-448,3 14 235,-4-16 84,5 28-196,2 0 0,0-16-123,-8-196 91,8 200-149,4 45 32,1 0 0,1 0 0,0 0 0,1 0 0,1-1 0,2-14 26,-1 25-2,0 0 0,0 0 1,0 0-1,1 1 0,-1-1 0,1 1 0,1-1 0,-1 1 0,0 0 0,1 0 0,0 0 0,0 1 0,0-1 0,2 0 2,13-10-41,1 1 0,13-6 41,-22 12-61,56-29 77,1 4 0,60-21-16,-97 44-236,0 2-1,0 1 1,0 1 0,1 2 0,12 1 236,51-7-729,62-14-1447,-118 12 1446</inkml:trace>
   <inkml:trace contextRef="#ctx0" brushRef="#br0" timeOffset="383.258">140 789 5472,'14'0'2016,"-7"-9"-1536,5-3-160,6 5 192,8 2-352,11-6 416,14-6-320,-2 1-128,14-2-64,-5-3-64,12-7 0,-3 4-96,-4-3 64,-5-1-384,-2 7 192,-5 2-1216,-7-2 800,-6 3-3328</inkml:trace>
-  <inkml:trace contextRef="#ctx0" brushRef="#br0" timeOffset="1300.534">1368 768 3648,'-7'2'1458,"19"-4"-1002,-10 2-29,-2 0-118,-14 0 811,-7 1-714,1 0-1,0 2 0,0 0 1,0 2-1,-14 4-405,-3 4 195,0 1-1,-15 9-194,33-14 15,0 1 0,0 1-1,1 0 1,-10 9-15,26-18-2,0 0-1,1 0 1,-1 0 0,1 0 0,0 0-1,0 0 1,0 0 0,0 1-1,0-1 1,0 0 0,1 1-1,-1-1 1,1 1 0,0-1 0,-1 1-1,1-1 1,0 1 0,1-1-1,-1 0 1,0 1 0,1-1-1,0 2 3,-1-1 9,1 1 0,0-1 0,0 1-1,0-1 1,0 1 0,1-1-1,-1 0 1,1 1 0,0-1-1,0 0 1,0 0 0,1-1 0,-1 1-1,1 0 1,1 1-9,21 11 37,1 0-1,0-2 1,1-1 0,7 1-37,-23-8-8,8 4 4,0 1 1,-1 0 0,0 2-1,-1 0 1,0 1 0,-1 1-1,-1 0 1,9 11 3,-22-23 23,0-1 1,-1 1-1,1 0 0,-1 0 1,1 0-1,-1 0 0,0 0 1,0 0-1,0 0 0,0 0 1,0 0-1,-1 1 1,1-1-1,-1 0 0,1 1 1,-1-1-1,0 0 0,0 1 1,0-1-1,0 0 0,0 1 1,-1-1-1,1 1-23,-1-1 26,0 1 1,-1-1-1,1 0 1,0 0-1,-1 0 1,1 0-1,-1 0 1,0 0-1,0 0 1,1 0-1,-1 0 1,0-1-1,-1 1 1,1-1-1,0 0 1,0 0-1,-1 1 1,1-1-1,0-1 1,-1 1-1,-1 0-26,-51 23 821,44-18-704,1-1 0,-1 0-1,0-1 1,0 0-1,0-1 1,0 0 0,-4 0-117,1-2 119,-13 2 5,1 1 0,0 0-1,-10 5-123,20-5-247,1 0-1,-1-2 1,0 0-1,-9 0 248,0 0-1303,-1-1-2382</inkml:trace>
+  <inkml:trace contextRef="#ctx0" brushRef="#br0" timeOffset="1300.533">1368 768 3648,'-7'2'1458,"19"-4"-1002,-10 2-29,-2 0-118,-14 0 811,-7 1-714,1 0-1,0 2 0,0 0 1,0 2-1,-14 4-405,-3 4 195,0 1-1,-15 9-194,33-14 15,0 1 0,0 1-1,1 0 1,-10 9-15,26-18-2,0 0-1,1 0 1,-1 0 0,1 0 0,0 0-1,0 0 1,0 0 0,0 1-1,0-1 1,0 0 0,1 1-1,-1-1 1,1 1 0,0-1 0,-1 1-1,1-1 1,0 1 0,1-1-1,-1 0 1,0 1 0,1-1-1,0 2 3,-1-1 9,1 1 0,0-1 0,0 1-1,0-1 1,0 1 0,1-1-1,-1 0 1,1 1 0,0-1-1,0 0 1,0 0 0,1-1 0,-1 1-1,1 0 1,1 1-9,21 11 37,1 0-1,0-2 1,1-1 0,7 1-37,-23-8-8,8 4 4,0 1 1,-1 0 0,0 2-1,-1 0 1,0 1 0,-1 1-1,-1 0 1,9 11 3,-22-23 23,0-1 1,-1 1-1,1 0 0,-1 0 1,1 0-1,-1 0 0,0 0 1,0 0-1,0 0 0,0 0 1,0 0-1,-1 1 1,1-1-1,-1 0 0,1 1 1,-1-1-1,0 0 0,0 1 1,0-1-1,0 0 0,0 1 1,-1-1-1,1 1-23,-1-1 26,0 1 1,-1-1-1,1 0 1,0 0-1,-1 0 1,1 0-1,-1 0 1,0 0-1,0 0 1,1 0-1,-1 0 1,0-1-1,-1 1 1,1-1-1,0 0 1,0 0-1,-1 1 1,1-1-1,0-1 1,-1 1-1,-1 0-26,-51 23 821,44-18-704,1-1 0,-1 0-1,0-1 1,0 0-1,0-1 1,0 0 0,-4 0-117,1-2 119,-13 2 5,1 1 0,0 0-1,-10 5-123,20-5-247,1 0-1,-1-2 1,0 0-1,-9 0 248,0 0-1303,-1-1-2382</inkml:trace>
 </inkml:ink>
 </file>
 
@@ -3783,7 +3783,7 @@
     </inkml:brush>
   </inkml:definitions>
   <inkml:trace contextRef="#ctx0" brushRef="#br0">88 2232 4800,'-1'-1'132,"0"-1"1,-1 1-1,1 0 1,-1-1-1,0 1 1,1 0-1,-1 0 1,0 0-1,1 0 1,-1 0-1,0 1 1,0-1-1,0 0 1,0 1-1,0-1 1,-1 1-133,-12-3 797,13 2-734,-1-1 1,0 1-1,1 0 1,-1-1-1,1 0 0,0 0 1,-1 1-1,1-1 0,0-1 1,0 1-1,0 0 0,1 0 1,-1-1-1,0 1 0,1-1 1,0 1-1,-1-1 0,1 0 1,0 0-1,0 1 0,1-1 1,-1 0-1,1 0 1,-1 0-1,1 0 0,0 0 1,0 0-1,0 0 0,0 0 1,1 0-1,-1 0 0,1 1 1,0-3-64,6-8 185,0-1 1,0 2-1,1-1 1,1 1 0,0 0-186,1 0 21,2-2 62,0 0 1,-2-1 0,9-14-84,-1-1 161,2 1 0,0 1 0,2 1 0,1 1 0,2 1 0,9-8-161,37-28 79,61-38-79,-39 37 82,3 5 0,2 4-1,76-29-81,68-30 45,169-70 81,-328 149-99,66-25-49,17 2 22,470-145-149,-449 141 155,-53 15 36,3 5 1,52-4-43,572-79 117,-170 43-288,-217 33 156,71-5 190,299-9-276,-97 14 74,126 10 170,-268 17-248,-23 0 126,111-7 59,333 15-155,-667 24 56,-75-2 49,138 11-99,214 46 69,-330-36-90,200 34 249,-113-4-108,-2 13-1,90 44-50,-299-88 135,0 4 0,-2 3-1,-2 4 1,46 33-135,152 96 63,26 18 103,-179-110 224,26 8-390,-89-57 18,-34-17-1811,0 1 0,0 1 1793,-7 2-5264</inkml:trace>
-  <inkml:trace contextRef="#ctx0" brushRef="#br0" timeOffset="1220.554">14560 1006 3552,'-2'-3'234,"-8"-13"436,10 16-657,0-1-1,0 1 1,-1 0 0,1 0-1,0 0 1,0 0-1,0 0 1,0-1 0,0 1-1,0 0 1,0 0-1,0 0 1,-1-1 0,1 1-1,0 0 1,0 0 0,0 0-1,0-1 1,0 1-1,0 0 1,0 0 0,0 0-1,0-1 1,0 1-1,1 0 1,-1 0 0,0 0-1,0-1 1,0 1 0,0 0-1,0 0 1,0 0-1,0 0 1,0-1 0,0 1-1,1 0 1,-1 0-1,0 0 1,0 0 0,0-1-1,0 1 1,1 0 0,-1 0-1,0 0 1,0 0-1,0 0 1,0 0 0,1 0-1,-1 0 1,0 0-1,0 0 1,0 0 0,1 0-1,-1 0 1,0 0 0,0 0-13,-5-24 1599,3 21-1481,1-1-1,-1 0 0,0 1 0,1 0 0,-2-1 0,1 1 0,0 0 1,-1 0-1,1 0 0,-1 0-117,0 0 99,1 1 0,-1-1 0,1 0-1,0 0 1,0 0 0,0 0 0,1-1 0,-2-2-99,-9-29 1191,11 34-1143,1 0 1,-1-1-1,1 1 0,-1-1 0,0 1 0,0-1 1,0 1-1,1 0 0,-1 0 0,0-1 0,-1 1 1,1 0-1,0 0 0,0 0 0,0 0 0,-1 0 1,0 0-49,1 1 128,1 0-43,0 0 0,18 23 193,24 44-305,23 28 27,-17-37 75,-29-37-64,-1 1-1,-1 1 1,-1 0-1,0 4-10,-11-16 6,-1 1 0,0 1 0,-1-1 0,0 0 0,-1 1 0,-1 0 0,1 10-6,3 18-36,-5-36 47,1 0 1,0-1-1,-1 1 1,0 0-1,0 0 1,0-1 0,-1 1-1,1 0 1,-1-1-1,-1 1 1,1-1-1,-1 2-11,-43 67 352,41-68-266,-1-1-1,1 0 1,-1 0-1,0 0 0,0-1 1,-1 0-1,1 0 1,0 0-1,-1 0 1,0-1-1,0 0 0,0 0 1,0-1-1,0 1 1,-4-1-86,-16 2 395,-1-1 0,0-1 0,-2-1-395,7-1 131,-64 0 58,28-1-679,0 3 0,0 2 1,-28 6 489,-90 19-7765,-24-5 7765,142-18-2891</inkml:trace>
+  <inkml:trace contextRef="#ctx0" brushRef="#br0" timeOffset="1220.553">14560 1006 3552,'-2'-3'234,"-8"-13"436,10 16-657,0-1-1,0 1 1,-1 0 0,1 0-1,0 0 1,0 0-1,0 0 1,0-1 0,0 1-1,0 0 1,0 0-1,0 0 1,-1-1 0,1 1-1,0 0 1,0 0 0,0 0-1,0-1 1,0 1-1,0 0 1,0 0 0,0 0-1,0-1 1,0 1-1,1 0 1,-1 0 0,0 0-1,0-1 1,0 1 0,0 0-1,0 0 1,0 0-1,0 0 1,0-1 0,0 1-1,1 0 1,-1 0-1,0 0 1,0 0 0,0-1-1,0 1 1,1 0 0,-1 0-1,0 0 1,0 0-1,0 0 1,0 0 0,1 0-1,-1 0 1,0 0-1,0 0 1,0 0 0,1 0-1,-1 0 1,0 0 0,0 0-13,-5-24 1599,3 21-1481,1-1-1,-1 0 0,0 1 0,1 0 0,-2-1 0,1 1 0,0 0 1,-1 0-1,1 0 0,-1 0-117,0 0 99,1 1 0,-1-1 0,1 0-1,0 0 1,0 0 0,0 0 0,1-1 0,-2-2-99,-9-29 1191,11 34-1143,1 0 1,-1-1-1,1 1 0,-1-1 0,0 1 0,0-1 1,0 1-1,1 0 0,-1 0 0,0-1 0,-1 1 1,1 0-1,0 0 0,0 0 0,0 0 0,-1 0 1,0 0-49,1 1 128,1 0-43,0 0 0,18 23 193,24 44-305,23 28 27,-17-37 75,-29-37-64,-1 1-1,-1 1 1,-1 0-1,0 4-10,-11-16 6,-1 1 0,0 1 0,-1-1 0,0 0 0,-1 1 0,-1 0 0,1 10-6,3 18-36,-5-36 47,1 0 1,0-1-1,-1 1 1,0 0-1,0 0 1,0-1 0,-1 1-1,1 0 1,-1-1-1,-1 1 1,1-1-1,-1 2-11,-43 67 352,41-68-266,-1-1-1,1 0 1,-1 0-1,0 0 0,0-1 1,-1 0-1,1 0 1,0 0-1,-1 0 1,0-1-1,0 0 0,0 0 1,0-1-1,0 1 1,-4-1-86,-16 2 395,-1-1 0,0-1 0,-2-1-395,7-1 131,-64 0 58,28-1-679,0 3 0,0 2 1,-28 6 489,-90 19-7765,-24-5 7765,142-18-2891</inkml:trace>
 </inkml:ink>
 </file>
 
@@ -3879,7 +3879,7 @@
   <inkml:trace contextRef="#ctx0" brushRef="#br0" timeOffset="6142.709">1447 5355 3808,'523'-2'1712,"-428"4"-1605,222 10 831,397 27 801,970 45 74,-809-35-1813,-742-39-2032,79 19 2032,-143-17-661</inkml:trace>
   <inkml:trace contextRef="#ctx0" brushRef="#br0" timeOffset="6624.152">373 6855 3968,'507'9'2133,"556"32"646,-179-13-1179,94 6-351,-167-6-1005,94 21-511,-619-21-2389,-175-17-2010</inkml:trace>
   <inkml:trace contextRef="#ctx0" brushRef="#br0" timeOffset="16588.006">1140 2350 4160,'-7'-6'376,"-1"1"1,1-2-1,0 1 1,1-1-1,-2-2-376,-12-12 395,19 20-391,-1 0 0,0-1 0,1 1 0,-1 0 0,0 0 0,0 0 0,1 1 0,-1-1-1,0 0 1,0 1 0,0-1 0,0 1 0,0-1 0,0 1 0,0 0 0,0 0 0,0 0 0,0 0 0,0 0 0,0 1 0,0-1-1,0 0 1,0 1 0,0 0 0,0-1 0,0 1 0,0 0 0,1 0 0,-1 0 0,0 0 0,1 0 0,-1 1 0,0-1-1,0 2-3,0-2 17,0 1 0,0 0-1,0 0 1,0-1-1,1 1 1,-1 1 0,0-1-1,1 0 1,0 0-1,0 0 1,0 1 0,0-1-1,0 1 1,0-1-1,0 1 1,1-1 0,-1 1-1,1-1 1,0 1-1,-1 0 1,1-1-1,1 1 1,-1-1 0,0 1-1,1 0 1,-1-1-1,1 1-16,3 5 89,1 1-1,0-1 0,0 0 0,1 0 1,0-1-1,1 0 0,0 0 0,2 2-88,17 13 900,18 13-900,-37-30 92,1 0 1,-1 0 0,1 0-1,0-1 1,0-1 0,0 1-1,0-1 1,0-1 0,1 1-1,0-2 1,-1 1 0,1-1-1,0 0 1,0-1 0,-1 0-1,7-1-92,-2 1 57,-1-2 0,0 0 0,1 0-1,-1-1 1,0-1 0,0 0 0,-1 0 0,1-2-1,-1 1 1,0-1 0,0-1 0,-1 0 0,0 0-1,0-1 1,-1 0 0,0-1 0,1-1-57,-8 7 9,1-1 0,-1 1 0,-1 0 0,1-1 0,0 0 0,-1 1 0,0-1 0,1 0 0,-2 0 0,1 1 0,0-1 0,-1 0 0,0 0 0,0 0 0,0 0 0,0 0-1,0 0 1,-1 0 0,0 1 0,0-1 0,0 0 0,0 0 0,0 1 0,-1-1 0,0 1 0,0-1 0,0 1 0,0 0 0,0-1 0,-1 1 0,1 0 0,-1 1 0,0-1 0,0 0 0,-3-1-9,1 0-16,-1 0 0,0 1 0,0 0 0,-1 0 0,1 1 0,-1 0-1,1 0 1,-1 0 0,0 1 0,0 0 0,1 0 0,-1 0 0,0 1-1,0 0 1,0 1 0,0 0 0,0 0 0,1 0 0,-1 1 0,0-1-1,1 2 1,-1-1 0,1 1 0,0 0 0,0 0 0,0 1 0,0 0 0,1 0-1,-1 0 1,1 1 0,0-1 0,0 1 0,1 0 0,-1 1 0,1-1-1,0 1 1,1 0 0,0 0 0,-3 6 16,0 3-9,1 0 0,0 0-1,1 0 1,0 0 0,0 16 9,3-25 52,0 1 0,1 0 0,0-1 0,0 1 1,1 0-1,0-1 0,0 1 0,0 0 0,1-1 0,0 0 0,0 1 1,1-1-1,-1 0 0,1 0 0,1 0-52,-3-4 40,0-1 1,-1 0-1,1 0 1,0 0-1,0 0 1,0 0-1,0 0 1,0 0-1,0 0 1,0 0-1,0-1 1,1 1-1,-1 0 1,0-1-1,0 1 1,1-1-1,-1 1 1,0-1-1,1 0 0,-1 1 1,0-1-1,1 0 1,-1 0-1,0 0 1,1 0-1,0 0-40,0-1 39,1 0 0,-1 0-1,1 0 1,-1 0 0,0 0 0,1-1-1,-1 1 1,0-1 0,0 1-1,0-1 1,0 0 0,0 0 0,0 0-39,6-8 97,-1 0 0,0 0 1,0 0-1,-1-1 1,2-5-98,-5 8 13,1 1 1,-2-1-1,1 0 1,-1 0 0,0 0-1,-1 0 1,0-1-1,0 1 1,-1 0 0,0-1-1,-1 1 1,1 0 0,-1 0-1,-1 0 1,0-1-1,0 1 1,-2-5-14,1 7-31,0 0 1,0 0-1,-1 0 1,0 0-1,1 1 1,-2-1-1,1 1 0,-1 0 1,0 1-1,0-1 1,0 1-1,-1 0 1,1 0-1,-1 0 0,0 1 1,0 0-1,0 0 1,-1 0-1,1 1 1,-1 0-1,-3-1 31,2 2-49,-1-1 1,0 1-1,0 1 0,0 0 0,0 0 1,0 0-1,0 1 0,0 1 1,0 0-1,-2 0 49,7-1-12,0 0 1,1 0 0,-1 1-1,1-1 1,-1 1-1,1 0 1,0 0-1,0 0 1,-1 0-1,1 0 1,1 1-1,-1-1 1,0 1 0,1 0-1,-1 0 1,1 0-1,0 0 1,0 0-1,0 1 1,0-1-1,1 0 1,-1 1 0,1-1-1,0 1 1,0 3 11,0-4 1,1 1 0,0-1 0,0 0 0,0 1 0,0-1 0,1 0 0,0 1 0,-1-1 0,1 0 0,0 0 0,1 1 0,-1-1 0,0 0 0,1 0 0,0 0 1,0-1-1,0 1 0,0 0 0,0-1 0,0 1 0,1-1 0,-1 0 0,1 0 0,0 1-1,0-1 33,0 0 1,1 0-1,-1 0 1,0 0-1,1-1 0,0 1 1,-1-1-1,1 0 1,0 0-1,-1 0 0,1 0 1,0-1-1,0 0 1,0 1-1,0-1 0,0-1 1,-1 1-1,1-1 1,0 1-1,3-2-33,-2 0 40,-1 0 1,1 0 0,0 0-1,-1 0 1,0-1-1,1 0 1,-1 0-1,0 0 1,0 0 0,0-2-41,-2 4 2,-1-1 0,1 0 0,-1 0 0,0 1-1,0-1 1,0 0 0,1 0 0,-2-1 0,1 1 0,0 0 0,0 0 0,-1 0 0,1 0 0,-1-1 0,0 1 0,0 0 0,0-1 0,0 1 0,0 0 0,0 0 0,0-1 0,-1 1 0,1 0 0,-1-1-2,-1-2-8,0 0-1,0 0 1,0 0 0,0 0-1,-1 0 1,0 1 0,0-1-1,0 1 1,-1 0-1,1 0 1,-1 0 0,0 0-1,0 1 1,0-1 0,-1 1-1,1 0 1,-1 0 8,-9-3-69,-1-1 0,0 2 0,0 0 0,0 1 0,-4 0 69,15 3-9,-4-1-29,-1 0 0,1 1 0,-1 0-1,0 0 1,1 1 0,-1 0 0,0 1 0,-3 0 38,9 0-2,-1-1 0,0 1 1,1 0-1,0 0 0,-1 1 0,1-1 1,-1 1-1,1 0 0,0-1 1,0 1-1,0 1 0,0-1 1,1 0-1,-1 1 0,0-1 0,1 1 1,0 0-1,-1 0 0,1 0 1,1 0-1,-1 0 2,1-2 27,1 0 0,0 0 0,0 1 0,-1-1 0,1 0 0,0 0 0,0 0 0,0 0 0,0 0 0,0 1 0,0-1 0,1 0 0,-1 0 0,0 0 0,1 0 0,-1 0 0,0 0 0,1 0 0,0 0 0,-1 0 0,1 0 0,-1 0 0,1 0 0,0 0 0,0 0 0,-1 0 0,1-1 0,0 1 0,0 0 0,0 0 0,1 0-27,41 25-320,-18-12-1813,-12-2-3504</inkml:trace>
-  <inkml:trace contextRef="#ctx0" brushRef="#br0" timeOffset="17457.339">1152 4001 5056,'14'-17'927,"-1"-1"1,-1-1 0,0 0-1,-2-1 1,3-7-928,-8 15 316,0-1 0,-1 0 0,-1 0 0,0 0 0,-1-1 0,0 1 0,-1 0 0,0-1 0,-2-6-316,1 1 182,0 8-109,-1-1 0,0 1 0,0-1 0,-1 1 0,-1-4-73,2 13-5,0 0 0,0-1 1,1 1-1,-1 0 0,0 0 0,-1 0 0,1 0 0,0 0 0,-1 0 1,1 0-1,-1 0 0,1 0 0,-1 1 0,0-1 0,0 0 1,0 1-1,0 0 0,0-1 0,0 1 0,0 0 0,0 0 0,0 0 1,-1 1-1,1-1 0,0 0 0,-1 1 0,0 0 5,-2-1-12,0 1 0,0 0 0,0 0 0,0 1 0,0 0 0,0 0 0,0 0 0,1 0 0,-1 1 0,0 0 0,1 0 0,-1 0 0,1 0 0,-1 1 12,-2 2-20,0 0 0,0 0 0,0 1 0,1 0-1,0 0 1,0 1 0,0-1 0,-1 4 20,1-2-9,2-1 0,-1 1 0,1 0 1,0 0-1,1 0 0,0 1 0,0-1 1,1 3 8,0-6 8,2 0 0,-1 0 0,0 0 0,1 1 1,0-1-1,0 0 0,1 0 0,-1 0 0,1 0 0,0 0 1,1 0-1,-1 0 0,2 3-8,-1-6 28,-1 1 0,0 0 0,1-1 1,0 1-1,-1-1 0,1 1 0,0-1 0,0 0 0,1 0 1,-1 0-1,0 0 0,1 0 0,-1-1 0,1 1 0,0-1 1,-1 1-1,1-1 0,0 0 0,0 0 0,0 0 0,0 0 1,0-1-1,0 1 0,0-1 0,0 0 0,0 0 1,0 0-29,2 0 38,-1-1 0,0 1 1,0-1-1,1 0 0,-1-1 1,0 1-1,0 0 0,0-1 1,0 0-1,0 0 0,-1 0 1,1-1-1,-1 1 0,1-1 1,-1 0-1,0 0 0,0 0 1,1-2-39,3-4 41,-1-1 1,0 0-1,0 0 1,-1-1-1,-1 1 1,0-1-1,0 0 1,-1 0-1,-1-1 1,0 1 0,1-11-42,-1-16 5,-1 1 1,-2 0 0,-1-1-6,0 20 15,0 1 0,-1 0-1,-4-16-14,5 27-25,0 1-1,0-1 1,0 0 0,0 1-1,-1 0 1,0 0-1,0-1 1,-1 2-1,1-1 1,-1 0-1,0 1 1,-4-4 25,7 7-7,0 0-1,0 1 1,1-1 0,-1 1-1,0-1 1,0 1 0,0 0 0,0-1-1,0 1 1,0 0 0,0 0-1,0-1 1,0 1 0,0 0 0,1 0-1,-1 0 1,0 0 0,0 0 0,0 1-1,0-1 1,0 0 0,0 0-1,0 0 1,0 1 0,0-1 0,0 1-1,0-1 1,1 1 0,-1-1-1,0 1 1,0-1 0,0 1 0,1 0-1,-1-1 1,0 1 0,1 0-1,-1-1 1,1 1 0,-1 0 0,1 0-1,-1 0 8,-1 3-22,0-1-1,0 1 1,0-1-1,1 1 1,0 0-1,-1 0 1,1 0-1,1-1 1,-2 5 22,2 6 0,1 1 0,0-1 0,1 1 0,1-1 0,0 0 0,0 0 0,2 0 0,0-1 0,0 0 0,1 1 0,1-2 0,0 1 0,1-1 0,0 0 0,1-1 0,0 0 0,3 2 0,-8-9 33,0 0 0,0-1 1,0 1-1,1-1 1,0 0-1,-1-1 1,1 1-1,0-1 0,0 0 1,0 0-1,1-1 1,-1 1-1,0-1 1,1 0-1,-1-1 0,1 1 1,2-1-34,-3 0 21,-1-1 1,1 0-1,-1 0 1,1 0-1,-1 0 1,1-1-1,-1 1 0,0-1 1,0 0-1,1-1 1,-2 1-1,1-1 1,0 0-1,0 0 1,-1 0-1,0 0 1,1 0-1,-1-1 0,-1 1 1,2-3-22,1-2 1,-1 1 0,0-1-1,0 0 1,-1-1 0,0 1 0,-1 0 0,0-1-1,0 0 1,-1 1 0,0-1 0,0 0 0,-1 0 0,-1 0-1,1 0 1,-1 1 0,0-1 0,-1 0 0,0 1-1,-1-1 1,0 1 0,0 0 0,-1 0 0,1 0 0,-2 0-1,1 0 1,-3-1-1,5 6-15,-1 0 1,0 0-1,0 0 0,0 0 0,0 0 0,0 1 0,-1-1 0,1 1 1,-1 0-1,0 0 0,1 1 0,-1-1 0,0 1 0,0-1 0,0 1 1,0 0-1,-1 1 0,1-1 0,0 1 0,0 0 0,0 0 0,-3 0 15,2 1-26,0 0-1,0 0 1,0 0-1,0 1 1,0 0-1,1 0 0,-1 0 1,1 0-1,-1 1 1,1 0-1,0 0 0,0 0 1,0 0-1,0 1 1,1-1-1,-1 1 0,1 0 1,0 0 26,-3 5-9,1 0-1,0 0 1,0 1 0,1-1 0,0 1 0,1 0-1,0 0 1,0 0 0,1 1 0,1-1-1,-1 0 1,2 8 9,0 15-7,2 0-1,1-1 1,3 12 7,-5-37 88,1 0 1,-1-1 0,1 1-1,1-1 1,-1 1 0,1-1-1,0 0 1,1 0 0,-1 0-1,1 0 1,4 4-89,-7-9 39,1 0-1,-1 1 1,0-1 0,1 0-1,0 1 1,-1-1 0,1 0-1,0 0 1,0 0 0,-1-1-1,1 1 1,0 0-1,0-1 1,0 1 0,0-1-1,0 0 1,1 1-39,0-1 33,-1-1 1,0 1-1,0-1 1,1 1-1,-1-1 1,0 0-1,0 0 1,0 0-1,0 0 1,0 0-1,0-1 0,0 1 1,0 0-1,0-1 1,0 1-1,-1-1 1,1 0-1,0-1-33,3-3 40,-1-1 0,1 1 0,-2-1 0,1 0-1,-1-1 1,0 1 0,0 0 0,-1-1 0,0 1 0,0-1 0,-1 0-1,0 0 1,0 0 0,-1 0 0,0 1 0,-1-8-40,-2-11 46,0 0 0,-2 0 0,-1 1-1,-4-11-45,6 24-69,0 0-1,-1 1 0,-1-1 1,0 1-1,-4-6 70,7 12-219,0 0-1,-1 0 1,0 1-1,0-1 1,0 1 0,0 0-1,0 0 1,-1 1-1,0-1 1,0 1 0,0 0-1,-4-2 220,8 5-159,-1 0 0,0-1 0,1 1 0,-1 0 0,0 0-1,1 0 1,-1 0 0,1 0 0,-1 0 0,0 0 0,1 1 0,-1-1-1,1 0 1,-1 1 0,0-1 0,1 1 0,-1 0 0,1 0 0,0-1 0,-1 1-1,1 0 1,0 0 0,-1 0 0,1 1 0,0-1 0,0 0 0,0 0-1,0 1 1,0-1 0,0 0 0,0 1 159,-22 32-4821</inkml:trace>
+  <inkml:trace contextRef="#ctx0" brushRef="#br0" timeOffset="17457.338">1152 4001 5056,'14'-17'927,"-1"-1"1,-1-1 0,0 0-1,-2-1 1,3-7-928,-8 15 316,0-1 0,-1 0 0,-1 0 0,0 0 0,-1-1 0,0 1 0,-1 0 0,0-1 0,-2-6-316,1 1 182,0 8-109,-1-1 0,0 1 0,0-1 0,-1 1 0,-1-4-73,2 13-5,0 0 0,0-1 1,1 1-1,-1 0 0,0 0 0,-1 0 0,1 0 0,0 0 0,-1 0 1,1 0-1,-1 0 0,1 0 0,-1 1 0,0-1 0,0 0 1,0 1-1,0 0 0,0-1 0,0 1 0,0 0 0,0 0 0,0 0 1,-1 1-1,1-1 0,0 0 0,-1 1 0,0 0 5,-2-1-12,0 1 0,0 0 0,0 0 0,0 1 0,0 0 0,0 0 0,0 0 0,1 0 0,-1 1 0,0 0 0,1 0 0,-1 0 0,1 0 0,-1 1 12,-2 2-20,0 0 0,0 0 0,0 1 0,1 0-1,0 0 1,0 1 0,0-1 0,-1 4 20,1-2-9,2-1 0,-1 1 0,1 0 1,0 0-1,1 0 0,0 1 0,0-1 1,1 3 8,0-6 8,2 0 0,-1 0 0,0 0 0,1 1 1,0-1-1,0 0 0,1 0 0,-1 0 0,1 0 0,0 0 1,1 0-1,-1 0 0,2 3-8,-1-6 28,-1 1 0,0 0 0,1-1 1,0 1-1,-1-1 0,1 1 0,0-1 0,0 0 0,1 0 1,-1 0-1,0 0 0,1 0 0,-1-1 0,1 1 0,0-1 1,-1 1-1,1-1 0,0 0 0,0 0 0,0 0 0,0 0 1,0-1-1,0 1 0,0-1 0,0 0 0,0 0 1,0 0-29,2 0 38,-1-1 0,0 1 1,0-1-1,1 0 0,-1-1 1,0 1-1,0 0 0,0-1 1,0 0-1,0 0 0,-1 0 1,1-1-1,-1 1 0,1-1 1,-1 0-1,0 0 0,0 0 1,1-2-39,3-4 41,-1-1 1,0 0-1,0 0 1,-1-1-1,-1 1 1,0-1-1,0 0 1,-1 0-1,-1-1 1,0 1 0,1-11-42,-1-16 5,-1 1 1,-2 0 0,-1-1-6,0 20 15,0 1 0,-1 0-1,-4-16-14,5 27-25,0 1-1,0-1 1,0 0 0,0 1-1,-1 0 1,0 0-1,0-1 1,-1 2-1,1-1 1,-1 0-1,0 1 1,-4-4 25,7 7-7,0 0-1,0 1 1,1-1 0,-1 1-1,0-1 1,0 1 0,0 0 0,0-1-1,0 1 1,0 0 0,0 0-1,0-1 1,0 1 0,0 0 0,1 0-1,-1 0 1,0 0 0,0 0 0,0 1-1,0-1 1,0 0 0,0 0-1,0 0 1,0 1 0,0-1 0,0 1-1,0-1 1,1 1 0,-1-1-1,0 1 1,0-1 0,0 1 0,1 0-1,-1-1 1,0 1 0,1 0-1,-1-1 1,1 1 0,-1 0 0,1 0-1,-1 0 8,-1 3-22,0-1-1,0 1 1,0-1-1,1 1 1,0 0-1,-1 0 1,1 0-1,1-1 1,-2 5 22,2 6 0,1 1 0,0-1 0,1 1 0,1-1 0,0 0 0,0 0 0,2 0 0,0-1 0,0 0 0,1 1 0,1-2 0,0 1 0,1-1 0,0 0 0,1-1 0,0 0 0,3 2 0,-8-9 33,0 0 0,0-1 1,0 1-1,1-1 1,0 0-1,-1-1 1,1 1-1,0-1 0,0 0 1,0 0-1,1-1 1,-1 1-1,0-1 1,1 0-1,-1-1 0,1 1 1,2-1-34,-3 0 21,-1-1 1,1 0-1,-1 0 1,1 0-1,-1 0 1,1-1-1,-1 1 0,0-1 1,0 0-1,1-1 1,-2 1-1,1-1 1,0 0-1,0 0 1,-1 0-1,0 0 1,1 0-1,-1-1 0,-1 1 1,2-3-22,1-2 1,-1 1 0,0-1-1,0 0 1,-1-1 0,0 1 0,-1 0 0,0-1-1,0 0 1,-1 1 0,0-1 0,0 0 0,-1 0 0,-1 0-1,1 0 1,-1 1 0,0-1 0,-1 0 0,0 1-1,-1-1 1,0 1 0,0 0 0,-1 0 0,1 0 0,-2 0-1,1 0 1,-3-1-1,5 6-15,-1 0 1,0 0-1,0 0 0,0 0 0,0 0 0,0 1 0,-1-1 0,1 1 1,-1 0-1,0 0 0,1 1 0,-1-1 0,0 1 0,0-1 0,0 1 1,0 0-1,-1 1 0,1-1 0,0 1 0,0 0 0,0 0 0,-3 0 15,2 1-26,0 0-1,0 0 1,0 0-1,0 1 1,0 0-1,1 0 0,-1 0 1,1 0-1,-1 1 1,1 0-1,0 0 0,0 0 1,0 0-1,0 1 1,1-1-1,-1 1 0,1 0 1,0 0 26,-3 5-9,1 0-1,0 0 1,0 1 0,1-1 0,0 1 0,1 0-1,0 0 1,0 0 0,1 1 0,1-1-1,-1 0 1,2 8 9,0 15-7,2 0-1,1-1 1,3 12 7,-5-37 88,1 0 1,-1-1 0,1 1-1,1-1 1,-1 1 0,1-1-1,0 0 1,1 0 0,-1 0-1,1 0 1,4 4-89,-7-9 39,1 0-1,-1 1 1,0-1 0,1 0-1,0 1 1,-1-1 0,1 0-1,0 0 1,0 0 0,-1-1-1,1 1 1,0 0-1,0-1 1,0 1 0,0-1-1,0 0 1,1 1-39,0-1 33,-1-1 1,0 1-1,0-1 1,1 1-1,-1-1 1,0 0-1,0 0 1,0 0-1,0 0 1,0 0-1,0-1 0,0 1 1,0 0-1,0-1 1,0 1-1,-1-1 1,1 0-1,0-1-33,3-3 40,-1-1 0,1 1 0,-2-1 0,1 0-1,-1-1 1,0 1 0,0 0 0,-1-1 0,0 1 0,0-1 0,-1 0-1,0 0 1,0 0 0,-1 0 0,0 1 0,-1-8-40,-2-11 46,0 0 0,-2 0 0,-1 1-1,-4-11-45,6 24-69,0 0-1,-1 1 0,-1-1 1,0 1-1,-4-6 70,7 12-219,0 0-1,-1 0 1,0 1-1,0-1 1,0 1 0,0 0-1,0 0 1,-1 1-1,0-1 1,0 1 0,0 0-1,-4-2 220,8 5-159,-1 0 0,0-1 0,1 1 0,-1 0 0,0 0-1,1 0 1,-1 0 0,1 0 0,-1 0 0,0 0 0,1 1 0,-1-1-1,1 0 1,-1 1 0,0-1 0,1 1 0,-1 0 0,1 0 0,0-1 0,-1 1-1,1 0 1,0 0 0,-1 0 0,1 1 0,0-1 0,0 0 0,0 0-1,0 1 1,0-1 0,0 0 0,0 1 159,-22 32-4821</inkml:trace>
   <inkml:trace contextRef="#ctx0" brushRef="#br0" timeOffset="18204.618">1505 5081 5984,'-13'-36'1586,"1"-1"1,-1-5-1587,13 41 34,-4-20 446,-1 1 0,-2 0 0,0 0-1,-1 0 1,-5-8-480,11 23 62,-1 1 0,0-1-1,-1 1 1,1 0 0,-1-1 0,0 2 0,0-1-1,0 0 1,0 1 0,-4-3-62,4 4 5,1 1 1,-1-1-1,0 1 0,1 0 1,-1 0-1,0 0 0,0 0 1,0 0-1,1 1 0,-1 0 0,0 0 1,0 0-1,0 0 0,0 0 1,0 1-1,-1 0-5,-1 1-2,0 0 0,0 1-1,0 0 1,0 0 0,1 0 0,-1 0 0,1 1 0,0 0-1,0 0 1,0 1 0,1-1 0,0 1 0,-1 0 0,2 0-1,-1 0 1,0 1 0,1-1 0,-1 3 2,0-1 32,1 1 1,-1 0 0,1 0-1,0 0 1,1 0-1,0 0 1,0 0-1,1 1 1,0-1-1,0 1 1,1-1-1,0 1 1,1 5-33,-1-12 46,1 0 1,-1-1-1,0 1 1,1-1-1,-1 1 1,1-1-1,-1 0 1,1 1-1,0-1 1,0 1-1,0-1 1,0 0-1,-1 0 0,2 1 1,-1-1-1,0 0 1,0 0-1,0 0 1,0 0-1,1 0 1,-1-1-1,0 1 1,1 0-1,-1-1 1,1 1-1,-1 0 0,1-1 1,-1 0-1,1 1 1,-1-1-1,1 0 1,-1 0-1,1 0 1,-1 0-1,1 0 1,0 0-1,-1 0 1,1-1-1,-1 1 1,2-1-47,2 0 65,0-1 1,1 1 0,-1-1-1,0-1 1,-1 1 0,1-1-1,0 1 1,-1-1 0,1-1 0,-1 1-1,0-1-65,1-2 19,0-1-1,0 0 0,0 0 1,-1-1-1,0 1 0,-1-1 0,0 0 1,0 0-1,0 0 0,-1 0 1,0 0-1,-1-1 0,0 1 1,0-1-1,-1 1 0,0-1 1,-1-5-19,1 5 7,-1 1-1,0-1 1,-1 1 0,1 0 0,-1 0-1,-1 0 1,0 0 0,0 0 0,0 0-1,-1 1 1,0 0 0,-1 0 0,0 0 0,0 0-1,0 0 1,-1 1 0,-4-4-7,7 7-11,0 1 1,0 0-1,1 0 1,-1 1-1,0-1 1,0 1 0,-1-1-1,1 1 1,0 0-1,0 0 1,-1 0-1,1 1 1,0-1-1,-1 1 1,1 0-1,-1 0 1,1 0-1,0 0 1,-1 1-1,1-1 1,0 1-1,-1 0 1,1 0-1,0 0 1,0 0-1,0 1 1,0-1 0,0 1-1,0 0 1,0-1-1,0 2 1,1-1-1,-1 0 1,1 0-1,-1 2 11,-4 3-31,0 0 0,1 1 0,1 0 0,-1 0-1,1 1 1,1-1 0,0 1 0,0 0 0,0 0 0,1 1 0,0 3 31,0 0-3,0 0 0,2 1 0,0-1 0,0 0 0,1 0 0,1 8 3,0-14-1,0 0 1,1 0-1,0 0 0,0 0 0,0 0 1,1-1-1,-1 1 0,2-1 0,-1 0 0,1 0 1,0 0-1,4 5 1,-7-9 11,1 0 0,-1-1 1,1 1-1,-1-1 0,1 1 1,0-1-1,-1 1 0,1-1 1,0 0-1,0 0 0,0 0 0,0 0 1,0 0-1,0-1 0,0 1 1,0 0-1,1-1 0,-1 0 0,0 1 1,0-1-1,0 0 0,1 0 1,-1 0-1,0 0 0,0-1 0,0 1 1,1-1-1,-1 1 0,0-1 1,0 0-1,0 0 0,0 0 0,0 0 1,0 0-1,0 0 0,-1 0 1,1-1-1,1 0-11,1-2 21,1 0 0,-1-1 0,1 0 0,-1 0 1,-1 0-1,1 0 0,-1-1 0,0 0 0,0 1 0,0-1 0,-1 0 1,2-6-22,-1-2 22,-1 0 0,0 0 1,-1 0-1,-1 0 0,0 0 1,-1 0-1,-2-14-22,1 20-14,1 0 1,-1 0 0,0 0-1,-1 0 1,0 0-1,0 1 1,0-1-1,-1 1 1,0 0-1,-1 0 1,0 0-1,0 1 1,0-1 0,-1 1 13,4 4-12,-1 0 0,1 0 1,0 0-1,0 1 0,-1-1 1,1 1-1,-1-1 1,0 1-1,1 0 0,-1 0 1,0 0-1,1 1 0,-1-1 1,0 1-1,0-1 1,0 1-1,0 0 0,1 0 1,-2 0 11,0 1-12,0 0 0,1 0 1,-1 0-1,1 1 0,-1-1 1,1 1-1,0 0 0,-1 0 1,1 0-1,0 0 0,0 0 0,0 1 1,0 0 11,-4 4-19,1 0 0,0 0 1,0 1-1,1 0 0,0 0 0,1 0 1,-1 1-1,1 0 0,1-1 1,-2 9 18,2-7-1,1 0 1,1 0-1,0 0 1,0 0-1,1 1 1,1-1 0,-1 0-1,2 0 1,-1 1-1,1-1 1,1-1-1,1 6 1,-2-9 69,1 0 0,0 0 1,0-1-1,0 1 0,0-1 0,1 1 0,0-1 0,0 0 0,1 0 0,-1-1 0,1 1 0,0-1 0,0 0 0,0-1 0,1 1 0,0-1 0,-1 0 0,1 0 0,0-1 0,1 1-68,-2-2 18,-1 1 1,1-1 0,0 0-1,0-1 1,0 1 0,0-1 0,0 0-1,-1 0 1,1-1 0,0 1 0,0-1-1,0 0 1,0 0 0,-1-1 0,1 0-1,-1 1 1,1-1 0,-1-1 0,0 1-1,1-1 1,-1 0 0,-1 0 0,1 0-1,0 0 1,-1 0 0,1-1-1,-1 0 1,1-1-20,1-2-309,0 0-1,0-1 1,-1 1-1,0-1 0,0 0 1,-1 0-1,0 0 1,-1-1-1,1 1 1,-2-1-1,1 0 1,-1 1-1,0-1 0,-1 0 1,0-5 309,-6-30-6149</inkml:trace>
   <inkml:trace contextRef="#ctx0" brushRef="#br0" timeOffset="19094.834">1310 6239 6656,'1'-17'813,"-1"11"-572,0 1 0,1-1 0,0 1-1,0-1 1,0 1 0,0-1 0,1 1 0,0 0 0,1-2-241,14-48 1483,-17 55-1476,0 0 1,0-1 0,0 1-1,0-1 1,0 1 0,0 0-1,0-1 1,0 1 0,0-1-1,0 1 1,0-1 0,0 1 0,0 0-1,0-1 1,0 1 0,-1-1-1,1 1 1,0 0 0,0-1-1,0 1 1,-1 0 0,1-1-1,0 1 1,0 0 0,-1-1-1,1 1 1,0 0 0,-1 0-1,1-1 1,0 1 0,-1 0-1,1 0 1,0-1 0,-1 1-1,1 0 1,-1 0 0,1 0 0,0 0-1,-1 0 1,1 0 0,-1 0-1,1 0 1,0 0 0,-1 0-1,1 0 1,-1 0 0,1 0-1,0 0 1,-1 0 0,1 0-1,-1 0 1,1 0-8,-24 7 91,3 6 1,1 1 0,0 1 0,1 1-1,0 1 1,-14 18-92,24-26 37,2 0 0,-1 1 1,2 0-1,-1 0 0,1 1 0,1 0 0,0 0-37,3-8 29,1 1-1,0-1 1,0 1 0,0-1-1,1 1 1,-1-1-1,1 1 1,0-1 0,0 1-1,0 0 1,1 3-29,0-5 38,-1 0 0,1 0 0,0 0 1,0 0-1,0 0 0,0 0 0,0 0 0,0-1 1,0 1-1,1 0 0,-1-1 0,1 1 0,-1 0 0,1-1 1,0 0-1,0 1 0,-1-1 0,1 0 0,0 0 1,1 0-39,-1 0 42,0-1 1,0 1-1,0-1 1,0 0-1,0 1 1,-1-1-1,1 0 1,0 0-1,0-1 1,0 1-1,0 0 1,0-1-1,0 1 1,0-1-1,0 1 1,-1-1-1,1 0 1,0 0-1,0 0 1,-1 0-1,1 0 1,-1 0-1,1-1 1,-1 1-1,1 0 1,-1-1-1,0 1 1,1-2-43,4-3 63,0-1-1,-1 0 1,0-1 0,0 0 0,3-7-63,-3 5 13,-2 0 0,1 0 0,-1 0 1,0-1-1,-1 1 0,-1-1 0,1 0 1,-2 1-1,1-1 0,-2-5-13,1 12-2,0 1-1,0-1 0,-1 1 0,1-1 0,-1 1 0,0-1 1,0 1-1,0-1 0,-1 1 0,1 0 0,-1-1 1,0 1-1,0 0 0,0 0 0,0 0 0,0 1 0,-1-1 1,1 0-1,-1 1 0,0 0 0,0 0 0,0-1 1,0 2-1,0-1 0,0 0 0,0 1 0,-1-1 0,1 1 1,0 0-1,-1 0 0,1 0 0,-3 0 3,1 1-14,0-1-1,1 1 0,-1 1 1,1-1-1,-1 0 1,1 1-1,-1 0 0,1 0 1,0 0-1,-1 1 1,1 0-1,0-1 0,0 2 1,0-1-1,0 0 1,0 1-1,0-1 0,1 1 1,0 0-1,-1 0 0,1 1 1,0-1-1,0 1 1,1-1-1,-1 1 0,-1 4 15,1-3-4,0 0-1,1 0 0,0 0 0,0 1 1,0-1-1,1 1 0,0-1 0,0 1 1,0 0-1,0-1 0,1 1 0,0 0 0,0 0 1,1-1-1,0 1 0,0 0 0,0-1 1,1 1-1,-1-1 0,1 1 0,1-1 5,0 2 8,1 0 0,0 0-1,0 0 1,1-1-1,0 0 1,0 0 0,1 0-1,-1-1 1,1 0 0,0 0-1,1 0 1,-1 0 0,1-1-1,0-1 1,5 3-8,-7-4 5,0-1 1,0 1-1,0-1 1,0 0-1,0-1 1,0 1-1,0-1 0,0 0 1,0 0-1,0-1 1,1 1-1,-1-1 1,0 0-1,0-1 1,-1 1-1,1-1 0,0 0 1,0 0-1,-1-1 1,1 1-1,-1-1 1,0 0-1,0 0 1,1-1-6,1-2 27,1 0 0,-2-1 0,1 1 1,-1-1-1,1 0 0,-2-1 1,1 1-1,-1-1 0,-1 0 1,1 0-1,-1 0 0,-1 0 0,1-1 1,-1 1-1,-1-1 0,0 1 1,0-1-1,0 0 0,-1 0-27,0 1 34,-1 1-1,1-1 0,-1 1 1,0-1-1,-1 1 1,0-1-1,0 1 0,-1 0 1,1 0-1,-2 0 1,1 0-1,-1 1 0,0-1 1,0 1-1,-1 0 0,1 0 1,-2 1-1,1-1 1,0 1-1,-1 0 0,0 0 1,-1 0-34,-1 0 43,-1 1 0,1 0 0,-1 0 0,0 0 0,0 1 0,0 0 1,0 1-1,-1 0 0,1 0 0,-5 1-43,10 1-6,1-1 0,-1 1 0,0 1 0,0-1-1,1 0 1,-1 1 0,0 0 0,1 0 0,-1 0 0,1 0 0,-1 1 0,1-1 0,0 1 0,-1 0 0,1 0-1,0 0 1,0 0 0,0 1 0,1-1 0,-1 1 0,0 0 0,1-1 0,0 1 0,0 0 0,0 1 0,0-1 0,-2 3 6,1 2-11,0-1 1,1 1 0,0 0-1,0 0 1,1 0 0,0 0-1,0 0 1,0 0 0,1 0-1,1 0 1,-1 0 0,1 0 0,1 0-1,-1 0 1,1 0 0,1 0-1,-1-1 1,3 5 10,-1-4-219,0 0 1,1 0-1,0 0 0,0 0 0,1-1 1,0 0-1,0 0 0,1-1 0,0 1 1,0-1-1,0-1 0,1 0 0,0 0 1,0 0-1,0-1 0,5 2 219,54 14-6026,-62-19 5578</inkml:trace>
   <inkml:trace contextRef="#ctx0" brushRef="#br0" timeOffset="20839.368">391 5388 480,'12'0'192,"-5"7"-160,12-7 0,-1 0 1472,8 4-832,11-4 704,14 7-800,17-7 256,15 5-480,6 0-192,11-5-96,0 7 0,7-3-32,7-4-32,18 0 32,-1 7-1184</inkml:trace>
@@ -3912,13 +3912,13 @@
   </inkml:definitions>
   <inkml:trace contextRef="#ctx0" brushRef="#br0">582 247 4064,'-1'0'48,"1"0"0,-1 0 0,0 0 1,0 0-1,0 0 0,1 0 0,-1-1 0,0 1 1,0 0-1,1-1 0,-1 1 0,0 0 0,1-1 0,-1 1 1,1-1-1,-1 1 0,0-1 0,1 1 0,-1-1 0,1 0 1,-1 1-1,1-1 0,0 0 0,-1 1 0,1-1 1,0 0-1,-1 1 0,1-1 0,0 0 0,0 0 0,-1 1 1,1-1-1,0 0 0,0 0-48,-4-16 490,0 15-322,0-1 1,0 1-1,0 0 0,-1 1 1,1-1-1,-1 1 0,-3-1-168,-2 2 109,-1 0 0,1 0 0,-1 1 0,1 0 0,0 1 0,0 0 0,-1 0 0,2 1 0,-6 2-109,11-3 38,-109 41 810,82-32-762,-1 2 0,2 2 0,0 0-1,-1 3-85,18-10-11,0 1-1,1 0 1,0 1-1,0 0 1,1 1-1,0 0 1,1 1 0,0 0-1,-7 13 12,14-17-3,-1-1 0,1 1 1,0 1-1,1-1 0,0 0 0,0 1 1,0-1-1,1 1 0,1-1 0,0 1 0,0-1 1,0 1-1,1 0 0,0-1 0,1 1 0,0-1 1,0 0-1,1 0 0,0 0 0,0 0 1,5 7 2,-1-1-24,1 0 1,1 0 0,0-1-1,1 0 1,0-1 0,1 0 0,1-1-1,-1 0 1,2 0 0,-1-2-1,5 3 24,-2-3-349,1-1 0,0-1-1,1 0 1,-1-1 0,1-1-1,10 2 350,41 6-3610</inkml:trace>
   <inkml:trace contextRef="#ctx0" brushRef="#br0" timeOffset="489.885">971 538 3552,'-5'0'83,"0"0"0,0 0 0,0 0 0,0 1 0,0-1 0,0 1 0,1 0 0,-1 1 0,0-1 0,1 1 0,-1 0 0,1 0 0,-1 0 0,1 1 0,0 0 0,0 0 0,0 0 0,1 0 0,-1 0 0,1 1 0,-1-1 0,1 1 0,0 0 0,1 0-1,-1 1-82,-16 27 9,10-18 1,0 0-1,1 1 0,1 0 0,0 0 0,2 0 0,-5 16-9,4-3 199,-7 35 362,12-58-523,1 0 0,0 0 0,0 0 0,0 0 0,0 0 1,1-1-1,0 1 0,0 0 0,0 0 0,0-1 0,2 2-38,-2-4 9,0 0 0,0-1 0,0 1 0,0-1 0,0 1 0,0-1 0,1 0 0,-1 1 0,1-1 0,-1 0-1,1 0 1,-1 0 0,1 0 0,0 0 0,-1 0 0,1-1 0,0 1 0,0 0 0,-1-1 0,1 0 0,0 1 0,0-1 0,0 0 0,0 0 0,0 0 0,0 0 0,0 0 0,-1 0-1,1-1 1,0 1 0,0-1 0,1 0-9,4-1 61,1 0-1,-1-1 1,0 0-1,0 0 1,0-1-1,0 0 0,1-1-60,-1-1 79,1 1 0,-1-2 0,-1 1 0,0-1 0,1 0 0,-2 0 0,1 0 0,-1-1 0,-1 0 0,1 0 0,-1 0 0,0-1 0,-1 1 0,0-1 0,-1 0-1,0 0 1,0 0 0,0-5-79,0-4-7,-1 0-1,-1-1 0,-1 1 1,0 0-1,-1 0 1,-2 0-1,1 0 0,-7-16 8,4 13-725,5 4-1920</inkml:trace>
-  <inkml:trace contextRef="#ctx0" brushRef="#br0" timeOffset="1102.893">1350 885 3392,'-1'0'30,"-23"4"1578,12-6-561,12 2-1025,0 0-1,0 0 1,-1 0 0,1 0 0,0 0-1,0-1 1,0 1 0,-1 0-1,1 0 1,0 0 0,0-1-1,0 1 1,0 0 0,0 0 0,0-1-1,-1 1 1,1 0 0,0 0-1,0-1 1,0 1 0,0 0-1,0 0 1,0-1 0,0 1-1,0 0 1,0 0 0,0-1 0,0 1-1,0 0 1,0 0 0,0-1-1,1 1 1,-1 0 0,0 0-1,0 0 1,0-1 0,0 1-22,11-30 566,-2 0-1,-1 0 1,4-30-566,6-23 324,-12 63-341,0 0-1,2 0 1,0 1 0,10-16 17,-18 34-1,0 1 0,0 0 1,1 0-1,-1 0 0,0 0 0,0-1 1,0 1-1,0 0 0,0 0 1,1 0-1,-1 0 0,0 0 0,0 0 1,0-1-1,0 1 0,1 0 1,-1 0-1,0 0 0,0 0 0,0 0 1,1 0-1,-1 0 0,0 0 1,0 0-1,0 0 0,1 0 0,-1 0 1,0 0-1,0 0 0,0 0 0,1 0 1,-1 0-1,0 0 0,0 0 1,0 0-1,0 0 0,1 0 0,-1 1 1,0-1-1,0 0 0,0 0 1,0 0-1,1 0 0,-1 0 0,0 1 1,0-1 0,11 13-76,9 24-64,-18-32 133,6 11-21,1-1 0,0 0 0,1 0 0,5 4 28,-12-14 10,1-1 0,0 0 0,1 1 0,-1-1-1,1-1 1,0 1 0,-1-1 0,2 0 0,-1 0 0,0 0 0,1-1 0,-1 1 0,1-1-1,2 0-9,-5-2 10,-1 1 0,1-1-1,-1 0 1,1 0 0,-1-1-1,0 1 1,1 0 0,-1-1 0,1 0-1,-1 1 1,0-1 0,1 0-1,-1 0 1,0 0 0,0-1-1,0 1 1,0 0 0,0-1-1,0 0 1,1-1-10,5-5-13,0 0 0,-1-1 0,0 0 0,0-3 13,8-7 77,-5 5-32,-6 8-70,0 1-1,1-1 1,-1 1-1,1 0 1,1 0-1,-1 0 1,1 1 25,-5 3-128,0 2 127,0 0-1,0 1 1,-1-1 0,1 0 0,-1 1 0,1-1 0,-1 0-1,0 1 1,0-1 0,1 1 0,-1-1 0,0 1 0,0-1-1,0 1 1,0-1 0,-1 2 1,1-1-3,1 8 17,0-1-1,0 1 1,1-1-1,0 0 1,1 0-1,0 0 1,1 0-1,-1 0 1,2-1-14,3 8-894,1 0-1,0-1 1,1-1 0,6 6 894,-3-8-1440,4 0-571</inkml:trace>
+  <inkml:trace contextRef="#ctx0" brushRef="#br0" timeOffset="1102.892">1350 885 3392,'-1'0'30,"-23"4"1578,12-6-561,12 2-1025,0 0-1,0 0 1,-1 0 0,1 0 0,0 0-1,0-1 1,0 1 0,-1 0-1,1 0 1,0 0 0,0-1-1,0 1 1,0 0 0,0 0 0,0-1-1,-1 1 1,1 0 0,0 0-1,0-1 1,0 1 0,0 0-1,0 0 1,0-1 0,0 1-1,0 0 1,0 0 0,0-1 0,0 1-1,0 0 1,0 0 0,0-1-1,1 1 1,-1 0 0,0 0-1,0 0 1,0-1 0,0 1-22,11-30 566,-2 0-1,-1 0 1,4-30-566,6-23 324,-12 63-341,0 0-1,2 0 1,0 1 0,10-16 17,-18 34-1,0 1 0,0 0 1,1 0-1,-1 0 0,0 0 0,0-1 1,0 1-1,0 0 0,0 0 1,1 0-1,-1 0 0,0 0 0,0 0 1,0-1-1,0 1 0,1 0 1,-1 0-1,0 0 0,0 0 0,0 0 1,1 0-1,-1 0 0,0 0 1,0 0-1,0 0 0,1 0 0,-1 0 1,0 0-1,0 0 0,0 0 0,1 0 1,-1 0-1,0 0 0,0 0 1,0 0-1,0 0 0,1 0 0,-1 1 1,0-1-1,0 0 0,0 0 1,0 0-1,1 0 0,-1 0 0,0 1 1,0-1 0,11 13-76,9 24-64,-18-32 133,6 11-21,1-1 0,0 0 0,1 0 0,5 4 28,-12-14 10,1-1 0,0 0 0,1 1 0,-1-1-1,1-1 1,0 1 0,-1-1 0,2 0 0,-1 0 0,0 0 0,1-1 0,-1 1 0,1-1-1,2 0-9,-5-2 10,-1 1 0,1-1-1,-1 0 1,1 0 0,-1-1-1,0 1 1,1 0 0,-1-1 0,1 0-1,-1 1 1,0-1 0,1 0-1,-1 0 1,0 0 0,0-1-1,0 1 1,0 0 0,0-1-1,0 0 1,1-1-10,5-5-13,0 0 0,-1-1 0,0 0 0,0-3 13,8-7 77,-5 5-32,-6 8-70,0 1-1,1-1 1,-1 1-1,1 0 1,1 0-1,-1 0 1,1 1 25,-5 3-128,0 2 127,0 0-1,0 1 1,-1-1 0,1 0 0,-1 1 0,1-1 0,-1 0-1,0 1 1,0-1 0,1 1 0,-1-1 0,0 1 0,0-1-1,0 1 1,0-1 0,-1 2 1,1-1-3,1 8 17,0-1-1,0 1 1,1-1-1,0 0 1,1 0-1,0 0 1,1 0-1,-1 0 1,2-1-14,3 8-894,1 0-1,0-1 1,1-1 0,6 6 894,-3-8-1440,4 0-571</inkml:trace>
   <inkml:trace contextRef="#ctx0" brushRef="#br0" timeOffset="1647.317">2231 582 3328,'-1'0'59,"0"0"0,-1 0 1,1 0-1,0 0 0,-1 0 0,1 0 0,0 1 1,-1-1-1,1 0 0,0 1 0,0-1 1,-1 0-1,1 1 0,0 0 0,0-1 0,0 1 1,0 0-1,0 0 0,0-1 0,0 1 0,0 0 1,0 0-1,0 0 0,0 0 0,0 0 1,1 0-1,-1 1 0,0-1 0,1 0 0,-1 0 1,1 0-1,-1 1 0,1-1-59,-5 11 123,0 0 1,1 0-1,-1 7-123,0-4 257,-15 61 193,2 0-1,1 26-449,-3 9 445,4-21-232,1 27-213,14-43 1430,3-177-1346,4 0 0,5 0 1,5 2-1,4 0 0,7-11-84,-25 103-24,8-25-54,0-1 0,7-9 78,-13 35-19,0 0 0,1 0-1,0 0 1,0 1-1,1 0 1,0 0 0,1 0-1,0 1 1,0 0 0,5-4 19,-9 9-6,1-1 1,-1 1 0,1-1 0,-1 1-1,1 0 1,0 1 0,0-1-1,0 1 1,0-1 0,0 1 0,0 1-1,1-1 1,-1 0 0,0 1-1,0 0 1,1 0 0,-1 0 0,0 1-1,0-1 1,0 1 0,1 0-1,-1 0 1,0 1 0,0-1 0,0 1-1,-1 0 1,1 0 0,1 1 5,0 0-6,1 2 1,-1-1-1,0 1 1,0-1 0,0 1-1,-1 1 1,0-1-1,0 1 1,0-1 0,-1 1-1,0 0 1,0 1-1,0-1 1,-1 0 0,0 1-1,0-1 1,0 5 5,0-4 22,-1 1 1,-1 0-1,0 0 1,0 0-1,0 0 1,-1 0 0,0 0-1,0-1 1,-1 1-1,0 0 1,0-1-1,-1 1 1,-1 0-23,-1 3 81,-1 0 0,0-1 1,-1 0-1,0-1 1,-1 1-1,0-1 0,0-1 1,-4 3-82,-12 9 168,0-2 0,-2-1 0,0-1 0,-1-1 0,0-1 0,-15 4-168,30-13 24,3 0-32,-1-1-1,0 0 1,-1 0 0,1-1-1,-1-1 1,1 1-1,-1-2 1,-1 0 8,10-1-97,0 0 0,0 0 0,1-1 0,-1 1 0,0 0 0,1-1 0,-1 0 0,0 1-1,1-1 1,-1 0 0,1 0 0,-1 0 0,1 0 0,0 0 0,-1 0 0,1 0 0,0-1 0,0 1 0,0 0 0,0-1 0,0 1 0,0-1 0,0 1-1,0-1 1,1 1 0,-1-1 0,1 0 0,-1 1 0,1-1 0,-1 0 0,1 0 0,0 1 0,0-1 0,0 0 0,0-1 97,-1-24-3760</inkml:trace>
   <inkml:trace contextRef="#ctx0" brushRef="#br0" timeOffset="2086.406">2722 6 4384,'0'-1'44,"0"1"-1,0 0 1,0 0 0,0-1-1,0 1 1,-1 0 0,1 0-1,0-1 1,0 1 0,0 0-1,0 0 1,0 0 0,-1-1 0,1 1-1,0 0 1,0 0 0,0 0-1,-1 0 1,1-1 0,0 1-1,0 0 1,0 0 0,-1 0-1,1 0 1,0 0 0,0 0 0,-1 0-1,1 0 1,0 0 0,0 0-1,-1 0 1,1 0 0,0 0-1,0 0 1,-1 0 0,1 0-1,0 0 1,0 0 0,-1 0 0,1 0-1,0 0 1,0 0 0,-1 0-1,1 0 1,0 1 0,0-1-1,0 0 1,-1 0 0,1 0-1,0 0 1,0 1 0,-1-1-44,4 44 810,-5-30-589,1 0 0,1 0 0,0 1 0,2 4-221,0 29 338,-8 94 1140,-23 123-1478,21-194 42,-18 175 214,26-235-505,-1-1 0,2 1 0,-1-1 0,2 1 0,-1-1 0,2 4 249,4 10-874</inkml:trace>
   <inkml:trace contextRef="#ctx0" brushRef="#br0" timeOffset="2485.368">2878 738 3488,'1'4'154,"1"0"-1,0 0 1,0 0 0,1-1 0,-1 1 0,1-1-1,0 0 1,-1 0 0,1 0 0,1 0 0,-1 0-1,0 0 1,1-1 0,-1 0 0,1 0 0,0 0-1,0 0 1,0 0 0,0-1 0,2 1-154,-1 0 68,1-1 1,-1 0-1,0-1 0,0 1 1,1-1-1,-1 0 1,0 0-1,1-1 0,-1 1 1,0-1-1,0 0 1,1-1-1,-1 1 1,0-1-1,0 0 0,2-2-68,-6 4 7,0-1-1,0 0 1,0 1-1,1-1 1,-1 0-1,0 0 1,0 0-1,0 0 0,-1 0 1,1 0-1,0 0 1,0 0-1,0-1 1,-1 1-1,1 0 1,-1 0-1,1-1 0,-1 1 1,1 0-1,-1 0 1,0-1-1,0 1 1,1-1-1,-1 1 1,0 0-1,0-1 0,0 1 1,-1 0-1,1-1 1,0 1-1,0 0 1,-1-1-1,1 1 1,-1 0-1,1 0 0,-1-1 1,0 1-1,1 0 1,-1 0-1,0 0 1,0 0-1,0-1-6,-3-4 12,-1 1-1,1-1 1,-1 1 0,0 0-1,-1 1 1,1-1-1,-6-3-11,2 2 37,0 1-1,-1 0 1,1 0-1,-1 1 1,0 0-1,0 1 0,0 0 1,-1 0-1,-2 1-36,7 1-1,0 1-1,0 0 1,0 0 0,1 1-1,-1-1 1,0 1-1,0 1 1,1-1 0,-1 1-1,0 0 1,1 0-1,0 0 1,-1 1 0,1 0-1,0 0 1,1 0-1,-3 3 2,-6 5-3,1 0 0,1 2-1,0-1 1,1 1-1,0 1 1,1 0-1,0 0 1,2 1-1,-1 0 1,2 1-1,0-1 1,1 1 0,0 0-1,1 0 1,1 1-1,1-1 1,0 11 3,2-21 10,0 1 0,1-1 1,-1 0-1,1 0 0,1 0 0,-1 0 1,1-1-1,0 1 0,1 0 0,-1-1 1,1 1-1,0-1 0,0 0 0,1 0 1,-1 0-1,1 0 0,1 0-10,-2-2-43,1 0 0,0 0 1,0 0-1,0-1 0,0 1 0,0-1 0,0 0 0,1 0 1,-1 0-1,1-1 0,-1 0 0,1 1 0,0-2 0,-1 1 1,1 0-1,0-1 0,-1 0 0,1 0 0,0-1 0,0 1 1,-1-1-1,1 0 43,43-14-576</inkml:trace>
   <inkml:trace contextRef="#ctx0" brushRef="#br0" timeOffset="2866.995">3652 29 3968,'-7'2'225,"-1"0"-1,1 1 1,0 0 0,0 1 0,0-1 0,1 1-1,-1 0 1,-3 4-225,6-4 62,-1 1-1,1 0 1,0 0-1,0 0 1,1 0-1,0 1 1,-1-1-1,2 1 1,-1 0-1,1 0 0,0 1-61,-18 48 321,-6 13 595,3 2-1,3 1 0,-10 71-915,20-59 224,4 0 0,4 79-224,3-149-227,0 0 1,1 0-1,0 0 0,1-1 1,0 1-1,1 0 0,1-1 1,0 0-1,1 0 0,5 8 227,1-3-810</inkml:trace>
   <inkml:trace contextRef="#ctx0" brushRef="#br0" timeOffset="3242.011">3173 466 4384,'-54'5'2293,"52"-5"-1973,3 1-271,-1 0 0,1 0-1,-1 0 1,1 0 0,-1 0-1,1 0 1,0 0 0,-1 0-1,1 0 1,0-1 0,0 1 0,0 0-1,0 0 1,-1-1 0,1 1-1,0 0 1,0-1 0,0 1 0,1-1-49,21 11 530,-3-5-284,1 0 0,0-2 1,0 0-1,1-1 0,3-1-246,111 2 278,-120-4-278,55-3-1386,35-6 1386,-50 4-768</inkml:trace>
-  <inkml:trace contextRef="#ctx0" brushRef="#br0" timeOffset="3661.284">3615 762 3968,'-3'-3'1372,"8"4"-299,17 7 245,-9-3-991,3-2-139,0-1-1,-1-1 0,1 0 1,0-1-1,0-1 0,0 0 1,-1-1-1,5-1-187,35-6 230,15-5-230,-50 9 34,0-1 0,0-1 0,0-1 0,-1 0 0,1-2-34,-16 7 7,0 1 0,1-1-1,-1 0 1,-1 0 0,1 0 0,0 0 0,-1-1-1,1 1 1,-1-1 0,0 0 0,-1 0-1,2-3-6,-3 6-3,0-1 0,-1 0 0,1 1-1,-1-1 1,0 0 0,1 1-1,-1-1 1,0 0 0,0 0-1,0 1 1,0-1 0,-1 0 0,1 0-1,0 1 1,-1-1 0,1 0-1,-1 1 1,1-1 0,-1 0 0,0 1-1,0-1 1,0 1 0,0-1-1,0 1 1,0 0 0,0-1-1,0 1 1,-1 0 0,1 0 0,0 0-1,-1 0 1,1 0 0,-1 0-1,1 0 1,-1 0 0,0 0 3,-4-2-22,-1 0-1,1 0 1,-1 0 0,0 0 0,0 1 0,0 1 0,-1-1 0,1 1-1,0 0 1,0 1 0,-1-1 0,1 2 0,-1-1 0,-1 1 22,-15 3-20,0 0 1,1 2 0,-17 6 19,28-8 24,1 1 0,0 0 1,1 0-1,-1 1 0,1 0 0,0 1 1,1 0-1,-5 5-24,9-8-5,1 0 1,-1 0-1,1 0 1,1 1-1,-1 0 1,0 0-1,1 0 0,0 0 1,1 0-1,-1 1 1,1-1-1,0 1 1,0 0-1,0-1 0,1 1 1,0 0-1,0 0 1,1 0 4,0-2-31,0 0-1,1-1 1,-1 1 0,1 0 0,0-1 0,0 1-1,0-1 1,1 1 0,-1-1 0,1 0 0,0 0-1,0 1 1,0-1 0,0 0 0,0-1 0,1 1-1,0 0 1,-1-1 0,1 1 0,0-1 0,0 0-1,2 1 32,4 3-381,0-2-1,0 1 0,0-2 0,1 1 0,0-1 0,-1 0 0,8 0 382,33 8-3296</inkml:trace>
+  <inkml:trace contextRef="#ctx0" brushRef="#br0" timeOffset="3661.283">3615 762 3968,'-3'-3'1372,"8"4"-299,17 7 245,-9-3-991,3-2-139,0-1-1,-1-1 0,1 0 1,0-1-1,0-1 0,0 0 1,-1-1-1,5-1-187,35-6 230,15-5-230,-50 9 34,0-1 0,0-1 0,0-1 0,-1 0 0,1-2-34,-16 7 7,0 1 0,1-1-1,-1 0 1,-1 0 0,1 0 0,0 0 0,-1-1-1,1 1 1,-1-1 0,0 0 0,-1 0-1,2-3-6,-3 6-3,0-1 0,-1 0 0,1 1-1,-1-1 1,0 0 0,1 1-1,-1-1 1,0 0 0,0 0-1,0 1 1,0-1 0,-1 0 0,1 0-1,0 1 1,-1-1 0,1 0-1,-1 1 1,1-1 0,-1 0 0,0 1-1,0-1 1,0 1 0,0-1-1,0 1 1,0 0 0,0-1-1,0 1 1,-1 0 0,1 0 0,0 0-1,-1 0 1,1 0 0,-1 0-1,1 0 1,-1 0 0,0 0 3,-4-2-22,-1 0-1,1 0 1,-1 0 0,0 0 0,0 1 0,0 1 0,-1-1 0,1 1-1,0 0 1,0 1 0,-1-1 0,1 2 0,-1-1 0,-1 1 22,-15 3-20,0 0 1,1 2 0,-17 6 19,28-8 24,1 1 0,0 0 1,1 0-1,-1 1 0,1 0 0,0 1 1,1 0-1,-5 5-24,9-8-5,1 0 1,-1 0-1,1 0 1,1 1-1,-1 0 1,0 0-1,1 0 0,0 0 1,1 0-1,-1 1 1,1-1-1,0 1 1,0 0-1,0-1 0,1 1 1,0 0-1,0 0 1,1 0 4,0-2-31,0 0-1,1-1 1,-1 1 0,1 0 0,0-1 0,0 1-1,0-1 1,1 1 0,-1-1 0,1 0 0,0 0-1,0 1 1,0-1 0,0 0 0,0-1 0,1 1-1,0 0 1,-1-1 0,1 1 0,0-1 0,0 0-1,2 1 32,4 3-381,0-2-1,0 1 0,0-2 0,1 1 0,0-1 0,-1 0 0,8 0 382,33 8-3296</inkml:trace>
   <inkml:trace contextRef="#ctx0" brushRef="#br0" timeOffset="4078.421">4376 824 4736,'-1'-4'221,"0"-1"0,0 1 1,0-1-1,0 1 0,-1-1 0,1 1 0,-1 0 1,0-1-1,-1 1 0,-1-3-221,2 5 19,0 0 1,0 0-1,1 0 0,-1 1 0,0-1 1,-1 1-1,1-1 0,0 1 0,0 0 1,0-1-1,-1 1 0,1 0 0,-1 1 1,1-1-1,-1 0 0,1 1 0,-1-1 1,1 1-1,-1 0 0,-2 0-19,-8 1 20,-1 0 0,1 1 0,0 0 0,0 1 0,0 1 0,0 0 0,0 0 0,1 2 0,0-1 0,0 2 0,-10 6-20,13-7 5,0 1 1,0-1 0,1 2-1,0-1 1,0 1 0,1 0-1,0 0 1,0 1 0,1 0-1,0 0 1,0 1-1,1-1 1,1 1 0,-3 9-6,5-16 2,1 0 1,0 0-1,1 0 1,-1 0-1,0 1 1,1-1-1,0 0 1,0 0 0,0 1-1,0-1 1,0 0-1,1 0 1,-1 1-1,1-1 1,0 0-1,0 0 1,0 0-1,0 0 1,1 0-1,-1 0 1,1 0-1,0-1 1,0 1 0,0 0-1,0-1 1,0 0-1,1 1 1,-1-1-1,0 0 1,1 0-1,0 0 1,0-1-1,-1 1 1,1 0-1,0-1 1,0 0-1,0 0 1,1 0 0,-1 0-1,2 0-2,4 0 7,0 0-1,-1 0 1,1-1 0,0 0-1,0 0 1,0-1 0,0 0-1,5-2-6,14-4 11,0-1 0,1-2-11,-10 2 11,-1 0 0,0-2-1,0 0 1,-1-1 0,-1-1 0,1 0 0,-2-1 0,0-1 0,-1 0-1,0-1 1,-1-1 0,0 0 0,-1-2-11,14-21 19,-2-2-1,-1-1 1,-2-1 0,-2-1-1,-1-5-18,9-26-584,-4-2-1,-3 0 0,9-75 585,-27 139-49,0 0-10,0 1 0,-2-1 0,1-11 59,-1 21 2,-1 1 0,1-1 0,0 0 1,-1 1-1,0-1 0,1 1 0,-1-1 1,0 0-1,0 1 0,0 0 0,-1-1 1,1 1-1,-1 0 0,1 0 0,-1-1 0,0 1 1,1 1-1,-1-1 0,0 0 0,-1 0-2,1 1 29,0 0 0,0 0 0,1 1 0,-1-1 0,0 1 0,0-1 0,0 1 0,0 0 0,0 0 0,0 0 0,0 0 0,0 0-1,0 0 1,0 0 0,0 1 0,0-1 0,0 1 0,0-1 0,0 1 0,1 0 0,-1 0 0,0 0 0,0 0 0,1 0-1,-1 0-28,-7 5 162,1 0 0,0 1 0,0-1 0,0 3-162,0 0 78,0 0 1,1 1-1,0 0 0,1 1 0,0-1 1,0 1-1,2 0 0,-1 1 0,1-1 1,-1 6-79,-8 22 81,2-10-63,1 0 0,2 1-1,1 0 1,1 1 0,2 0 0,1 4-18,-8 176 301,11-160-590,3 0 0,2-1 0,3 9 289,6 8-3914</inkml:trace>
 </inkml:ink>
 </file>
@@ -4007,10 +4007,10 @@
   </inkml:definitions>
   <inkml:trace contextRef="#ctx0" brushRef="#br0">27 12 5312,'-26'-12'1952,"26"12"-1504,7 0-128,-7 0-800</inkml:trace>
   <inkml:trace contextRef="#ctx0" brushRef="#br0" timeOffset="1">127 247 160,'-5'11'64,"17"-11"-64</inkml:trace>
-  <inkml:trace contextRef="#ctx0" brushRef="#br0" timeOffset="364.283">145 656 4576,'-23'-7'1664,"35"2"-1280,6-2-96,-4 7-800,5-4 224,6 4-3072</inkml:trace>
-  <inkml:trace contextRef="#ctx0" brushRef="#br0" timeOffset="365.236">196 863 4992,'-11'-19'1824,"15"19"-1408,17 7-128,-2-7-2336</inkml:trace>
-  <inkml:trace contextRef="#ctx0" brushRef="#br0" timeOffset="366.236">71 1131 4640,'-26'4'1728,"26"3"-1344,7-7-96,5 5-672,2 2 160,4-3-3296</inkml:trace>
-  <inkml:trace contextRef="#ctx0" brushRef="#br0" timeOffset="793.44">127 1365 5312,'14'12'1952,"-14"-12"-1504,18 12-128,1-8 96,-1 8-288,8-12 32,4 5-96,3 2-416,-1 4 224,6-1-4416</inkml:trace>
+  <inkml:trace contextRef="#ctx0" brushRef="#br0" timeOffset="364.282">145 656 4576,'-23'-7'1664,"35"2"-1280,6-2-96,-4 7-800,5-4 224,6 4-3072</inkml:trace>
+  <inkml:trace contextRef="#ctx0" brushRef="#br0" timeOffset="365.235">196 863 4992,'-11'-19'1824,"15"19"-1408,17 7-128,-2-7-2336</inkml:trace>
+  <inkml:trace contextRef="#ctx0" brushRef="#br0" timeOffset="366.235">71 1131 4640,'-26'4'1728,"26"3"-1344,7-7-96,5 5-672,2 2 160,4-3-3296</inkml:trace>
+  <inkml:trace contextRef="#ctx0" brushRef="#br0" timeOffset="793.439">127 1365 5312,'14'12'1952,"-14"-12"-1504,18 12-128,1-8 96,-1 8-288,8-12 32,4 5-96,3 2-416,-1 4 224,6-1-4416</inkml:trace>
   <inkml:trace contextRef="#ctx0" brushRef="#br0" timeOffset="6934.844">278 1812 4800,'-5'-16'1792,"17"23"-1408,-5-7-96,-7 0-128,11 0-160,3 0-160</inkml:trace>
   <inkml:trace contextRef="#ctx0" brushRef="#br0" timeOffset="7416.262">248 1617 4480,'-38'-40'1664,"50"47"-1312,7-2-64,-12-10-2720</inkml:trace>
   <inkml:trace contextRef="#ctx0" brushRef="#br0" timeOffset="7806.186">166 426 3552,'5'0'1312,"2"-12"-992,-7 1-128,7 6-160,4 0-64,3-2-2848</inkml:trace>
@@ -4099,7 +4099,7 @@
           <a:p>
             <a:fld id="{CCB56696-2F6B-4E30-B43C-8E1933953DBB}" type="datetimeFigureOut">
               <a:rPr lang="en-US" smtClean="0"/>
-              <a:t>4/19/2019</a:t>
+              <a:t>4/26/2019</a:t>
             </a:fld>
             <a:endParaRPr lang="en-US"/>
           </a:p>
@@ -4494,6 +4494,19 @@
           <a:bodyPr/>
           <a:lstStyle/>
           <a:p>
+            <a:r>
+              <a:rPr lang="en-CA" dirty="0"/>
+              <a:t>The Orchestrator function provides at least once guarantee of execution and executes it in the order it supposed to happen.</a:t>
+            </a:r>
+          </a:p>
+          <a:p>
+            <a:endParaRPr lang="en-CA" dirty="0"/>
+          </a:p>
+          <a:p>
+            <a:r>
+              <a:rPr lang="en-CA" dirty="0"/>
+              <a:t>This is done through event sourcing.</a:t>
+            </a:r>
             <a:endParaRPr lang="en-US" dirty="0"/>
           </a:p>
         </p:txBody>
@@ -4580,8 +4593,9 @@
           <a:p>
             <a:r>
               <a:rPr lang="en-CA" dirty="0"/>
-              <a:t>This was scaffolded out  by the Visual Studio templates.</a:t>
-            </a:r>
+              <a:t>Behind the scenes Durable Functions is leveraging Azure Storage in the form of Blob Containers, Queues and Tables and this is all managed for you.</a:t>
+            </a:r>
+            <a:endParaRPr lang="en-US" dirty="0"/>
           </a:p>
         </p:txBody>
       </p:sp>
@@ -4602,7 +4616,7 @@
           <a:p>
             <a:fld id="{3A533CB5-E34A-4A6A-A777-087957A42D72}" type="slidenum">
               <a:rPr lang="en-US" smtClean="0"/>
-              <a:t>19</a:t>
+              <a:t>16</a:t>
             </a:fld>
             <a:endParaRPr lang="en-US"/>
           </a:p>
@@ -4611,7 +4625,7 @@
     </p:spTree>
     <p:extLst>
       <p:ext uri="{BB962C8B-B14F-4D97-AF65-F5344CB8AC3E}">
-        <p14:creationId xmlns:p14="http://schemas.microsoft.com/office/powerpoint/2010/main" val="2940616155"/>
+        <p14:creationId xmlns:p14="http://schemas.microsoft.com/office/powerpoint/2010/main" val="706136493"/>
       </p:ext>
     </p:extLst>
   </p:cSld>
@@ -4666,57 +4680,19 @@
           <a:lstStyle/>
           <a:p>
             <a:r>
-              <a:rPr lang="en-CA" b="0" dirty="0"/>
-              <a:t>Using this client, you start a new Orchestration function with the </a:t>
-            </a:r>
-            <a:r>
-              <a:rPr lang="en-CA" b="1" dirty="0" err="1"/>
-              <a:t>StartNewAsync</a:t>
-            </a:r>
-            <a:r>
-              <a:rPr lang="en-CA" b="1" dirty="0"/>
-              <a:t>(string, object)</a:t>
-            </a:r>
-            <a:r>
-              <a:rPr lang="en-CA" b="0" dirty="0"/>
-              <a:t> where the 1</a:t>
-            </a:r>
-            <a:r>
-              <a:rPr lang="en-CA" b="0" baseline="30000" dirty="0"/>
-              <a:t>st</a:t>
-            </a:r>
-            <a:r>
-              <a:rPr lang="en-CA" b="0" dirty="0"/>
-              <a:t> parameter is the name of the durable orchestrator function and the 2</a:t>
-            </a:r>
-            <a:r>
-              <a:rPr lang="en-CA" b="0" baseline="30000" dirty="0"/>
-              <a:t>nd</a:t>
-            </a:r>
-            <a:r>
-              <a:rPr lang="en-CA" b="0" dirty="0"/>
-              <a:t> parameter is the JSON-serializable input value which you would use to provide input data to the orchestrator.</a:t>
-            </a:r>
-          </a:p>
-          <a:p>
-            <a:endParaRPr lang="en-CA" b="0" dirty="0"/>
-          </a:p>
-          <a:p>
-            <a:r>
-              <a:rPr lang="en-CA" b="0" dirty="0"/>
-              <a:t>The second key thing to notice is that the orchestration client returns a </a:t>
-            </a:r>
-            <a:r>
-              <a:rPr lang="en-CA" b="1" dirty="0" err="1"/>
-              <a:t>CheckStatusResponse</a:t>
-            </a:r>
-            <a:r>
-              <a:rPr lang="en-CA" b="0" dirty="0"/>
-              <a:t> which contains a set of URLs for inspecting the status of an orchestration execution. The default endpoints you get back are:</a:t>
-            </a:r>
-          </a:p>
-          <a:p>
-            <a:endParaRPr lang="en-CA" b="0" dirty="0"/>
+              <a:rPr lang="en-CA" dirty="0"/>
+              <a:t>In the diagram I showed previously as each function was being called the state was being persisted. If you want to take a look use Azure Storage Explorer to see the event source history. </a:t>
+            </a:r>
+          </a:p>
+          <a:p>
+            <a:endParaRPr lang="en-CA" dirty="0"/>
+          </a:p>
+          <a:p>
+            <a:r>
+              <a:rPr lang="en-CA" dirty="0"/>
+              <a:t>This is what is used for replay which I will talk about shortly.</a:t>
+            </a:r>
+            <a:endParaRPr lang="en-US" dirty="0"/>
           </a:p>
         </p:txBody>
       </p:sp>
@@ -4737,7 +4713,7 @@
           <a:p>
             <a:fld id="{3A533CB5-E34A-4A6A-A777-087957A42D72}" type="slidenum">
               <a:rPr lang="en-US" smtClean="0"/>
-              <a:t>20</a:t>
+              <a:t>17</a:t>
             </a:fld>
             <a:endParaRPr lang="en-US"/>
           </a:p>
@@ -4746,7 +4722,7 @@
     </p:spTree>
     <p:extLst>
       <p:ext uri="{BB962C8B-B14F-4D97-AF65-F5344CB8AC3E}">
-        <p14:creationId xmlns:p14="http://schemas.microsoft.com/office/powerpoint/2010/main" val="2433931775"/>
+        <p14:creationId xmlns:p14="http://schemas.microsoft.com/office/powerpoint/2010/main" val="2427823364"/>
       </p:ext>
     </p:extLst>
   </p:cSld>
@@ -4801,83 +4777,10 @@
           <a:lstStyle/>
           <a:p>
             <a:r>
-              <a:rPr lang="en-US" sz="1200" b="0" i="0" u="none" strike="noStrike" kern="1200" dirty="0">
-                <a:solidFill>
-                  <a:schemeClr val="tx1"/>
-                </a:solidFill>
-                <a:effectLst/>
-                <a:latin typeface="+mn-lt"/>
-                <a:ea typeface="+mn-ea"/>
-                <a:cs typeface="+mn-cs"/>
-              </a:rPr>
-              <a:t>You will notice that the function is decorated with a </a:t>
-            </a:r>
-            <a:r>
-              <a:rPr lang="en-US" b="1" dirty="0" err="1"/>
-              <a:t>OrchestrationTrigger</a:t>
-            </a:r>
-            <a:r>
-              <a:rPr lang="en-US" sz="1200" b="0" i="0" u="none" strike="noStrike" kern="1200" dirty="0">
-                <a:solidFill>
-                  <a:schemeClr val="tx1"/>
-                </a:solidFill>
-                <a:effectLst/>
-                <a:latin typeface="+mn-lt"/>
-                <a:ea typeface="+mn-ea"/>
-                <a:cs typeface="+mn-cs"/>
-              </a:rPr>
-              <a:t> attribute which exposes the </a:t>
-            </a:r>
-            <a:r>
-              <a:rPr lang="en-US" b="1" dirty="0" err="1"/>
-              <a:t>DurableOrchestrationContext</a:t>
-            </a:r>
-            <a:r>
-              <a:rPr lang="en-US" sz="1200" b="0" i="0" u="none" strike="noStrike" kern="1200" dirty="0">
-                <a:solidFill>
-                  <a:schemeClr val="tx1"/>
-                </a:solidFill>
-                <a:effectLst/>
-                <a:latin typeface="+mn-lt"/>
-                <a:ea typeface="+mn-ea"/>
-                <a:cs typeface="+mn-cs"/>
-              </a:rPr>
-              <a:t> This context is what is used to invoke and interact with Activity functions.</a:t>
-            </a:r>
-          </a:p>
-          <a:p>
-            <a:endParaRPr lang="en-US" sz="1200" b="0" i="0" u="none" strike="noStrike" kern="1200" dirty="0">
-              <a:solidFill>
-                <a:schemeClr val="tx1"/>
-              </a:solidFill>
-              <a:effectLst/>
-              <a:latin typeface="+mn-lt"/>
-              <a:ea typeface="+mn-ea"/>
-              <a:cs typeface="+mn-cs"/>
-            </a:endParaRPr>
-          </a:p>
-          <a:p>
-            <a:r>
-              <a:rPr lang="en-US" sz="1200" b="0" i="0" u="none" strike="noStrike" kern="1200" dirty="0">
-                <a:solidFill>
-                  <a:schemeClr val="tx1"/>
-                </a:solidFill>
-                <a:effectLst/>
-                <a:latin typeface="+mn-lt"/>
-                <a:ea typeface="+mn-ea"/>
-                <a:cs typeface="+mn-cs"/>
-              </a:rPr>
-              <a:t>As mentioned above, orchestrator functions checkpoint their progress after each await. The above code therefore executes each Activity function in series, only progressing to the next function after the current invoked function returns. If you wanted to execute all of the above Activity functions in parallel, you would create a list of Task objects that represent the asynchronous operations and then call </a:t>
-            </a:r>
-            <a:r>
-              <a:rPr lang="en-US" dirty="0" err="1"/>
-              <a:t>Task.WhenAll</a:t>
-            </a:r>
-            <a:r>
-              <a:rPr lang="en-US" dirty="0"/>
-              <a:t>(List&lt;Task&lt;string&gt;)</a:t>
-            </a:r>
-            <a:endParaRPr lang="en-CA" dirty="0"/>
+              <a:rPr lang="en-CA" dirty="0"/>
+              <a:t>With Durable Functions we have new trigger bindings.</a:t>
+            </a:r>
+            <a:endParaRPr lang="en-US" dirty="0"/>
           </a:p>
         </p:txBody>
       </p:sp>
@@ -4898,7 +4801,7 @@
           <a:p>
             <a:fld id="{3A533CB5-E34A-4A6A-A777-087957A42D72}" type="slidenum">
               <a:rPr lang="en-US" smtClean="0"/>
-              <a:t>21</a:t>
+              <a:t>18</a:t>
             </a:fld>
             <a:endParaRPr lang="en-US"/>
           </a:p>
@@ -4907,7 +4810,7 @@
     </p:spTree>
     <p:extLst>
       <p:ext uri="{BB962C8B-B14F-4D97-AF65-F5344CB8AC3E}">
-        <p14:creationId xmlns:p14="http://schemas.microsoft.com/office/powerpoint/2010/main" val="3170714584"/>
+        <p14:creationId xmlns:p14="http://schemas.microsoft.com/office/powerpoint/2010/main" val="3077857915"/>
       </p:ext>
     </p:extLst>
   </p:cSld>
@@ -4962,59 +4865,9 @@
           <a:lstStyle/>
           <a:p>
             <a:r>
-              <a:rPr lang="en-US" sz="1200" b="0" i="0" u="none" strike="noStrike" kern="1200" dirty="0">
-                <a:solidFill>
-                  <a:schemeClr val="tx1"/>
-                </a:solidFill>
-                <a:effectLst/>
-                <a:latin typeface="+mn-lt"/>
-                <a:ea typeface="+mn-ea"/>
-                <a:cs typeface="+mn-cs"/>
-              </a:rPr>
-              <a:t>It performs some logic in a stateless way and returns a response to it’s parent orchestration function. </a:t>
-            </a:r>
-          </a:p>
-          <a:p>
-            <a:endParaRPr lang="en-US" sz="1200" b="0" i="0" u="none" strike="noStrike" kern="1200" dirty="0">
-              <a:solidFill>
-                <a:schemeClr val="tx1"/>
-              </a:solidFill>
-              <a:effectLst/>
-              <a:latin typeface="+mn-lt"/>
-              <a:ea typeface="+mn-ea"/>
-              <a:cs typeface="+mn-cs"/>
-            </a:endParaRPr>
-          </a:p>
-          <a:p>
-            <a:r>
-              <a:rPr lang="en-US" sz="1200" b="0" i="0" u="none" strike="noStrike" kern="1200" dirty="0">
-                <a:solidFill>
-                  <a:schemeClr val="tx1"/>
-                </a:solidFill>
-                <a:effectLst/>
-                <a:latin typeface="+mn-lt"/>
-                <a:ea typeface="+mn-ea"/>
-                <a:cs typeface="+mn-cs"/>
-              </a:rPr>
-              <a:t>You will notice that this function is decorated with an </a:t>
-            </a:r>
-            <a:r>
-              <a:rPr lang="en-US" b="1" dirty="0" err="1"/>
-              <a:t>ActivityTrigger</a:t>
-            </a:r>
-            <a:r>
-              <a:rPr lang="en-US" sz="1200" b="0" i="0" u="none" strike="noStrike" kern="1200" dirty="0">
-                <a:solidFill>
-                  <a:schemeClr val="tx1"/>
-                </a:solidFill>
-                <a:effectLst/>
-                <a:latin typeface="+mn-lt"/>
-                <a:ea typeface="+mn-ea"/>
-                <a:cs typeface="+mn-cs"/>
-              </a:rPr>
-              <a:t> attribute.</a:t>
-            </a:r>
-            <a:endParaRPr lang="en-CA" dirty="0"/>
+              <a:rPr lang="en-CA" dirty="0"/>
+              <a:t>This was scaffolded out  by the Visual Studio templates.</a:t>
+            </a:r>
           </a:p>
         </p:txBody>
       </p:sp>
@@ -5035,7 +4888,7 @@
           <a:p>
             <a:fld id="{3A533CB5-E34A-4A6A-A777-087957A42D72}" type="slidenum">
               <a:rPr lang="en-US" smtClean="0"/>
-              <a:t>22</a:t>
+              <a:t>19</a:t>
             </a:fld>
             <a:endParaRPr lang="en-US"/>
           </a:p>
@@ -5044,7 +4897,7 @@
     </p:spTree>
     <p:extLst>
       <p:ext uri="{BB962C8B-B14F-4D97-AF65-F5344CB8AC3E}">
-        <p14:creationId xmlns:p14="http://schemas.microsoft.com/office/powerpoint/2010/main" val="471522338"/>
+        <p14:creationId xmlns:p14="http://schemas.microsoft.com/office/powerpoint/2010/main" val="2940616155"/>
       </p:ext>
     </p:extLst>
   </p:cSld>
@@ -5098,7 +4951,112 @@
           <a:bodyPr/>
           <a:lstStyle/>
           <a:p>
-            <a:endParaRPr lang="en-CA" dirty="0"/>
+            <a:pPr marL="0" marR="0" lvl="0" indent="0" algn="l" defTabSz="914400" rtl="0" eaLnBrk="1" fontAlgn="auto" latinLnBrk="0" hangingPunct="1">
+              <a:lnSpc>
+                <a:spcPct val="100000"/>
+              </a:lnSpc>
+              <a:spcBef>
+                <a:spcPts val="0"/>
+              </a:spcBef>
+              <a:spcAft>
+                <a:spcPts val="0"/>
+              </a:spcAft>
+              <a:buClrTx/>
+              <a:buSzTx/>
+              <a:buFontTx/>
+              <a:buNone/>
+              <a:tabLst/>
+              <a:defRPr/>
+            </a:pPr>
+            <a:r>
+              <a:rPr lang="en-CA" dirty="0"/>
+              <a:t>Notice the </a:t>
+            </a:r>
+            <a:r>
+              <a:rPr lang="en-CA" b="1" dirty="0" err="1"/>
+              <a:t>OrchestrationClient</a:t>
+            </a:r>
+            <a:r>
+              <a:rPr lang="en-CA" dirty="0"/>
+              <a:t> attribute.</a:t>
+            </a:r>
+          </a:p>
+          <a:p>
+            <a:endParaRPr lang="en-CA" b="0" dirty="0"/>
+          </a:p>
+          <a:p>
+            <a:r>
+              <a:rPr lang="en-CA" b="0" dirty="0"/>
+              <a:t>Using this client, you start a new Orchestration function with the </a:t>
+            </a:r>
+            <a:r>
+              <a:rPr lang="en-CA" b="1" dirty="0" err="1"/>
+              <a:t>StartNewAsync</a:t>
+            </a:r>
+            <a:r>
+              <a:rPr lang="en-CA" b="1" dirty="0"/>
+              <a:t>(string, object)</a:t>
+            </a:r>
+            <a:r>
+              <a:rPr lang="en-CA" b="0" dirty="0"/>
+              <a:t> where…</a:t>
+            </a:r>
+          </a:p>
+          <a:p>
+            <a:pPr marL="171450" indent="-171450">
+              <a:buFontTx/>
+              <a:buChar char="-"/>
+            </a:pPr>
+            <a:r>
+              <a:rPr lang="en-CA" b="0" dirty="0"/>
+              <a:t>1</a:t>
+            </a:r>
+            <a:r>
+              <a:rPr lang="en-CA" b="0" baseline="30000" dirty="0"/>
+              <a:t>st</a:t>
+            </a:r>
+            <a:r>
+              <a:rPr lang="en-CA" b="0" dirty="0"/>
+              <a:t> parameter is the name of the durable orchestrator function </a:t>
+            </a:r>
+          </a:p>
+          <a:p>
+            <a:pPr marL="171450" indent="-171450">
+              <a:buFontTx/>
+              <a:buChar char="-"/>
+            </a:pPr>
+            <a:r>
+              <a:rPr lang="en-CA" b="0" dirty="0"/>
+              <a:t>2</a:t>
+            </a:r>
+            <a:r>
+              <a:rPr lang="en-CA" b="0" baseline="30000" dirty="0"/>
+              <a:t>nd</a:t>
+            </a:r>
+            <a:r>
+              <a:rPr lang="en-CA" b="0" dirty="0"/>
+              <a:t> parameter is the JSON-serializable input value which you would use to provide input data to the orchestrator</a:t>
+            </a:r>
+          </a:p>
+          <a:p>
+            <a:endParaRPr lang="en-CA" b="0" dirty="0"/>
+          </a:p>
+          <a:p>
+            <a:r>
+              <a:rPr lang="en-CA" b="0" dirty="0"/>
+              <a:t>The second key thing to notice is that the orchestration client returns a </a:t>
+            </a:r>
+            <a:r>
+              <a:rPr lang="en-CA" b="1" dirty="0" err="1"/>
+              <a:t>CheckStatusResponse</a:t>
+            </a:r>
+            <a:r>
+              <a:rPr lang="en-CA" b="0" dirty="0"/>
+              <a:t> which contains a set of URLs for inspecting the status of an orchestration execution. The default endpoints you get back are: (GO TO NEXT SLIDE)</a:t>
+            </a:r>
+          </a:p>
+          <a:p>
+            <a:endParaRPr lang="en-CA" b="0" dirty="0"/>
           </a:p>
         </p:txBody>
       </p:sp>
@@ -5119,7 +5077,7 @@
           <a:p>
             <a:fld id="{3A533CB5-E34A-4A6A-A777-087957A42D72}" type="slidenum">
               <a:rPr lang="en-US" smtClean="0"/>
-              <a:t>23</a:t>
+              <a:t>20</a:t>
             </a:fld>
             <a:endParaRPr lang="en-US"/>
           </a:p>
@@ -5128,7 +5086,7 @@
     </p:spTree>
     <p:extLst>
       <p:ext uri="{BB962C8B-B14F-4D97-AF65-F5344CB8AC3E}">
-        <p14:creationId xmlns:p14="http://schemas.microsoft.com/office/powerpoint/2010/main" val="415977714"/>
+        <p14:creationId xmlns:p14="http://schemas.microsoft.com/office/powerpoint/2010/main" val="2433931775"/>
       </p:ext>
     </p:extLst>
   </p:cSld>
@@ -5182,7 +5140,44 @@
           <a:bodyPr/>
           <a:lstStyle/>
           <a:p>
-            <a:endParaRPr lang="en-CA" dirty="0"/>
+            <a:r>
+              <a:rPr lang="en-US" dirty="0" err="1"/>
+              <a:t>StatusQueryGetUri</a:t>
+            </a:r>
+            <a:r>
+              <a:rPr lang="en-US" dirty="0"/>
+              <a:t> - Get the status of a running orchestration instance.</a:t>
+            </a:r>
+          </a:p>
+          <a:p>
+            <a:r>
+              <a:rPr lang="en-US" dirty="0" err="1"/>
+              <a:t>SendEventPostUri</a:t>
+            </a:r>
+            <a:r>
+              <a:rPr lang="en-US" dirty="0"/>
+              <a:t> - Send an event notification to a running orchestration instance.</a:t>
+            </a:r>
+          </a:p>
+          <a:p>
+            <a:r>
+              <a:rPr lang="en-US" dirty="0" err="1"/>
+              <a:t>TerminatePostUri</a:t>
+            </a:r>
+            <a:r>
+              <a:rPr lang="en-US" dirty="0"/>
+              <a:t> - Terminate an instance of a running orchestration.</a:t>
+            </a:r>
+          </a:p>
+          <a:p>
+            <a:r>
+              <a:rPr lang="en-US" dirty="0" err="1"/>
+              <a:t>RewindPostUri</a:t>
+            </a:r>
+            <a:r>
+              <a:rPr lang="en-US" dirty="0"/>
+              <a:t> - Rewind a running orchestration instance to a replay events from a previous checkpoint.</a:t>
+            </a:r>
           </a:p>
         </p:txBody>
       </p:sp>
@@ -5203,7 +5198,7 @@
           <a:p>
             <a:fld id="{3A533CB5-E34A-4A6A-A777-087957A42D72}" type="slidenum">
               <a:rPr lang="en-US" smtClean="0"/>
-              <a:t>24</a:t>
+              <a:t>21</a:t>
             </a:fld>
             <a:endParaRPr lang="en-US"/>
           </a:p>
@@ -5212,7 +5207,7 @@
     </p:spTree>
     <p:extLst>
       <p:ext uri="{BB962C8B-B14F-4D97-AF65-F5344CB8AC3E}">
-        <p14:creationId xmlns:p14="http://schemas.microsoft.com/office/powerpoint/2010/main" val="4025231503"/>
+        <p14:creationId xmlns:p14="http://schemas.microsoft.com/office/powerpoint/2010/main" val="4092714585"/>
       </p:ext>
     </p:extLst>
   </p:cSld>
@@ -5267,43 +5262,136 @@
           <a:lstStyle/>
           <a:p>
             <a:r>
+              <a:rPr lang="en-US" sz="1200" b="0" i="0" u="none" strike="noStrike" kern="1200" dirty="0">
+                <a:solidFill>
+                  <a:schemeClr val="tx1"/>
+                </a:solidFill>
+                <a:effectLst/>
+                <a:latin typeface="+mn-lt"/>
+                <a:ea typeface="+mn-ea"/>
+                <a:cs typeface="+mn-cs"/>
+              </a:rPr>
+              <a:t>You will notice that the function is decorated with an </a:t>
+            </a:r>
+            <a:r>
+              <a:rPr lang="en-US" b="1" dirty="0" err="1"/>
+              <a:t>OrchestrationTrigger</a:t>
+            </a:r>
+            <a:r>
+              <a:rPr lang="en-US" sz="1200" b="0" i="0" u="none" strike="noStrike" kern="1200" dirty="0">
+                <a:solidFill>
+                  <a:schemeClr val="tx1"/>
+                </a:solidFill>
+                <a:effectLst/>
+                <a:latin typeface="+mn-lt"/>
+                <a:ea typeface="+mn-ea"/>
+                <a:cs typeface="+mn-cs"/>
+              </a:rPr>
+              <a:t> attribute which exposes the </a:t>
+            </a:r>
+            <a:r>
+              <a:rPr lang="en-US" b="1" dirty="0" err="1"/>
+              <a:t>DurableOrchestrationContext</a:t>
+            </a:r>
+            <a:r>
+              <a:rPr lang="en-US" b="0" dirty="0"/>
+              <a:t>.</a:t>
+            </a:r>
+            <a:r>
+              <a:rPr lang="en-US" sz="1200" b="0" i="0" u="none" strike="noStrike" kern="1200" dirty="0">
+                <a:solidFill>
+                  <a:schemeClr val="tx1"/>
+                </a:solidFill>
+                <a:effectLst/>
+                <a:latin typeface="+mn-lt"/>
+                <a:ea typeface="+mn-ea"/>
+                <a:cs typeface="+mn-cs"/>
+              </a:rPr>
+              <a:t> This context is what is used to invoke and interact with Activity functions.</a:t>
+            </a:r>
+          </a:p>
+          <a:p>
+            <a:endParaRPr lang="en-US" sz="1200" b="0" i="0" u="none" strike="noStrike" kern="1200" dirty="0">
+              <a:solidFill>
+                <a:schemeClr val="tx1"/>
+              </a:solidFill>
+              <a:effectLst/>
+              <a:latin typeface="+mn-lt"/>
+              <a:ea typeface="+mn-ea"/>
+              <a:cs typeface="+mn-cs"/>
+            </a:endParaRPr>
+          </a:p>
+          <a:p>
+            <a:r>
+              <a:rPr lang="en-US" sz="1200" b="0" i="0" u="none" strike="noStrike" kern="1200" dirty="0">
+                <a:solidFill>
+                  <a:schemeClr val="tx1"/>
+                </a:solidFill>
+                <a:effectLst/>
+                <a:latin typeface="+mn-lt"/>
+                <a:ea typeface="+mn-ea"/>
+                <a:cs typeface="+mn-cs"/>
+              </a:rPr>
+              <a:t>As mentioned above, orchestrator functions checkpoint their progress after each </a:t>
+            </a:r>
+            <a:r>
+              <a:rPr lang="en-US" sz="1200" b="1" i="0" u="none" strike="noStrike" kern="1200" dirty="0">
+                <a:solidFill>
+                  <a:schemeClr val="tx1"/>
+                </a:solidFill>
+                <a:effectLst/>
+                <a:latin typeface="+mn-lt"/>
+                <a:ea typeface="+mn-ea"/>
+                <a:cs typeface="+mn-cs"/>
+              </a:rPr>
+              <a:t>await</a:t>
+            </a:r>
+            <a:r>
+              <a:rPr lang="en-US" sz="1200" b="0" i="0" u="none" strike="noStrike" kern="1200" dirty="0">
+                <a:solidFill>
+                  <a:schemeClr val="tx1"/>
+                </a:solidFill>
+                <a:effectLst/>
+                <a:latin typeface="+mn-lt"/>
+                <a:ea typeface="+mn-ea"/>
+                <a:cs typeface="+mn-cs"/>
+              </a:rPr>
+              <a:t>. The above code therefore executes each Activity function in series, only progressing to the next function after the current invoked function returns. </a:t>
+            </a:r>
+          </a:p>
+          <a:p>
+            <a:endParaRPr lang="en-US" sz="1200" b="0" i="0" u="none" strike="noStrike" kern="1200" dirty="0">
+              <a:solidFill>
+                <a:schemeClr val="tx1"/>
+              </a:solidFill>
+              <a:effectLst/>
+              <a:latin typeface="+mn-lt"/>
+              <a:ea typeface="+mn-ea"/>
+              <a:cs typeface="+mn-cs"/>
+            </a:endParaRPr>
+          </a:p>
+          <a:p>
+            <a:r>
+              <a:rPr lang="en-US" sz="1200" b="0" i="0" u="none" strike="noStrike" kern="1200" dirty="0">
+                <a:solidFill>
+                  <a:schemeClr val="tx1"/>
+                </a:solidFill>
+                <a:effectLst/>
+                <a:latin typeface="+mn-lt"/>
+                <a:ea typeface="+mn-ea"/>
+                <a:cs typeface="+mn-cs"/>
+              </a:rPr>
+              <a:t>Extra info: If you wanted to execute all of the above Activity functions in parallel, you would create a list of Task objects that represent the asynchronous operations and then call </a:t>
+            </a:r>
+            <a:r>
               <a:rPr lang="en-US" dirty="0" err="1"/>
-              <a:t>StatusQueryGetUri</a:t>
+              <a:t>Task.WhenAll</a:t>
             </a:r>
             <a:r>
               <a:rPr lang="en-US" dirty="0"/>
-              <a:t> - Get the status of a running orchestration instance.</a:t>
-            </a:r>
-          </a:p>
-          <a:p>
-            <a:r>
-              <a:rPr lang="en-US" dirty="0" err="1"/>
-              <a:t>SendEventPostUri</a:t>
-            </a:r>
-            <a:r>
-              <a:rPr lang="en-US" dirty="0"/>
-              <a:t> - Send an event notification to a running orchestration instance.</a:t>
-            </a:r>
-          </a:p>
-          <a:p>
-            <a:r>
-              <a:rPr lang="en-US" dirty="0" err="1"/>
-              <a:t>TerminatePostUri</a:t>
-            </a:r>
-            <a:r>
-              <a:rPr lang="en-US" dirty="0"/>
-              <a:t> - Terminate an instance of a running orchestration.</a:t>
-            </a:r>
-          </a:p>
-          <a:p>
-            <a:r>
-              <a:rPr lang="en-US" dirty="0" err="1"/>
-              <a:t>RewindPostUri</a:t>
-            </a:r>
-            <a:r>
-              <a:rPr lang="en-US" dirty="0"/>
-              <a:t> - Rewind a running orchestration instance to a replay events from a previous checkpoint.</a:t>
-            </a:r>
+              <a:t>(List&lt;Task&lt;string&gt;)</a:t>
+            </a:r>
+            <a:endParaRPr lang="en-CA" dirty="0"/>
           </a:p>
         </p:txBody>
       </p:sp>
@@ -5324,7 +5412,7 @@
           <a:p>
             <a:fld id="{3A533CB5-E34A-4A6A-A777-087957A42D72}" type="slidenum">
               <a:rPr lang="en-US" smtClean="0"/>
-              <a:t>25</a:t>
+              <a:t>22</a:t>
             </a:fld>
             <a:endParaRPr lang="en-US"/>
           </a:p>
@@ -5333,7 +5421,7 @@
     </p:spTree>
     <p:extLst>
       <p:ext uri="{BB962C8B-B14F-4D97-AF65-F5344CB8AC3E}">
-        <p14:creationId xmlns:p14="http://schemas.microsoft.com/office/powerpoint/2010/main" val="4092714585"/>
+        <p14:creationId xmlns:p14="http://schemas.microsoft.com/office/powerpoint/2010/main" val="3170714584"/>
       </p:ext>
     </p:extLst>
   </p:cSld>
@@ -5387,6 +5475,407 @@
           <a:bodyPr/>
           <a:lstStyle/>
           <a:p>
+            <a:r>
+              <a:rPr lang="en-US" sz="1200" b="0" i="0" u="none" strike="noStrike" kern="1200" dirty="0">
+                <a:solidFill>
+                  <a:schemeClr val="tx1"/>
+                </a:solidFill>
+                <a:effectLst/>
+                <a:latin typeface="+mn-lt"/>
+                <a:ea typeface="+mn-ea"/>
+                <a:cs typeface="+mn-cs"/>
+              </a:rPr>
+              <a:t>It performs some logic in a stateless way and returns a response to it’s parent orchestration function. </a:t>
+            </a:r>
+          </a:p>
+          <a:p>
+            <a:endParaRPr lang="en-US" sz="1200" b="0" i="0" u="none" strike="noStrike" kern="1200" dirty="0">
+              <a:solidFill>
+                <a:schemeClr val="tx1"/>
+              </a:solidFill>
+              <a:effectLst/>
+              <a:latin typeface="+mn-lt"/>
+              <a:ea typeface="+mn-ea"/>
+              <a:cs typeface="+mn-cs"/>
+            </a:endParaRPr>
+          </a:p>
+          <a:p>
+            <a:r>
+              <a:rPr lang="en-US" sz="1200" b="0" i="0" u="none" strike="noStrike" kern="1200" dirty="0">
+                <a:solidFill>
+                  <a:schemeClr val="tx1"/>
+                </a:solidFill>
+                <a:effectLst/>
+                <a:latin typeface="+mn-lt"/>
+                <a:ea typeface="+mn-ea"/>
+                <a:cs typeface="+mn-cs"/>
+              </a:rPr>
+              <a:t>You will notice that this function is decorated with an </a:t>
+            </a:r>
+            <a:r>
+              <a:rPr lang="en-US" b="1" dirty="0" err="1"/>
+              <a:t>ActivityTrigger</a:t>
+            </a:r>
+            <a:r>
+              <a:rPr lang="en-US" sz="1200" b="0" i="0" u="none" strike="noStrike" kern="1200" dirty="0">
+                <a:solidFill>
+                  <a:schemeClr val="tx1"/>
+                </a:solidFill>
+                <a:effectLst/>
+                <a:latin typeface="+mn-lt"/>
+                <a:ea typeface="+mn-ea"/>
+                <a:cs typeface="+mn-cs"/>
+              </a:rPr>
+              <a:t> attribute.</a:t>
+            </a:r>
+            <a:endParaRPr lang="en-CA" dirty="0"/>
+          </a:p>
+        </p:txBody>
+      </p:sp>
+      <p:sp>
+        <p:nvSpPr>
+          <p:cNvPr id="4" name="Slide Number Placeholder 3"/>
+          <p:cNvSpPr>
+            <a:spLocks noGrp="1"/>
+          </p:cNvSpPr>
+          <p:nvPr>
+            <p:ph type="sldNum" sz="quarter" idx="5"/>
+          </p:nvPr>
+        </p:nvSpPr>
+        <p:spPr/>
+        <p:txBody>
+          <a:bodyPr/>
+          <a:lstStyle/>
+          <a:p>
+            <a:fld id="{3A533CB5-E34A-4A6A-A777-087957A42D72}" type="slidenum">
+              <a:rPr lang="en-US" smtClean="0"/>
+              <a:t>23</a:t>
+            </a:fld>
+            <a:endParaRPr lang="en-US"/>
+          </a:p>
+        </p:txBody>
+      </p:sp>
+    </p:spTree>
+    <p:extLst>
+      <p:ext uri="{BB962C8B-B14F-4D97-AF65-F5344CB8AC3E}">
+        <p14:creationId xmlns:p14="http://schemas.microsoft.com/office/powerpoint/2010/main" val="471522338"/>
+      </p:ext>
+    </p:extLst>
+  </p:cSld>
+  <p:clrMapOvr>
+    <a:masterClrMapping/>
+  </p:clrMapOvr>
+</p:notes>
+</file>
+
+<file path=ppt/notesSlides/notesSlide19.xml><?xml version="1.0" encoding="utf-8"?>
+<p:notes xmlns:a="http://schemas.openxmlformats.org/drawingml/2006/main" xmlns:r="http://schemas.openxmlformats.org/officeDocument/2006/relationships" xmlns:p="http://schemas.openxmlformats.org/presentationml/2006/main">
+  <p:cSld>
+    <p:spTree>
+      <p:nvGrpSpPr>
+        <p:cNvPr id="1" name=""/>
+        <p:cNvGrpSpPr/>
+        <p:nvPr/>
+      </p:nvGrpSpPr>
+      <p:grpSpPr>
+        <a:xfrm>
+          <a:off x="0" y="0"/>
+          <a:ext cx="0" cy="0"/>
+          <a:chOff x="0" y="0"/>
+          <a:chExt cx="0" cy="0"/>
+        </a:xfrm>
+      </p:grpSpPr>
+      <p:sp>
+        <p:nvSpPr>
+          <p:cNvPr id="2" name="Slide Image Placeholder 1"/>
+          <p:cNvSpPr>
+            <a:spLocks noGrp="1" noRot="1" noChangeAspect="1"/>
+          </p:cNvSpPr>
+          <p:nvPr>
+            <p:ph type="sldImg"/>
+          </p:nvPr>
+        </p:nvSpPr>
+        <p:spPr/>
+      </p:sp>
+      <p:sp>
+        <p:nvSpPr>
+          <p:cNvPr id="3" name="Notes Placeholder 2"/>
+          <p:cNvSpPr>
+            <a:spLocks noGrp="1"/>
+          </p:cNvSpPr>
+          <p:nvPr>
+            <p:ph type="body" idx="1"/>
+          </p:nvPr>
+        </p:nvSpPr>
+        <p:spPr/>
+        <p:txBody>
+          <a:bodyPr/>
+          <a:lstStyle/>
+          <a:p>
+            <a:endParaRPr lang="en-CA" dirty="0"/>
+          </a:p>
+        </p:txBody>
+      </p:sp>
+      <p:sp>
+        <p:nvSpPr>
+          <p:cNvPr id="4" name="Slide Number Placeholder 3"/>
+          <p:cNvSpPr>
+            <a:spLocks noGrp="1"/>
+          </p:cNvSpPr>
+          <p:nvPr>
+            <p:ph type="sldNum" sz="quarter" idx="5"/>
+          </p:nvPr>
+        </p:nvSpPr>
+        <p:spPr/>
+        <p:txBody>
+          <a:bodyPr/>
+          <a:lstStyle/>
+          <a:p>
+            <a:fld id="{3A533CB5-E34A-4A6A-A777-087957A42D72}" type="slidenum">
+              <a:rPr lang="en-US" smtClean="0"/>
+              <a:t>24</a:t>
+            </a:fld>
+            <a:endParaRPr lang="en-US"/>
+          </a:p>
+        </p:txBody>
+      </p:sp>
+    </p:spTree>
+    <p:extLst>
+      <p:ext uri="{BB962C8B-B14F-4D97-AF65-F5344CB8AC3E}">
+        <p14:creationId xmlns:p14="http://schemas.microsoft.com/office/powerpoint/2010/main" val="415977714"/>
+      </p:ext>
+    </p:extLst>
+  </p:cSld>
+  <p:clrMapOvr>
+    <a:masterClrMapping/>
+  </p:clrMapOvr>
+</p:notes>
+</file>
+
+<file path=ppt/notesSlides/notesSlide2.xml><?xml version="1.0" encoding="utf-8"?>
+<p:notes xmlns:a="http://schemas.openxmlformats.org/drawingml/2006/main" xmlns:r="http://schemas.openxmlformats.org/officeDocument/2006/relationships" xmlns:p="http://schemas.openxmlformats.org/presentationml/2006/main">
+  <p:cSld>
+    <p:spTree>
+      <p:nvGrpSpPr>
+        <p:cNvPr id="1" name=""/>
+        <p:cNvGrpSpPr/>
+        <p:nvPr/>
+      </p:nvGrpSpPr>
+      <p:grpSpPr>
+        <a:xfrm>
+          <a:off x="0" y="0"/>
+          <a:ext cx="0" cy="0"/>
+          <a:chOff x="0" y="0"/>
+          <a:chExt cx="0" cy="0"/>
+        </a:xfrm>
+      </p:grpSpPr>
+      <p:sp>
+        <p:nvSpPr>
+          <p:cNvPr id="2" name="Slide Image Placeholder 1"/>
+          <p:cNvSpPr>
+            <a:spLocks noGrp="1" noRot="1" noChangeAspect="1"/>
+          </p:cNvSpPr>
+          <p:nvPr>
+            <p:ph type="sldImg"/>
+          </p:nvPr>
+        </p:nvSpPr>
+        <p:spPr/>
+      </p:sp>
+      <p:sp>
+        <p:nvSpPr>
+          <p:cNvPr id="3" name="Notes Placeholder 2"/>
+          <p:cNvSpPr>
+            <a:spLocks noGrp="1"/>
+          </p:cNvSpPr>
+          <p:nvPr>
+            <p:ph type="body" idx="1"/>
+          </p:nvPr>
+        </p:nvSpPr>
+        <p:spPr/>
+        <p:txBody>
+          <a:bodyPr/>
+          <a:lstStyle/>
+          <a:p>
+            <a:r>
+              <a:rPr lang="en-CA" dirty="0"/>
+              <a:t>Overview – Serverless and what are Azure Functions</a:t>
+            </a:r>
+          </a:p>
+          <a:p>
+            <a:r>
+              <a:rPr lang="en-CA" dirty="0"/>
+              <a:t>Dev tooling – Tools along with deployment and monitoring capabilities</a:t>
+            </a:r>
+          </a:p>
+          <a:p>
+            <a:endParaRPr lang="en-CA" dirty="0"/>
+          </a:p>
+        </p:txBody>
+      </p:sp>
+      <p:sp>
+        <p:nvSpPr>
+          <p:cNvPr id="4" name="Slide Number Placeholder 3"/>
+          <p:cNvSpPr>
+            <a:spLocks noGrp="1"/>
+          </p:cNvSpPr>
+          <p:nvPr>
+            <p:ph type="sldNum" sz="quarter" idx="10"/>
+          </p:nvPr>
+        </p:nvSpPr>
+        <p:spPr/>
+        <p:txBody>
+          <a:bodyPr/>
+          <a:lstStyle/>
+          <a:p>
+            <a:fld id="{3A533CB5-E34A-4A6A-A777-087957A42D72}" type="slidenum">
+              <a:rPr lang="en-US" smtClean="0"/>
+              <a:t>4</a:t>
+            </a:fld>
+            <a:endParaRPr lang="en-US"/>
+          </a:p>
+        </p:txBody>
+      </p:sp>
+    </p:spTree>
+    <p:extLst>
+      <p:ext uri="{BB962C8B-B14F-4D97-AF65-F5344CB8AC3E}">
+        <p14:creationId xmlns:p14="http://schemas.microsoft.com/office/powerpoint/2010/main" val="1219674921"/>
+      </p:ext>
+    </p:extLst>
+  </p:cSld>
+  <p:clrMapOvr>
+    <a:masterClrMapping/>
+  </p:clrMapOvr>
+</p:notes>
+</file>
+
+<file path=ppt/notesSlides/notesSlide20.xml><?xml version="1.0" encoding="utf-8"?>
+<p:notes xmlns:a="http://schemas.openxmlformats.org/drawingml/2006/main" xmlns:r="http://schemas.openxmlformats.org/officeDocument/2006/relationships" xmlns:p="http://schemas.openxmlformats.org/presentationml/2006/main">
+  <p:cSld>
+    <p:spTree>
+      <p:nvGrpSpPr>
+        <p:cNvPr id="1" name=""/>
+        <p:cNvGrpSpPr/>
+        <p:nvPr/>
+      </p:nvGrpSpPr>
+      <p:grpSpPr>
+        <a:xfrm>
+          <a:off x="0" y="0"/>
+          <a:ext cx="0" cy="0"/>
+          <a:chOff x="0" y="0"/>
+          <a:chExt cx="0" cy="0"/>
+        </a:xfrm>
+      </p:grpSpPr>
+      <p:sp>
+        <p:nvSpPr>
+          <p:cNvPr id="2" name="Slide Image Placeholder 1"/>
+          <p:cNvSpPr>
+            <a:spLocks noGrp="1" noRot="1" noChangeAspect="1"/>
+          </p:cNvSpPr>
+          <p:nvPr>
+            <p:ph type="sldImg"/>
+          </p:nvPr>
+        </p:nvSpPr>
+        <p:spPr/>
+      </p:sp>
+      <p:sp>
+        <p:nvSpPr>
+          <p:cNvPr id="3" name="Notes Placeholder 2"/>
+          <p:cNvSpPr>
+            <a:spLocks noGrp="1"/>
+          </p:cNvSpPr>
+          <p:nvPr>
+            <p:ph type="body" idx="1"/>
+          </p:nvPr>
+        </p:nvSpPr>
+        <p:spPr/>
+        <p:txBody>
+          <a:bodyPr/>
+          <a:lstStyle/>
+          <a:p>
+            <a:endParaRPr lang="en-CA" dirty="0"/>
+          </a:p>
+        </p:txBody>
+      </p:sp>
+      <p:sp>
+        <p:nvSpPr>
+          <p:cNvPr id="4" name="Slide Number Placeholder 3"/>
+          <p:cNvSpPr>
+            <a:spLocks noGrp="1"/>
+          </p:cNvSpPr>
+          <p:nvPr>
+            <p:ph type="sldNum" sz="quarter" idx="5"/>
+          </p:nvPr>
+        </p:nvSpPr>
+        <p:spPr/>
+        <p:txBody>
+          <a:bodyPr/>
+          <a:lstStyle/>
+          <a:p>
+            <a:fld id="{3A533CB5-E34A-4A6A-A777-087957A42D72}" type="slidenum">
+              <a:rPr lang="en-US" smtClean="0"/>
+              <a:t>25</a:t>
+            </a:fld>
+            <a:endParaRPr lang="en-US"/>
+          </a:p>
+        </p:txBody>
+      </p:sp>
+    </p:spTree>
+    <p:extLst>
+      <p:ext uri="{BB962C8B-B14F-4D97-AF65-F5344CB8AC3E}">
+        <p14:creationId xmlns:p14="http://schemas.microsoft.com/office/powerpoint/2010/main" val="4025231503"/>
+      </p:ext>
+    </p:extLst>
+  </p:cSld>
+  <p:clrMapOvr>
+    <a:masterClrMapping/>
+  </p:clrMapOvr>
+</p:notes>
+</file>
+
+<file path=ppt/notesSlides/notesSlide21.xml><?xml version="1.0" encoding="utf-8"?>
+<p:notes xmlns:a="http://schemas.openxmlformats.org/drawingml/2006/main" xmlns:r="http://schemas.openxmlformats.org/officeDocument/2006/relationships" xmlns:p="http://schemas.openxmlformats.org/presentationml/2006/main">
+  <p:cSld>
+    <p:spTree>
+      <p:nvGrpSpPr>
+        <p:cNvPr id="1" name=""/>
+        <p:cNvGrpSpPr/>
+        <p:nvPr/>
+      </p:nvGrpSpPr>
+      <p:grpSpPr>
+        <a:xfrm>
+          <a:off x="0" y="0"/>
+          <a:ext cx="0" cy="0"/>
+          <a:chOff x="0" y="0"/>
+          <a:chExt cx="0" cy="0"/>
+        </a:xfrm>
+      </p:grpSpPr>
+      <p:sp>
+        <p:nvSpPr>
+          <p:cNvPr id="2" name="Slide Image Placeholder 1"/>
+          <p:cNvSpPr>
+            <a:spLocks noGrp="1" noRot="1" noChangeAspect="1"/>
+          </p:cNvSpPr>
+          <p:nvPr>
+            <p:ph type="sldImg"/>
+          </p:nvPr>
+        </p:nvSpPr>
+        <p:spPr/>
+      </p:sp>
+      <p:sp>
+        <p:nvSpPr>
+          <p:cNvPr id="3" name="Notes Placeholder 2"/>
+          <p:cNvSpPr>
+            <a:spLocks noGrp="1"/>
+          </p:cNvSpPr>
+          <p:nvPr>
+            <p:ph type="body" idx="1"/>
+          </p:nvPr>
+        </p:nvSpPr>
+        <p:spPr/>
+        <p:txBody>
+          <a:bodyPr/>
+          <a:lstStyle/>
+          <a:p>
             <a:pPr marL="0" marR="0" lvl="0" indent="0" algn="l" defTabSz="914400" rtl="0" eaLnBrk="1" fontAlgn="auto" latinLnBrk="0" hangingPunct="1">
               <a:lnSpc>
                 <a:spcPct val="100000"/>
@@ -5594,7 +6083,7 @@
 </p:notes>
 </file>
 
-<file path=ppt/notesSlides/notesSlide19.xml><?xml version="1.0" encoding="utf-8"?>
+<file path=ppt/notesSlides/notesSlide22.xml><?xml version="1.0" encoding="utf-8"?>
 <p:notes xmlns:a="http://schemas.openxmlformats.org/drawingml/2006/main" xmlns:r="http://schemas.openxmlformats.org/officeDocument/2006/relationships" xmlns:p="http://schemas.openxmlformats.org/presentationml/2006/main">
   <p:cSld>
     <p:spTree>
@@ -5803,7 +6292,7 @@
 </p:notes>
 </file>
 
-<file path=ppt/notesSlides/notesSlide2.xml><?xml version="1.0" encoding="utf-8"?>
+<file path=ppt/notesSlides/notesSlide23.xml><?xml version="1.0" encoding="utf-8"?>
 <p:notes xmlns:a="http://schemas.openxmlformats.org/drawingml/2006/main" xmlns:r="http://schemas.openxmlformats.org/officeDocument/2006/relationships" xmlns:p="http://schemas.openxmlformats.org/presentationml/2006/main">
   <p:cSld>
     <p:spTree>
@@ -5847,18 +6336,6 @@
           <a:bodyPr/>
           <a:lstStyle/>
           <a:p>
-            <a:r>
-              <a:rPr lang="en-CA" dirty="0"/>
-              <a:t>Overview – Serverless and what are Azure Functions</a:t>
-            </a:r>
-          </a:p>
-          <a:p>
-            <a:r>
-              <a:rPr lang="en-CA" dirty="0"/>
-              <a:t>Dev tooling – Tools along with deployment and monitoring capabilities</a:t>
-            </a:r>
-          </a:p>
-          <a:p>
             <a:endParaRPr lang="en-CA" dirty="0"/>
           </a:p>
         </p:txBody>
@@ -5870,7 +6347,7 @@
             <a:spLocks noGrp="1"/>
           </p:cNvSpPr>
           <p:nvPr>
-            <p:ph type="sldNum" sz="quarter" idx="10"/>
+            <p:ph type="sldNum" sz="quarter" idx="5"/>
           </p:nvPr>
         </p:nvSpPr>
         <p:spPr/>
@@ -5880,7 +6357,7 @@
           <a:p>
             <a:fld id="{3A533CB5-E34A-4A6A-A777-087957A42D72}" type="slidenum">
               <a:rPr lang="en-US" smtClean="0"/>
-              <a:t>4</a:t>
+              <a:t>28</a:t>
             </a:fld>
             <a:endParaRPr lang="en-US"/>
           </a:p>
@@ -5889,7 +6366,7 @@
     </p:spTree>
     <p:extLst>
       <p:ext uri="{BB962C8B-B14F-4D97-AF65-F5344CB8AC3E}">
-        <p14:creationId xmlns:p14="http://schemas.microsoft.com/office/powerpoint/2010/main" val="1219674921"/>
+        <p14:creationId xmlns:p14="http://schemas.microsoft.com/office/powerpoint/2010/main" val="3725390268"/>
       </p:ext>
     </p:extLst>
   </p:cSld>
@@ -5899,7 +6376,7 @@
 </p:notes>
 </file>
 
-<file path=ppt/notesSlides/notesSlide20.xml><?xml version="1.0" encoding="utf-8"?>
+<file path=ppt/notesSlides/notesSlide24.xml><?xml version="1.0" encoding="utf-8"?>
 <p:notes xmlns:a="http://schemas.openxmlformats.org/drawingml/2006/main" xmlns:r="http://schemas.openxmlformats.org/officeDocument/2006/relationships" xmlns:p="http://schemas.openxmlformats.org/presentationml/2006/main">
   <p:cSld>
     <p:spTree>
@@ -5964,90 +6441,6 @@
           <a:p>
             <a:fld id="{3A533CB5-E34A-4A6A-A777-087957A42D72}" type="slidenum">
               <a:rPr lang="en-US" smtClean="0"/>
-              <a:t>28</a:t>
-            </a:fld>
-            <a:endParaRPr lang="en-US"/>
-          </a:p>
-        </p:txBody>
-      </p:sp>
-    </p:spTree>
-    <p:extLst>
-      <p:ext uri="{BB962C8B-B14F-4D97-AF65-F5344CB8AC3E}">
-        <p14:creationId xmlns:p14="http://schemas.microsoft.com/office/powerpoint/2010/main" val="3725390268"/>
-      </p:ext>
-    </p:extLst>
-  </p:cSld>
-  <p:clrMapOvr>
-    <a:masterClrMapping/>
-  </p:clrMapOvr>
-</p:notes>
-</file>
-
-<file path=ppt/notesSlides/notesSlide21.xml><?xml version="1.0" encoding="utf-8"?>
-<p:notes xmlns:a="http://schemas.openxmlformats.org/drawingml/2006/main" xmlns:r="http://schemas.openxmlformats.org/officeDocument/2006/relationships" xmlns:p="http://schemas.openxmlformats.org/presentationml/2006/main">
-  <p:cSld>
-    <p:spTree>
-      <p:nvGrpSpPr>
-        <p:cNvPr id="1" name=""/>
-        <p:cNvGrpSpPr/>
-        <p:nvPr/>
-      </p:nvGrpSpPr>
-      <p:grpSpPr>
-        <a:xfrm>
-          <a:off x="0" y="0"/>
-          <a:ext cx="0" cy="0"/>
-          <a:chOff x="0" y="0"/>
-          <a:chExt cx="0" cy="0"/>
-        </a:xfrm>
-      </p:grpSpPr>
-      <p:sp>
-        <p:nvSpPr>
-          <p:cNvPr id="2" name="Slide Image Placeholder 1"/>
-          <p:cNvSpPr>
-            <a:spLocks noGrp="1" noRot="1" noChangeAspect="1"/>
-          </p:cNvSpPr>
-          <p:nvPr>
-            <p:ph type="sldImg"/>
-          </p:nvPr>
-        </p:nvSpPr>
-        <p:spPr/>
-      </p:sp>
-      <p:sp>
-        <p:nvSpPr>
-          <p:cNvPr id="3" name="Notes Placeholder 2"/>
-          <p:cNvSpPr>
-            <a:spLocks noGrp="1"/>
-          </p:cNvSpPr>
-          <p:nvPr>
-            <p:ph type="body" idx="1"/>
-          </p:nvPr>
-        </p:nvSpPr>
-        <p:spPr/>
-        <p:txBody>
-          <a:bodyPr/>
-          <a:lstStyle/>
-          <a:p>
-            <a:endParaRPr lang="en-CA" dirty="0"/>
-          </a:p>
-        </p:txBody>
-      </p:sp>
-      <p:sp>
-        <p:nvSpPr>
-          <p:cNvPr id="4" name="Slide Number Placeholder 3"/>
-          <p:cNvSpPr>
-            <a:spLocks noGrp="1"/>
-          </p:cNvSpPr>
-          <p:nvPr>
-            <p:ph type="sldNum" sz="quarter" idx="5"/>
-          </p:nvPr>
-        </p:nvSpPr>
-        <p:spPr/>
-        <p:txBody>
-          <a:bodyPr/>
-          <a:lstStyle/>
-          <a:p>
-            <a:fld id="{3A533CB5-E34A-4A6A-A777-087957A42D72}" type="slidenum">
-              <a:rPr lang="en-US" smtClean="0"/>
               <a:t>30</a:t>
             </a:fld>
             <a:endParaRPr lang="en-US"/>
@@ -6067,7 +6460,7 @@
 </p:notes>
 </file>
 
-<file path=ppt/notesSlides/notesSlide22.xml><?xml version="1.0" encoding="utf-8"?>
+<file path=ppt/notesSlides/notesSlide25.xml><?xml version="1.0" encoding="utf-8"?>
 <p:notes xmlns:a="http://schemas.openxmlformats.org/drawingml/2006/main" xmlns:r="http://schemas.openxmlformats.org/officeDocument/2006/relationships" xmlns:p="http://schemas.openxmlformats.org/presentationml/2006/main">
   <p:cSld>
     <p:spTree>
@@ -6407,7 +6800,7 @@
                 <a:ea typeface="+mn-ea"/>
                 <a:cs typeface="+mn-cs"/>
               </a:rPr>
-              <a:t>Serverless is micro-billing, and only paying for what you use.</a:t>
+              <a:t>Serverless is micro-billing, there is no wasted resources and you’re only paying for what you use.</a:t>
             </a:r>
             <a:endParaRPr lang="en-CA" dirty="0"/>
           </a:p>
@@ -6568,7 +6961,7 @@
             </a:r>
             <a:r>
               <a:rPr lang="en-CA" dirty="0"/>
-              <a:t> – Functions as a Service.</a:t>
+              <a:t> – Functions as a Service, which is small pieces of code that spin up and down as needed.</a:t>
             </a:r>
           </a:p>
           <a:p>
@@ -6581,12 +6974,30 @@
             </a:r>
           </a:p>
           <a:p>
+            <a:r>
+              <a:rPr lang="en-CA" dirty="0"/>
+              <a:t>Functions should be short lived.</a:t>
+            </a:r>
+          </a:p>
+          <a:p>
+            <a:r>
+              <a:rPr lang="en-CA" dirty="0"/>
+              <a:t>With serverless there is no state.</a:t>
+            </a:r>
+          </a:p>
+          <a:p>
             <a:endParaRPr lang="en-CA" dirty="0"/>
           </a:p>
           <a:p>
             <a:r>
               <a:rPr lang="en-CA" dirty="0"/>
-              <a:t>With serverless there is no state, but when you require state it gets tricky.</a:t>
+              <a:t>But when you require state it gets tricky.</a:t>
+            </a:r>
+          </a:p>
+          <a:p>
+            <a:r>
+              <a:rPr lang="en-CA" dirty="0"/>
+              <a:t>Also what if your task isn’t short lived, or simple?</a:t>
             </a:r>
           </a:p>
         </p:txBody>
@@ -6848,7 +7259,7 @@
                 <a:tabLst/>
                 <a:defRPr/>
               </a:pPr>
-              <a:t>4/19/2019 12:27 PM</a:t>
+              <a:t>4/26/2019 7:46 AM</a:t>
             </a:fld>
             <a:endParaRPr kumimoji="0" lang="en-US" sz="1200" b="0" i="0" u="none" strike="noStrike" kern="1200" cap="none" spc="0" normalizeH="0" baseline="0" noProof="0">
               <a:ln>
@@ -7007,57 +7418,12 @@
           <a:bodyPr/>
           <a:lstStyle/>
           <a:p>
-            <a:pPr marL="228600" indent="-228600">
-              <a:buAutoNum type="arabicPeriod"/>
+            <a:pPr marL="0" indent="0">
+              <a:buNone/>
             </a:pPr>
             <a:r>
               <a:rPr lang="en-CA" dirty="0"/>
-              <a:t>Some sequencing that needs to happen and I have to chain them all together.</a:t>
-            </a:r>
-          </a:p>
-          <a:p>
-            <a:pPr marL="228600" indent="-228600">
-              <a:buAutoNum type="arabicPeriod"/>
-            </a:pPr>
-            <a:r>
-              <a:rPr lang="en-CA" dirty="0"/>
-              <a:t>If I want to parallel some work and then pull in the results into one function</a:t>
-            </a:r>
-          </a:p>
-          <a:p>
-            <a:pPr marL="228600" indent="-228600">
-              <a:buAutoNum type="arabicPeriod"/>
-            </a:pPr>
-            <a:r>
-              <a:rPr lang="en-CA" dirty="0"/>
-              <a:t>Waiting for external events</a:t>
-            </a:r>
-          </a:p>
-          <a:p>
-            <a:pPr marL="228600" indent="-228600">
-              <a:buAutoNum type="arabicPeriod"/>
-            </a:pPr>
-            <a:r>
-              <a:rPr lang="en-CA" dirty="0"/>
-              <a:t>Watcher pattern</a:t>
-            </a:r>
-          </a:p>
-          <a:p>
-            <a:pPr marL="228600" indent="-228600">
-              <a:buAutoNum type="arabicPeriod"/>
-            </a:pPr>
-            <a:r>
-              <a:rPr lang="en-CA" dirty="0"/>
-              <a:t>Long running http requests</a:t>
-            </a:r>
-          </a:p>
-          <a:p>
-            <a:pPr marL="228600" indent="-228600">
-              <a:buAutoNum type="arabicPeriod"/>
-            </a:pPr>
-            <a:r>
-              <a:rPr lang="en-CA" dirty="0"/>
-              <a:t>Human interaction and I don’t want to wait forever…I want a timeout.</a:t>
+              <a:t>Here are some patterns that are still hard in the serverless world (until Durable Functions…spoiler alert)</a:t>
             </a:r>
           </a:p>
           <a:p>
@@ -7072,7 +7438,76 @@
             </a:pPr>
             <a:r>
               <a:rPr lang="en-CA" dirty="0"/>
-              <a:t>The answer to some of these is I don’t know. Let’s take a look at two patterns and how we can solve them</a:t>
+              <a:t>What if…</a:t>
+            </a:r>
+          </a:p>
+          <a:p>
+            <a:pPr marL="228600" indent="-228600">
+              <a:buAutoNum type="arabicPeriod"/>
+            </a:pPr>
+            <a:r>
+              <a:rPr lang="en-CA" dirty="0"/>
+              <a:t>I have some sequencing that needs to happen, and I must chain them all together?</a:t>
+            </a:r>
+          </a:p>
+          <a:p>
+            <a:pPr marL="228600" indent="-228600">
+              <a:buAutoNum type="arabicPeriod"/>
+            </a:pPr>
+            <a:r>
+              <a:rPr lang="en-CA" dirty="0"/>
+              <a:t>I want to parallel some work and then pull in the results into one function?</a:t>
+            </a:r>
+          </a:p>
+          <a:p>
+            <a:pPr marL="228600" indent="-228600">
+              <a:buAutoNum type="arabicPeriod"/>
+            </a:pPr>
+            <a:r>
+              <a:rPr lang="en-CA" dirty="0"/>
+              <a:t>I’m waiting on external events?</a:t>
+            </a:r>
+          </a:p>
+          <a:p>
+            <a:pPr marL="228600" indent="-228600">
+              <a:buAutoNum type="arabicPeriod"/>
+            </a:pPr>
+            <a:r>
+              <a:rPr lang="en-CA" dirty="0"/>
+              <a:t>I’m using the watcher pattern and I’m waiting on something?</a:t>
+            </a:r>
+          </a:p>
+          <a:p>
+            <a:pPr marL="228600" indent="-228600">
+              <a:buAutoNum type="arabicPeriod"/>
+            </a:pPr>
+            <a:r>
+              <a:rPr lang="en-CA" dirty="0"/>
+              <a:t>I have or need long running http requests?</a:t>
+            </a:r>
+          </a:p>
+          <a:p>
+            <a:pPr marL="228600" indent="-228600">
+              <a:buAutoNum type="arabicPeriod"/>
+            </a:pPr>
+            <a:r>
+              <a:rPr lang="en-CA" dirty="0"/>
+              <a:t>I have human interaction and I don’t want to wait forever…I want a timeout.</a:t>
+            </a:r>
+          </a:p>
+          <a:p>
+            <a:pPr marL="0" indent="0">
+              <a:buNone/>
+            </a:pPr>
+            <a:endParaRPr lang="en-CA" dirty="0"/>
+          </a:p>
+          <a:p>
+            <a:pPr marL="0" indent="0">
+              <a:buNone/>
+            </a:pPr>
+            <a:r>
+              <a:rPr lang="en-CA" dirty="0"/>
+              <a:t>The answer to some of these is I don’t know. Let’s look at two patterns and see how we can solve them.</a:t>
             </a:r>
           </a:p>
         </p:txBody>
@@ -7159,7 +7594,7 @@
           <a:p>
             <a:r>
               <a:rPr lang="en-CA" dirty="0"/>
-              <a:t>Durable Functions is an open source framework for Azure Functions.</a:t>
+              <a:t>Durable Functions is an open source extension for Azure Functions.</a:t>
             </a:r>
           </a:p>
           <a:p>
@@ -7168,7 +7603,7 @@
           <a:p>
             <a:r>
               <a:rPr lang="en-CA" dirty="0"/>
-              <a:t>Allows you to coordinate long running stateful workflows in code. This means n</a:t>
+              <a:t>It allows you to coordinate long running stateful workflows in code. This means n</a:t>
             </a:r>
             <a:r>
               <a:rPr lang="en-US" sz="1200" b="0" i="0" u="none" strike="noStrike" kern="1200" dirty="0">
@@ -7205,7 +7640,7 @@
                 <a:ea typeface="+mn-ea"/>
                 <a:cs typeface="+mn-cs"/>
               </a:rPr>
-              <a:t>They can call other functions synchronously and asynchronously. Output from called functions can be saved to local variables.</a:t>
+              <a:t>With Durable Functions, you can call other functions synchronously and asynchronously. Output from called functions can be saved to local variables and used by other functions.</a:t>
             </a:r>
           </a:p>
           <a:p>
@@ -7230,36 +7665,44 @@
                 <a:ea typeface="+mn-ea"/>
                 <a:cs typeface="+mn-cs"/>
               </a:rPr>
-              <a:t>They automatically checkpoint their progress whenever the function awaits. Local state is never lost if the process recycles or the VM reboots.</a:t>
-            </a:r>
-          </a:p>
-          <a:p>
-            <a:endParaRPr lang="en-US" sz="1200" b="0" i="0" u="none" strike="noStrike" kern="1200" dirty="0">
-              <a:solidFill>
-                <a:schemeClr val="tx1"/>
-              </a:solidFill>
-              <a:effectLst/>
-              <a:latin typeface="+mn-lt"/>
-              <a:ea typeface="+mn-ea"/>
-              <a:cs typeface="+mn-cs"/>
-            </a:endParaRPr>
-          </a:p>
-          <a:p>
-            <a:r>
-              <a:rPr lang="en-US" sz="1200" b="0" i="0" u="none" strike="noStrike" kern="1200" dirty="0">
-                <a:solidFill>
-                  <a:schemeClr val="tx1"/>
-                </a:solidFill>
-                <a:effectLst/>
-                <a:latin typeface="+mn-lt"/>
-                <a:ea typeface="+mn-ea"/>
-                <a:cs typeface="+mn-cs"/>
-              </a:rPr>
-              <a:t>Similar to Logic Apps but without a workflow designer.</a:t>
-            </a:r>
-          </a:p>
-          <a:p>
+              <a:t>Durable Functions will automatically checkpoint their progress whenever the function awaits. Local state is never lost if the process recycles or the VM reboots.</a:t>
+            </a:r>
             <a:endParaRPr lang="en-CA" dirty="0"/>
+          </a:p>
+          <a:p>
+            <a:endParaRPr lang="en-CA" dirty="0"/>
+          </a:p>
+          <a:p>
+            <a:r>
+              <a:rPr lang="en-CA" dirty="0"/>
+              <a:t>Language support…C#, F# and JavaScript with v2.</a:t>
+            </a:r>
+          </a:p>
+          <a:p>
+            <a:endParaRPr lang="en-CA" dirty="0"/>
+          </a:p>
+          <a:p>
+            <a:pPr marL="0" marR="0" lvl="0" indent="0" algn="l" defTabSz="914400" rtl="0" eaLnBrk="1" fontAlgn="auto" latinLnBrk="0" hangingPunct="1">
+              <a:lnSpc>
+                <a:spcPct val="100000"/>
+              </a:lnSpc>
+              <a:spcBef>
+                <a:spcPts val="0"/>
+              </a:spcBef>
+              <a:spcAft>
+                <a:spcPts val="0"/>
+              </a:spcAft>
+              <a:buClrTx/>
+              <a:buSzTx/>
+              <a:buFontTx/>
+              <a:buNone/>
+              <a:tabLst/>
+              <a:defRPr/>
+            </a:pPr>
+            <a:r>
+              <a:rPr lang="en-US" dirty="0"/>
+              <a:t>The primary use case for Durable Functions is simplifying complex, stateful coordination requirements in serverless applications.</a:t>
+            </a:r>
           </a:p>
           <a:p>
             <a:endParaRPr lang="en-CA" dirty="0"/>
@@ -7349,9 +7792,39 @@
           <a:bodyPr/>
           <a:lstStyle/>
           <a:p>
+            <a:pPr marL="0" marR="0" lvl="0" indent="0" algn="l" defTabSz="914400" rtl="0" eaLnBrk="1" fontAlgn="auto" latinLnBrk="0" hangingPunct="1">
+              <a:lnSpc>
+                <a:spcPct val="100000"/>
+              </a:lnSpc>
+              <a:spcBef>
+                <a:spcPts val="0"/>
+              </a:spcBef>
+              <a:spcAft>
+                <a:spcPts val="0"/>
+              </a:spcAft>
+              <a:buClrTx/>
+              <a:buSzTx/>
+              <a:buFontTx/>
+              <a:buNone/>
+              <a:tabLst/>
+              <a:defRPr/>
+            </a:pPr>
             <a:r>
               <a:rPr lang="en-CA" dirty="0"/>
-              <a:t>In Durable Functions we introduce the concept of an orchestrator function.</a:t>
+              <a:t>Durable Functions introduces the concept of an orchestrator function.</a:t>
+            </a:r>
+          </a:p>
+          <a:p>
+            <a:endParaRPr lang="en-CA" dirty="0"/>
+          </a:p>
+          <a:p>
+            <a:r>
+              <a:rPr lang="en-CA" dirty="0"/>
+              <a:t>Like all Azure Functions you need to a trigger to start the function and that is exactly what the Started function does, and it will send a message to the orchestrator. </a:t>
+            </a:r>
+            <a:r>
+              <a:rPr lang="en-US" sz="1200" dirty="0"/>
+              <a:t>Often this starter function is an Http endpoint. </a:t>
             </a:r>
           </a:p>
           <a:p>
@@ -7360,7 +7833,7 @@
           <a:p>
             <a:r>
               <a:rPr lang="en-US" sz="1200" dirty="0"/>
-              <a:t>The starter function triggers the orchestrator to start the execution. Often this starter function is an Http endpoint. Once the starter has called the orchestrator function, it goes to sleep for the rest of the day or until it’s triggered again. This reduces the cost significantly.</a:t>
+              <a:t>Once the starter has called the orchestrator function, it goes to sleep for the rest of the day or until it’s triggered again. This reduces the cost significantly.</a:t>
             </a:r>
           </a:p>
           <a:p>
@@ -7369,7 +7842,7 @@
           <a:p>
             <a:r>
               <a:rPr lang="en-CA" dirty="0"/>
-              <a:t>The orchestrator function is responsible for calling and receiving the output of the activity functions (what you know as normal functions). </a:t>
+              <a:t>The orchestrator function is the heart of the Durable Function is responsible for calling and receiving the output of the activity functions (what you know as normal functions). </a:t>
             </a:r>
           </a:p>
           <a:p>
@@ -7378,7 +7851,7 @@
           <a:p>
             <a:r>
               <a:rPr lang="en-CA" dirty="0"/>
-              <a:t>The activity function output becomes part of the local state of the orchestrator function.</a:t>
+              <a:t>The activity function are what does the work and its output becomes part of the local state of the orchestrator function.</a:t>
             </a:r>
           </a:p>
           <a:p>
@@ -10932,7 +11405,7 @@
           <a:p>
             <a:fld id="{C161BE4E-1F91-49DA-A204-28A383D68637}" type="datetimeFigureOut">
               <a:rPr lang="en-US" smtClean="0"/>
-              <a:t>4/19/2019</a:t>
+              <a:t>4/26/2019</a:t>
             </a:fld>
             <a:endParaRPr lang="en-US" dirty="0"/>
           </a:p>
@@ -11100,7 +11573,7 @@
           <a:p>
             <a:fld id="{C161BE4E-1F91-49DA-A204-28A383D68637}" type="datetimeFigureOut">
               <a:rPr lang="en-US" smtClean="0"/>
-              <a:t>4/19/2019</a:t>
+              <a:t>4/26/2019</a:t>
             </a:fld>
             <a:endParaRPr lang="en-US" dirty="0"/>
           </a:p>
@@ -11345,7 +11818,7 @@
           <a:p>
             <a:fld id="{C161BE4E-1F91-49DA-A204-28A383D68637}" type="datetimeFigureOut">
               <a:rPr lang="en-US" smtClean="0"/>
-              <a:t>4/19/2019</a:t>
+              <a:t>4/26/2019</a:t>
             </a:fld>
             <a:endParaRPr lang="en-US" dirty="0"/>
           </a:p>
@@ -11574,7 +12047,7 @@
           <a:p>
             <a:fld id="{C161BE4E-1F91-49DA-A204-28A383D68637}" type="datetimeFigureOut">
               <a:rPr lang="en-US" smtClean="0"/>
-              <a:t>4/19/2019</a:t>
+              <a:t>4/26/2019</a:t>
             </a:fld>
             <a:endParaRPr lang="en-US" dirty="0"/>
           </a:p>
@@ -11938,7 +12411,7 @@
           <a:p>
             <a:fld id="{C161BE4E-1F91-49DA-A204-28A383D68637}" type="datetimeFigureOut">
               <a:rPr lang="en-US" smtClean="0"/>
-              <a:t>4/19/2019</a:t>
+              <a:t>4/26/2019</a:t>
             </a:fld>
             <a:endParaRPr lang="en-US" dirty="0"/>
           </a:p>
@@ -12055,7 +12528,7 @@
           <a:p>
             <a:fld id="{C161BE4E-1F91-49DA-A204-28A383D68637}" type="datetimeFigureOut">
               <a:rPr lang="en-US" smtClean="0"/>
-              <a:t>4/19/2019</a:t>
+              <a:t>4/26/2019</a:t>
             </a:fld>
             <a:endParaRPr lang="en-US" dirty="0"/>
           </a:p>
@@ -12150,7 +12623,7 @@
           <a:p>
             <a:fld id="{C161BE4E-1F91-49DA-A204-28A383D68637}" type="datetimeFigureOut">
               <a:rPr lang="en-US" smtClean="0"/>
-              <a:t>4/19/2019</a:t>
+              <a:t>4/26/2019</a:t>
             </a:fld>
             <a:endParaRPr lang="en-US" dirty="0"/>
           </a:p>
@@ -12528,7 +13001,7 @@
           <a:p>
             <a:fld id="{C161BE4E-1F91-49DA-A204-28A383D68637}" type="datetimeFigureOut">
               <a:rPr lang="en-US" smtClean="0"/>
-              <a:t>4/19/2019</a:t>
+              <a:t>4/26/2019</a:t>
             </a:fld>
             <a:endParaRPr lang="en-US" dirty="0"/>
           </a:p>
@@ -12784,7 +13257,7 @@
           <a:p>
             <a:fld id="{C161BE4E-1F91-49DA-A204-28A383D68637}" type="datetimeFigureOut">
               <a:rPr lang="en-US" smtClean="0"/>
-              <a:t>4/19/2019</a:t>
+              <a:t>4/26/2019</a:t>
             </a:fld>
             <a:endParaRPr lang="en-US" dirty="0"/>
           </a:p>
@@ -12952,7 +13425,7 @@
           <a:p>
             <a:fld id="{C161BE4E-1F91-49DA-A204-28A383D68637}" type="datetimeFigureOut">
               <a:rPr lang="en-US" smtClean="0"/>
-              <a:t>4/19/2019</a:t>
+              <a:t>4/26/2019</a:t>
             </a:fld>
             <a:endParaRPr lang="en-US" dirty="0"/>
           </a:p>
@@ -13130,7 +13603,7 @@
           <a:p>
             <a:fld id="{C161BE4E-1F91-49DA-A204-28A383D68637}" type="datetimeFigureOut">
               <a:rPr lang="en-US" smtClean="0"/>
-              <a:t>4/19/2019</a:t>
+              <a:t>4/26/2019</a:t>
             </a:fld>
             <a:endParaRPr lang="en-US" dirty="0"/>
           </a:p>
@@ -19622,7 +20095,7 @@
           <a:p>
             <a:fld id="{7F81D829-E8E5-411F-AF5C-11CC9F4CC4B9}" type="datetimeFigureOut">
               <a:rPr lang="en-US" smtClean="0"/>
-              <a:t>4/19/2019</a:t>
+              <a:t>4/26/2019</a:t>
             </a:fld>
             <a:endParaRPr lang="en-US"/>
           </a:p>
@@ -24630,7 +25103,7 @@
           <a:p>
             <a:fld id="{C161BE4E-1F91-49DA-A204-28A383D68637}" type="datetimeFigureOut">
               <a:rPr lang="en-US" smtClean="0"/>
-              <a:t>4/19/2019</a:t>
+              <a:t>4/26/2019</a:t>
             </a:fld>
             <a:endParaRPr lang="en-US" dirty="0"/>
           </a:p>
@@ -31118,7 +31591,7 @@
 </file>
 
 <file path=ppt/slides/slide13.xml><?xml version="1.0" encoding="utf-8"?>
-<p:sld xmlns:a="http://schemas.openxmlformats.org/drawingml/2006/main" xmlns:r="http://schemas.openxmlformats.org/officeDocument/2006/relationships" xmlns:p="http://schemas.openxmlformats.org/presentationml/2006/main">
+<p:sld xmlns:a="http://schemas.openxmlformats.org/drawingml/2006/main" xmlns:r="http://schemas.openxmlformats.org/officeDocument/2006/relationships" xmlns:p="http://schemas.openxmlformats.org/presentationml/2006/main" show="0">
   <p:cSld>
     <p:spTree>
       <p:nvGrpSpPr>
@@ -31306,6 +31779,18 @@
   <p:clrMapOvr>
     <a:masterClrMapping/>
   </p:clrMapOvr>
+  <mc:AlternateContent xmlns:mc="http://schemas.openxmlformats.org/markup-compatibility/2006">
+    <mc:Choice xmlns:p14="http://schemas.microsoft.com/office/powerpoint/2010/main" Requires="p14">
+      <p:transition spd="med" p14:dur="700">
+        <p:fade/>
+      </p:transition>
+    </mc:Choice>
+    <mc:Fallback>
+      <p:transition spd="med">
+        <p:fade/>
+      </p:transition>
+    </mc:Fallback>
+  </mc:AlternateContent>
 </p:sld>
 </file>
 
@@ -31349,7 +31834,7 @@
           <a:p>
             <a:r>
               <a:rPr lang="en-CA" dirty="0"/>
-              <a:t>Durable Functions Components</a:t>
+              <a:t>Components of Durable Functions</a:t>
             </a:r>
           </a:p>
         </p:txBody>
@@ -31686,8 +32171,8 @@
             </a:prstGeom>
           </p:spPr>
         </p:pic>
-        <mc:AlternateContent xmlns:mc="http://schemas.openxmlformats.org/markup-compatibility/2006">
-          <mc:Choice xmlns:p14="http://schemas.microsoft.com/office/powerpoint/2010/main" Requires="p14">
+        <mc:AlternateContent xmlns:mc="http://schemas.openxmlformats.org/markup-compatibility/2006" xmlns:p14="http://schemas.microsoft.com/office/powerpoint/2010/main">
+          <mc:Choice Requires="p14">
             <p:contentPart p14:bwMode="auto" r:id="rId4">
               <p14:nvContentPartPr>
                 <p14:cNvPr id="7" name="Ink 6">
@@ -31706,7 +32191,7 @@
               </p14:xfrm>
             </p:contentPart>
           </mc:Choice>
-          <mc:Fallback>
+          <mc:Fallback xmlns="">
             <p:pic>
               <p:nvPicPr>
                 <p:cNvPr id="7" name="Ink 6">
@@ -31794,8 +32279,8 @@
             </a:prstGeom>
           </p:spPr>
         </p:pic>
-        <mc:AlternateContent xmlns:mc="http://schemas.openxmlformats.org/markup-compatibility/2006">
-          <mc:Choice xmlns:p14="http://schemas.microsoft.com/office/powerpoint/2010/main" Requires="p14">
+        <mc:AlternateContent xmlns:mc="http://schemas.openxmlformats.org/markup-compatibility/2006" xmlns:p14="http://schemas.microsoft.com/office/powerpoint/2010/main">
+          <mc:Choice Requires="p14">
             <p:contentPart p14:bwMode="auto" r:id="rId7">
               <p14:nvContentPartPr>
                 <p14:cNvPr id="10" name="Ink 9">
@@ -31814,7 +32299,7 @@
               </p14:xfrm>
             </p:contentPart>
           </mc:Choice>
-          <mc:Fallback>
+          <mc:Fallback xmlns="">
             <p:pic>
               <p:nvPicPr>
                 <p:cNvPr id="10" name="Ink 9">
@@ -31902,8 +32387,8 @@
             </a:prstGeom>
           </p:spPr>
         </p:pic>
-        <mc:AlternateContent xmlns:mc="http://schemas.openxmlformats.org/markup-compatibility/2006">
-          <mc:Choice xmlns:p14="http://schemas.microsoft.com/office/powerpoint/2010/main" Requires="p14">
+        <mc:AlternateContent xmlns:mc="http://schemas.openxmlformats.org/markup-compatibility/2006" xmlns:p14="http://schemas.microsoft.com/office/powerpoint/2010/main">
+          <mc:Choice Requires="p14">
             <p:contentPart p14:bwMode="auto" r:id="rId9">
               <p14:nvContentPartPr>
                 <p14:cNvPr id="13" name="Ink 12">
@@ -31922,7 +32407,7 @@
               </p14:xfrm>
             </p:contentPart>
           </mc:Choice>
-          <mc:Fallback>
+          <mc:Fallback xmlns="">
             <p:pic>
               <p:nvPicPr>
                 <p:cNvPr id="13" name="Ink 12">
@@ -31990,8 +32475,8 @@
           </a:prstGeom>
         </p:spPr>
       </p:pic>
-      <mc:AlternateContent xmlns:mc="http://schemas.openxmlformats.org/markup-compatibility/2006">
-        <mc:Choice xmlns:p14="http://schemas.microsoft.com/office/powerpoint/2010/main" Requires="p14">
+      <mc:AlternateContent xmlns:mc="http://schemas.openxmlformats.org/markup-compatibility/2006" xmlns:p14="http://schemas.microsoft.com/office/powerpoint/2010/main">
+        <mc:Choice Requires="p14">
           <p:contentPart p14:bwMode="auto" r:id="rId11">
             <p14:nvContentPartPr>
               <p14:cNvPr id="15" name="Ink 14">
@@ -32010,7 +32495,7 @@
             </p14:xfrm>
           </p:contentPart>
         </mc:Choice>
-        <mc:Fallback>
+        <mc:Fallback xmlns="">
           <p:pic>
             <p:nvPicPr>
               <p:cNvPr id="15" name="Ink 14">
@@ -32041,8 +32526,8 @@
           </p:pic>
         </mc:Fallback>
       </mc:AlternateContent>
-      <mc:AlternateContent xmlns:mc="http://schemas.openxmlformats.org/markup-compatibility/2006">
-        <mc:Choice xmlns:p14="http://schemas.microsoft.com/office/powerpoint/2010/main" Requires="p14">
+      <mc:AlternateContent xmlns:mc="http://schemas.openxmlformats.org/markup-compatibility/2006" xmlns:p14="http://schemas.microsoft.com/office/powerpoint/2010/main">
+        <mc:Choice Requires="p14">
           <p:contentPart p14:bwMode="auto" r:id="rId13">
             <p14:nvContentPartPr>
               <p14:cNvPr id="34" name="Ink 33">
@@ -32061,7 +32546,7 @@
             </p14:xfrm>
           </p:contentPart>
         </mc:Choice>
-        <mc:Fallback>
+        <mc:Fallback xmlns="">
           <p:pic>
             <p:nvPicPr>
               <p:cNvPr id="34" name="Ink 33">
@@ -32092,8 +32577,8 @@
           </p:pic>
         </mc:Fallback>
       </mc:AlternateContent>
-      <mc:AlternateContent xmlns:mc="http://schemas.openxmlformats.org/markup-compatibility/2006">
-        <mc:Choice xmlns:p14="http://schemas.microsoft.com/office/powerpoint/2010/main" Requires="p14">
+      <mc:AlternateContent xmlns:mc="http://schemas.openxmlformats.org/markup-compatibility/2006" xmlns:p14="http://schemas.microsoft.com/office/powerpoint/2010/main">
+        <mc:Choice Requires="p14">
           <p:contentPart p14:bwMode="auto" r:id="rId15">
             <p14:nvContentPartPr>
               <p14:cNvPr id="50" name="Ink 49">
@@ -32112,7 +32597,7 @@
             </p14:xfrm>
           </p:contentPart>
         </mc:Choice>
-        <mc:Fallback>
+        <mc:Fallback xmlns="">
           <p:pic>
             <p:nvPicPr>
               <p:cNvPr id="50" name="Ink 49">
@@ -32143,8 +32628,8 @@
           </p:pic>
         </mc:Fallback>
       </mc:AlternateContent>
-      <mc:AlternateContent xmlns:mc="http://schemas.openxmlformats.org/markup-compatibility/2006">
-        <mc:Choice xmlns:p14="http://schemas.microsoft.com/office/powerpoint/2010/main" Requires="p14">
+      <mc:AlternateContent xmlns:mc="http://schemas.openxmlformats.org/markup-compatibility/2006" xmlns:p14="http://schemas.microsoft.com/office/powerpoint/2010/main">
+        <mc:Choice Requires="p14">
           <p:contentPart p14:bwMode="auto" r:id="rId17">
             <p14:nvContentPartPr>
               <p14:cNvPr id="52" name="Ink 51">
@@ -32163,7 +32648,7 @@
             </p14:xfrm>
           </p:contentPart>
         </mc:Choice>
-        <mc:Fallback>
+        <mc:Fallback xmlns="">
           <p:pic>
             <p:nvPicPr>
               <p:cNvPr id="52" name="Ink 51">
@@ -32194,8 +32679,8 @@
           </p:pic>
         </mc:Fallback>
       </mc:AlternateContent>
-      <mc:AlternateContent xmlns:mc="http://schemas.openxmlformats.org/markup-compatibility/2006">
-        <mc:Choice xmlns:p14="http://schemas.microsoft.com/office/powerpoint/2010/main" Requires="p14">
+      <mc:AlternateContent xmlns:mc="http://schemas.openxmlformats.org/markup-compatibility/2006" xmlns:p14="http://schemas.microsoft.com/office/powerpoint/2010/main">
+        <mc:Choice Requires="p14">
           <p:contentPart p14:bwMode="auto" r:id="rId19">
             <p14:nvContentPartPr>
               <p14:cNvPr id="56" name="Ink 55">
@@ -32214,7 +32699,7 @@
             </p14:xfrm>
           </p:contentPart>
         </mc:Choice>
-        <mc:Fallback>
+        <mc:Fallback xmlns="">
           <p:pic>
             <p:nvPicPr>
               <p:cNvPr id="56" name="Ink 55">
@@ -32245,8 +32730,8 @@
           </p:pic>
         </mc:Fallback>
       </mc:AlternateContent>
-      <mc:AlternateContent xmlns:mc="http://schemas.openxmlformats.org/markup-compatibility/2006">
-        <mc:Choice xmlns:p14="http://schemas.microsoft.com/office/powerpoint/2010/main" Requires="p14">
+      <mc:AlternateContent xmlns:mc="http://schemas.openxmlformats.org/markup-compatibility/2006" xmlns:p14="http://schemas.microsoft.com/office/powerpoint/2010/main">
+        <mc:Choice Requires="p14">
           <p:contentPart p14:bwMode="auto" r:id="rId21">
             <p14:nvContentPartPr>
               <p14:cNvPr id="57" name="Ink 56">
@@ -32265,7 +32750,7 @@
             </p14:xfrm>
           </p:contentPart>
         </mc:Choice>
-        <mc:Fallback>
+        <mc:Fallback xmlns="">
           <p:pic>
             <p:nvPicPr>
               <p:cNvPr id="57" name="Ink 56">
@@ -32296,8 +32781,8 @@
           </p:pic>
         </mc:Fallback>
       </mc:AlternateContent>
-      <mc:AlternateContent xmlns:mc="http://schemas.openxmlformats.org/markup-compatibility/2006">
-        <mc:Choice xmlns:p14="http://schemas.microsoft.com/office/powerpoint/2010/main" Requires="p14">
+      <mc:AlternateContent xmlns:mc="http://schemas.openxmlformats.org/markup-compatibility/2006" xmlns:p14="http://schemas.microsoft.com/office/powerpoint/2010/main">
+        <mc:Choice Requires="p14">
           <p:contentPart p14:bwMode="auto" r:id="rId23">
             <p14:nvContentPartPr>
               <p14:cNvPr id="60" name="Ink 59">
@@ -32316,7 +32801,7 @@
             </p14:xfrm>
           </p:contentPart>
         </mc:Choice>
-        <mc:Fallback>
+        <mc:Fallback xmlns="">
           <p:pic>
             <p:nvPicPr>
               <p:cNvPr id="60" name="Ink 59">
@@ -32347,8 +32832,8 @@
           </p:pic>
         </mc:Fallback>
       </mc:AlternateContent>
-      <mc:AlternateContent xmlns:mc="http://schemas.openxmlformats.org/markup-compatibility/2006">
-        <mc:Choice xmlns:p14="http://schemas.microsoft.com/office/powerpoint/2010/main" Requires="p14">
+      <mc:AlternateContent xmlns:mc="http://schemas.openxmlformats.org/markup-compatibility/2006" xmlns:p14="http://schemas.microsoft.com/office/powerpoint/2010/main">
+        <mc:Choice Requires="p14">
           <p:contentPart p14:bwMode="auto" r:id="rId25">
             <p14:nvContentPartPr>
               <p14:cNvPr id="63" name="Ink 62">
@@ -32367,7 +32852,7 @@
             </p14:xfrm>
           </p:contentPart>
         </mc:Choice>
-        <mc:Fallback>
+        <mc:Fallback xmlns="">
           <p:pic>
             <p:nvPicPr>
               <p:cNvPr id="63" name="Ink 62">
@@ -32398,8 +32883,8 @@
           </p:pic>
         </mc:Fallback>
       </mc:AlternateContent>
-      <mc:AlternateContent xmlns:mc="http://schemas.openxmlformats.org/markup-compatibility/2006">
-        <mc:Choice xmlns:p14="http://schemas.microsoft.com/office/powerpoint/2010/main" Requires="p14">
+      <mc:AlternateContent xmlns:mc="http://schemas.openxmlformats.org/markup-compatibility/2006" xmlns:p14="http://schemas.microsoft.com/office/powerpoint/2010/main">
+        <mc:Choice Requires="p14">
           <p:contentPart p14:bwMode="auto" r:id="rId27">
             <p14:nvContentPartPr>
               <p14:cNvPr id="70" name="Ink 69">
@@ -32418,7 +32903,7 @@
             </p14:xfrm>
           </p:contentPart>
         </mc:Choice>
-        <mc:Fallback>
+        <mc:Fallback xmlns="">
           <p:pic>
             <p:nvPicPr>
               <p:cNvPr id="70" name="Ink 69">
@@ -32449,8 +32934,8 @@
           </p:pic>
         </mc:Fallback>
       </mc:AlternateContent>
-      <mc:AlternateContent xmlns:mc="http://schemas.openxmlformats.org/markup-compatibility/2006">
-        <mc:Choice xmlns:p14="http://schemas.microsoft.com/office/powerpoint/2010/main" Requires="p14">
+      <mc:AlternateContent xmlns:mc="http://schemas.openxmlformats.org/markup-compatibility/2006" xmlns:p14="http://schemas.microsoft.com/office/powerpoint/2010/main">
+        <mc:Choice Requires="p14">
           <p:contentPart p14:bwMode="auto" r:id="rId29">
             <p14:nvContentPartPr>
               <p14:cNvPr id="73" name="Ink 72">
@@ -32469,7 +32954,7 @@
             </p14:xfrm>
           </p:contentPart>
         </mc:Choice>
-        <mc:Fallback>
+        <mc:Fallback xmlns="">
           <p:pic>
             <p:nvPicPr>
               <p:cNvPr id="73" name="Ink 72">
@@ -32500,8 +32985,8 @@
           </p:pic>
         </mc:Fallback>
       </mc:AlternateContent>
-      <mc:AlternateContent xmlns:mc="http://schemas.openxmlformats.org/markup-compatibility/2006">
-        <mc:Choice xmlns:p14="http://schemas.microsoft.com/office/powerpoint/2010/main" Requires="p14">
+      <mc:AlternateContent xmlns:mc="http://schemas.openxmlformats.org/markup-compatibility/2006" xmlns:p14="http://schemas.microsoft.com/office/powerpoint/2010/main">
+        <mc:Choice Requires="p14">
           <p:contentPart p14:bwMode="auto" r:id="rId31">
             <p14:nvContentPartPr>
               <p14:cNvPr id="76" name="Ink 75">
@@ -32520,7 +33005,7 @@
             </p14:xfrm>
           </p:contentPart>
         </mc:Choice>
-        <mc:Fallback>
+        <mc:Fallback xmlns="">
           <p:pic>
             <p:nvPicPr>
               <p:cNvPr id="76" name="Ink 75">
@@ -32551,8 +33036,8 @@
           </p:pic>
         </mc:Fallback>
       </mc:AlternateContent>
-      <mc:AlternateContent xmlns:mc="http://schemas.openxmlformats.org/markup-compatibility/2006">
-        <mc:Choice xmlns:p14="http://schemas.microsoft.com/office/powerpoint/2010/main" Requires="p14">
+      <mc:AlternateContent xmlns:mc="http://schemas.openxmlformats.org/markup-compatibility/2006" xmlns:p14="http://schemas.microsoft.com/office/powerpoint/2010/main">
+        <mc:Choice Requires="p14">
           <p:contentPart p14:bwMode="auto" r:id="rId33">
             <p14:nvContentPartPr>
               <p14:cNvPr id="79" name="Ink 78">
@@ -32571,7 +33056,7 @@
             </p14:xfrm>
           </p:contentPart>
         </mc:Choice>
-        <mc:Fallback>
+        <mc:Fallback xmlns="">
           <p:pic>
             <p:nvPicPr>
               <p:cNvPr id="79" name="Ink 78">
@@ -32602,8 +33087,8 @@
           </p:pic>
         </mc:Fallback>
       </mc:AlternateContent>
-      <mc:AlternateContent xmlns:mc="http://schemas.openxmlformats.org/markup-compatibility/2006">
-        <mc:Choice xmlns:p14="http://schemas.microsoft.com/office/powerpoint/2010/main" Requires="p14">
+      <mc:AlternateContent xmlns:mc="http://schemas.openxmlformats.org/markup-compatibility/2006" xmlns:p14="http://schemas.microsoft.com/office/powerpoint/2010/main">
+        <mc:Choice Requires="p14">
           <p:contentPart p14:bwMode="auto" r:id="rId35">
             <p14:nvContentPartPr>
               <p14:cNvPr id="82" name="Ink 81">
@@ -32622,7 +33107,7 @@
             </p14:xfrm>
           </p:contentPart>
         </mc:Choice>
-        <mc:Fallback>
+        <mc:Fallback xmlns="">
           <p:pic>
             <p:nvPicPr>
               <p:cNvPr id="82" name="Ink 81">
@@ -32653,8 +33138,8 @@
           </p:pic>
         </mc:Fallback>
       </mc:AlternateContent>
-      <mc:AlternateContent xmlns:mc="http://schemas.openxmlformats.org/markup-compatibility/2006">
-        <mc:Choice xmlns:p14="http://schemas.microsoft.com/office/powerpoint/2010/main" Requires="p14">
+      <mc:AlternateContent xmlns:mc="http://schemas.openxmlformats.org/markup-compatibility/2006" xmlns:p14="http://schemas.microsoft.com/office/powerpoint/2010/main">
+        <mc:Choice Requires="p14">
           <p:contentPart p14:bwMode="auto" r:id="rId37">
             <p14:nvContentPartPr>
               <p14:cNvPr id="85" name="Ink 84">
@@ -32673,7 +33158,7 @@
             </p14:xfrm>
           </p:contentPart>
         </mc:Choice>
-        <mc:Fallback>
+        <mc:Fallback xmlns="">
           <p:pic>
             <p:nvPicPr>
               <p:cNvPr id="85" name="Ink 84">
@@ -32714,6 +33199,454 @@
   <p:clrMapOvr>
     <a:masterClrMapping/>
   </p:clrMapOvr>
+  <mc:AlternateContent xmlns:mc="http://schemas.openxmlformats.org/markup-compatibility/2006">
+    <mc:Choice xmlns:p14="http://schemas.microsoft.com/office/powerpoint/2010/main" Requires="p14">
+      <p:transition spd="med" p14:dur="700">
+        <p:fade/>
+      </p:transition>
+    </mc:Choice>
+    <mc:Fallback>
+      <p:transition spd="med">
+        <p:fade/>
+      </p:transition>
+    </mc:Fallback>
+  </mc:AlternateContent>
+  <p:timing>
+    <p:tnLst>
+      <p:par>
+        <p:cTn id="1" dur="indefinite" restart="never" nodeType="tmRoot">
+          <p:childTnLst>
+            <p:seq concurrent="1" nextAc="seek">
+              <p:cTn id="2" dur="indefinite" nodeType="mainSeq">
+                <p:childTnLst>
+                  <p:par>
+                    <p:cTn id="3" fill="hold">
+                      <p:stCondLst>
+                        <p:cond delay="indefinite"/>
+                      </p:stCondLst>
+                      <p:childTnLst>
+                        <p:par>
+                          <p:cTn id="4" fill="hold">
+                            <p:stCondLst>
+                              <p:cond delay="0"/>
+                            </p:stCondLst>
+                            <p:childTnLst>
+                              <p:par>
+                                <p:cTn id="5" presetID="10" presetClass="entr" presetSubtype="0" fill="hold" nodeType="clickEffect">
+                                  <p:stCondLst>
+                                    <p:cond delay="0"/>
+                                  </p:stCondLst>
+                                  <p:childTnLst>
+                                    <p:set>
+                                      <p:cBhvr>
+                                        <p:cTn id="6" dur="1" fill="hold">
+                                          <p:stCondLst>
+                                            <p:cond delay="0"/>
+                                          </p:stCondLst>
+                                        </p:cTn>
+                                        <p:tgtEl>
+                                          <p:spTgt spid="60"/>
+                                        </p:tgtEl>
+                                        <p:attrNameLst>
+                                          <p:attrName>style.visibility</p:attrName>
+                                        </p:attrNameLst>
+                                      </p:cBhvr>
+                                      <p:to>
+                                        <p:strVal val="visible"/>
+                                      </p:to>
+                                    </p:set>
+                                    <p:animEffect transition="in" filter="fade">
+                                      <p:cBhvr>
+                                        <p:cTn id="7" dur="500"/>
+                                        <p:tgtEl>
+                                          <p:spTgt spid="60"/>
+                                        </p:tgtEl>
+                                      </p:cBhvr>
+                                    </p:animEffect>
+                                  </p:childTnLst>
+                                </p:cTn>
+                              </p:par>
+                            </p:childTnLst>
+                          </p:cTn>
+                        </p:par>
+                      </p:childTnLst>
+                    </p:cTn>
+                  </p:par>
+                  <p:par>
+                    <p:cTn id="8" fill="hold">
+                      <p:stCondLst>
+                        <p:cond delay="indefinite"/>
+                      </p:stCondLst>
+                      <p:childTnLst>
+                        <p:par>
+                          <p:cTn id="9" fill="hold">
+                            <p:stCondLst>
+                              <p:cond delay="0"/>
+                            </p:stCondLst>
+                            <p:childTnLst>
+                              <p:par>
+                                <p:cTn id="10" presetID="10" presetClass="entr" presetSubtype="0" fill="hold" nodeType="clickEffect">
+                                  <p:stCondLst>
+                                    <p:cond delay="0"/>
+                                  </p:stCondLst>
+                                  <p:childTnLst>
+                                    <p:set>
+                                      <p:cBhvr>
+                                        <p:cTn id="11" dur="1" fill="hold">
+                                          <p:stCondLst>
+                                            <p:cond delay="0"/>
+                                          </p:stCondLst>
+                                        </p:cTn>
+                                        <p:tgtEl>
+                                          <p:spTgt spid="63"/>
+                                        </p:tgtEl>
+                                        <p:attrNameLst>
+                                          <p:attrName>style.visibility</p:attrName>
+                                        </p:attrNameLst>
+                                      </p:cBhvr>
+                                      <p:to>
+                                        <p:strVal val="visible"/>
+                                      </p:to>
+                                    </p:set>
+                                    <p:animEffect transition="in" filter="fade">
+                                      <p:cBhvr>
+                                        <p:cTn id="12" dur="500"/>
+                                        <p:tgtEl>
+                                          <p:spTgt spid="63"/>
+                                        </p:tgtEl>
+                                      </p:cBhvr>
+                                    </p:animEffect>
+                                  </p:childTnLst>
+                                </p:cTn>
+                              </p:par>
+                              <p:par>
+                                <p:cTn id="13" presetID="10" presetClass="entr" presetSubtype="0" fill="hold" nodeType="withEffect">
+                                  <p:stCondLst>
+                                    <p:cond delay="0"/>
+                                  </p:stCondLst>
+                                  <p:childTnLst>
+                                    <p:set>
+                                      <p:cBhvr>
+                                        <p:cTn id="14" dur="1" fill="hold">
+                                          <p:stCondLst>
+                                            <p:cond delay="0"/>
+                                          </p:stCondLst>
+                                        </p:cTn>
+                                        <p:tgtEl>
+                                          <p:spTgt spid="70"/>
+                                        </p:tgtEl>
+                                        <p:attrNameLst>
+                                          <p:attrName>style.visibility</p:attrName>
+                                        </p:attrNameLst>
+                                      </p:cBhvr>
+                                      <p:to>
+                                        <p:strVal val="visible"/>
+                                      </p:to>
+                                    </p:set>
+                                    <p:animEffect transition="in" filter="fade">
+                                      <p:cBhvr>
+                                        <p:cTn id="15" dur="500"/>
+                                        <p:tgtEl>
+                                          <p:spTgt spid="70"/>
+                                        </p:tgtEl>
+                                      </p:cBhvr>
+                                    </p:animEffect>
+                                  </p:childTnLst>
+                                </p:cTn>
+                              </p:par>
+                            </p:childTnLst>
+                          </p:cTn>
+                        </p:par>
+                      </p:childTnLst>
+                    </p:cTn>
+                  </p:par>
+                  <p:par>
+                    <p:cTn id="16" fill="hold">
+                      <p:stCondLst>
+                        <p:cond delay="indefinite"/>
+                      </p:stCondLst>
+                      <p:childTnLst>
+                        <p:par>
+                          <p:cTn id="17" fill="hold">
+                            <p:stCondLst>
+                              <p:cond delay="0"/>
+                            </p:stCondLst>
+                            <p:childTnLst>
+                              <p:par>
+                                <p:cTn id="18" presetID="10" presetClass="entr" presetSubtype="0" fill="hold" nodeType="clickEffect">
+                                  <p:stCondLst>
+                                    <p:cond delay="0"/>
+                                  </p:stCondLst>
+                                  <p:childTnLst>
+                                    <p:set>
+                                      <p:cBhvr>
+                                        <p:cTn id="19" dur="1" fill="hold">
+                                          <p:stCondLst>
+                                            <p:cond delay="0"/>
+                                          </p:stCondLst>
+                                        </p:cTn>
+                                        <p:tgtEl>
+                                          <p:spTgt spid="85"/>
+                                        </p:tgtEl>
+                                        <p:attrNameLst>
+                                          <p:attrName>style.visibility</p:attrName>
+                                        </p:attrNameLst>
+                                      </p:cBhvr>
+                                      <p:to>
+                                        <p:strVal val="visible"/>
+                                      </p:to>
+                                    </p:set>
+                                    <p:animEffect transition="in" filter="fade">
+                                      <p:cBhvr>
+                                        <p:cTn id="20" dur="500"/>
+                                        <p:tgtEl>
+                                          <p:spTgt spid="85"/>
+                                        </p:tgtEl>
+                                      </p:cBhvr>
+                                    </p:animEffect>
+                                  </p:childTnLst>
+                                </p:cTn>
+                              </p:par>
+                            </p:childTnLst>
+                          </p:cTn>
+                        </p:par>
+                      </p:childTnLst>
+                    </p:cTn>
+                  </p:par>
+                  <p:par>
+                    <p:cTn id="21" fill="hold">
+                      <p:stCondLst>
+                        <p:cond delay="indefinite"/>
+                      </p:stCondLst>
+                      <p:childTnLst>
+                        <p:par>
+                          <p:cTn id="22" fill="hold">
+                            <p:stCondLst>
+                              <p:cond delay="0"/>
+                            </p:stCondLst>
+                            <p:childTnLst>
+                              <p:par>
+                                <p:cTn id="23" presetID="10" presetClass="entr" presetSubtype="0" fill="hold" nodeType="clickEffect">
+                                  <p:stCondLst>
+                                    <p:cond delay="0"/>
+                                  </p:stCondLst>
+                                  <p:childTnLst>
+                                    <p:set>
+                                      <p:cBhvr>
+                                        <p:cTn id="24" dur="1" fill="hold">
+                                          <p:stCondLst>
+                                            <p:cond delay="0"/>
+                                          </p:stCondLst>
+                                        </p:cTn>
+                                        <p:tgtEl>
+                                          <p:spTgt spid="82"/>
+                                        </p:tgtEl>
+                                        <p:attrNameLst>
+                                          <p:attrName>style.visibility</p:attrName>
+                                        </p:attrNameLst>
+                                      </p:cBhvr>
+                                      <p:to>
+                                        <p:strVal val="visible"/>
+                                      </p:to>
+                                    </p:set>
+                                    <p:animEffect transition="in" filter="fade">
+                                      <p:cBhvr>
+                                        <p:cTn id="25" dur="500"/>
+                                        <p:tgtEl>
+                                          <p:spTgt spid="82"/>
+                                        </p:tgtEl>
+                                      </p:cBhvr>
+                                    </p:animEffect>
+                                  </p:childTnLst>
+                                </p:cTn>
+                              </p:par>
+                            </p:childTnLst>
+                          </p:cTn>
+                        </p:par>
+                      </p:childTnLst>
+                    </p:cTn>
+                  </p:par>
+                  <p:par>
+                    <p:cTn id="26" fill="hold">
+                      <p:stCondLst>
+                        <p:cond delay="indefinite"/>
+                      </p:stCondLst>
+                      <p:childTnLst>
+                        <p:par>
+                          <p:cTn id="27" fill="hold">
+                            <p:stCondLst>
+                              <p:cond delay="0"/>
+                            </p:stCondLst>
+                            <p:childTnLst>
+                              <p:par>
+                                <p:cTn id="28" presetID="10" presetClass="entr" presetSubtype="0" fill="hold" nodeType="clickEffect">
+                                  <p:stCondLst>
+                                    <p:cond delay="0"/>
+                                  </p:stCondLst>
+                                  <p:childTnLst>
+                                    <p:set>
+                                      <p:cBhvr>
+                                        <p:cTn id="29" dur="1" fill="hold">
+                                          <p:stCondLst>
+                                            <p:cond delay="0"/>
+                                          </p:stCondLst>
+                                        </p:cTn>
+                                        <p:tgtEl>
+                                          <p:spTgt spid="76"/>
+                                        </p:tgtEl>
+                                        <p:attrNameLst>
+                                          <p:attrName>style.visibility</p:attrName>
+                                        </p:attrNameLst>
+                                      </p:cBhvr>
+                                      <p:to>
+                                        <p:strVal val="visible"/>
+                                      </p:to>
+                                    </p:set>
+                                    <p:animEffect transition="in" filter="fade">
+                                      <p:cBhvr>
+                                        <p:cTn id="30" dur="500"/>
+                                        <p:tgtEl>
+                                          <p:spTgt spid="76"/>
+                                        </p:tgtEl>
+                                      </p:cBhvr>
+                                    </p:animEffect>
+                                  </p:childTnLst>
+                                </p:cTn>
+                              </p:par>
+                            </p:childTnLst>
+                          </p:cTn>
+                        </p:par>
+                      </p:childTnLst>
+                    </p:cTn>
+                  </p:par>
+                  <p:par>
+                    <p:cTn id="31" fill="hold">
+                      <p:stCondLst>
+                        <p:cond delay="indefinite"/>
+                      </p:stCondLst>
+                      <p:childTnLst>
+                        <p:par>
+                          <p:cTn id="32" fill="hold">
+                            <p:stCondLst>
+                              <p:cond delay="0"/>
+                            </p:stCondLst>
+                            <p:childTnLst>
+                              <p:par>
+                                <p:cTn id="33" presetID="10" presetClass="entr" presetSubtype="0" fill="hold" nodeType="clickEffect">
+                                  <p:stCondLst>
+                                    <p:cond delay="0"/>
+                                  </p:stCondLst>
+                                  <p:childTnLst>
+                                    <p:set>
+                                      <p:cBhvr>
+                                        <p:cTn id="34" dur="1" fill="hold">
+                                          <p:stCondLst>
+                                            <p:cond delay="0"/>
+                                          </p:stCondLst>
+                                        </p:cTn>
+                                        <p:tgtEl>
+                                          <p:spTgt spid="79"/>
+                                        </p:tgtEl>
+                                        <p:attrNameLst>
+                                          <p:attrName>style.visibility</p:attrName>
+                                        </p:attrNameLst>
+                                      </p:cBhvr>
+                                      <p:to>
+                                        <p:strVal val="visible"/>
+                                      </p:to>
+                                    </p:set>
+                                    <p:animEffect transition="in" filter="fade">
+                                      <p:cBhvr>
+                                        <p:cTn id="35" dur="500"/>
+                                        <p:tgtEl>
+                                          <p:spTgt spid="79"/>
+                                        </p:tgtEl>
+                                      </p:cBhvr>
+                                    </p:animEffect>
+                                  </p:childTnLst>
+                                </p:cTn>
+                              </p:par>
+                            </p:childTnLst>
+                          </p:cTn>
+                        </p:par>
+                      </p:childTnLst>
+                    </p:cTn>
+                  </p:par>
+                  <p:par>
+                    <p:cTn id="36" fill="hold">
+                      <p:stCondLst>
+                        <p:cond delay="indefinite"/>
+                      </p:stCondLst>
+                      <p:childTnLst>
+                        <p:par>
+                          <p:cTn id="37" fill="hold">
+                            <p:stCondLst>
+                              <p:cond delay="0"/>
+                            </p:stCondLst>
+                            <p:childTnLst>
+                              <p:par>
+                                <p:cTn id="38" presetID="10" presetClass="entr" presetSubtype="0" fill="hold" nodeType="clickEffect">
+                                  <p:stCondLst>
+                                    <p:cond delay="0"/>
+                                  </p:stCondLst>
+                                  <p:childTnLst>
+                                    <p:set>
+                                      <p:cBhvr>
+                                        <p:cTn id="39" dur="1" fill="hold">
+                                          <p:stCondLst>
+                                            <p:cond delay="0"/>
+                                          </p:stCondLst>
+                                        </p:cTn>
+                                        <p:tgtEl>
+                                          <p:spTgt spid="73"/>
+                                        </p:tgtEl>
+                                        <p:attrNameLst>
+                                          <p:attrName>style.visibility</p:attrName>
+                                        </p:attrNameLst>
+                                      </p:cBhvr>
+                                      <p:to>
+                                        <p:strVal val="visible"/>
+                                      </p:to>
+                                    </p:set>
+                                    <p:animEffect transition="in" filter="fade">
+                                      <p:cBhvr>
+                                        <p:cTn id="40" dur="500"/>
+                                        <p:tgtEl>
+                                          <p:spTgt spid="73"/>
+                                        </p:tgtEl>
+                                      </p:cBhvr>
+                                    </p:animEffect>
+                                  </p:childTnLst>
+                                </p:cTn>
+                              </p:par>
+                            </p:childTnLst>
+                          </p:cTn>
+                        </p:par>
+                      </p:childTnLst>
+                    </p:cTn>
+                  </p:par>
+                </p:childTnLst>
+              </p:cTn>
+              <p:prevCondLst>
+                <p:cond evt="onPrev" delay="0">
+                  <p:tgtEl>
+                    <p:sldTgt/>
+                  </p:tgtEl>
+                </p:cond>
+              </p:prevCondLst>
+              <p:nextCondLst>
+                <p:cond evt="onNext" delay="0">
+                  <p:tgtEl>
+                    <p:sldTgt/>
+                  </p:tgtEl>
+                </p:cond>
+              </p:nextCondLst>
+            </p:seq>
+          </p:childTnLst>
+        </p:cTn>
+      </p:par>
+    </p:tnLst>
+  </p:timing>
 </p:sld>
 </file>
 
@@ -32809,7 +33742,7 @@
           <p:nvPr/>
         </p:nvPicPr>
         <p:blipFill>
-          <a:blip r:embed="rId2"/>
+          <a:blip r:embed="rId3"/>
           <a:stretch>
             <a:fillRect/>
           </a:stretch>
@@ -32834,6 +33767,18 @@
   <p:clrMapOvr>
     <a:masterClrMapping/>
   </p:clrMapOvr>
+  <mc:AlternateContent xmlns:mc="http://schemas.openxmlformats.org/markup-compatibility/2006">
+    <mc:Choice xmlns:p14="http://schemas.microsoft.com/office/powerpoint/2010/main" Requires="p14">
+      <p:transition spd="med" p14:dur="700">
+        <p:fade/>
+      </p:transition>
+    </mc:Choice>
+    <mc:Fallback>
+      <p:transition spd="med">
+        <p:fade/>
+      </p:transition>
+    </mc:Fallback>
+  </mc:AlternateContent>
 </p:sld>
 </file>
 
@@ -32958,7 +33903,7 @@
           <p:nvPr/>
         </p:nvPicPr>
         <p:blipFill>
-          <a:blip r:embed="rId2"/>
+          <a:blip r:embed="rId3"/>
           <a:stretch>
             <a:fillRect/>
           </a:stretch>
@@ -32983,6 +33928,18 @@
   <p:clrMapOvr>
     <a:masterClrMapping/>
   </p:clrMapOvr>
+  <mc:AlternateContent xmlns:mc="http://schemas.openxmlformats.org/markup-compatibility/2006">
+    <mc:Choice xmlns:p14="http://schemas.microsoft.com/office/powerpoint/2010/main" Requires="p14">
+      <p:transition spd="med" p14:dur="700">
+        <p:fade/>
+      </p:transition>
+    </mc:Choice>
+    <mc:Fallback>
+      <p:transition spd="med">
+        <p:fade/>
+      </p:transition>
+    </mc:Fallback>
+  </mc:AlternateContent>
 </p:sld>
 </file>
 
@@ -33079,6 +34036,18 @@
   <p:clrMapOvr>
     <a:masterClrMapping/>
   </p:clrMapOvr>
+  <mc:AlternateContent xmlns:mc="http://schemas.openxmlformats.org/markup-compatibility/2006">
+    <mc:Choice xmlns:p14="http://schemas.microsoft.com/office/powerpoint/2010/main" Requires="p14">
+      <p:transition spd="med" p14:dur="700">
+        <p:fade/>
+      </p:transition>
+    </mc:Choice>
+    <mc:Fallback>
+      <p:transition spd="med">
+        <p:fade/>
+      </p:transition>
+    </mc:Fallback>
+  </mc:AlternateContent>
 </p:sld>
 </file>
 
@@ -33232,13 +34201,13 @@
   <p:clrMapOvr>
     <a:masterClrMapping/>
   </p:clrMapOvr>
-  <mc:AlternateContent xmlns:mc="http://schemas.openxmlformats.org/markup-compatibility/2006">
-    <mc:Choice xmlns:p14="http://schemas.microsoft.com/office/powerpoint/2010/main" Requires="p14">
+  <mc:AlternateContent xmlns:mc="http://schemas.openxmlformats.org/markup-compatibility/2006" xmlns:p14="http://schemas.microsoft.com/office/powerpoint/2010/main">
+    <mc:Choice Requires="p14">
       <p:transition spd="med" p14:dur="700">
         <p:fade/>
       </p:transition>
     </mc:Choice>
-    <mc:Fallback>
+    <mc:Fallback xmlns="">
       <p:transition spd="med">
         <p:fade/>
       </p:transition>
@@ -33304,6 +34273,18 @@
   <p:clrMapOvr>
     <a:masterClrMapping/>
   </p:clrMapOvr>
+  <mc:AlternateContent xmlns:mc="http://schemas.openxmlformats.org/markup-compatibility/2006">
+    <mc:Choice xmlns:p14="http://schemas.microsoft.com/office/powerpoint/2010/main" Requires="p14">
+      <p:transition spd="med" p14:dur="700">
+        <p:fade/>
+      </p:transition>
+    </mc:Choice>
+    <mc:Fallback>
+      <p:transition spd="med">
+        <p:fade/>
+      </p:transition>
+    </mc:Fallback>
+  </mc:AlternateContent>
 </p:sld>
 </file>
 
@@ -33408,22 +34389,8 @@
             </a:pPr>
             <a:r>
               <a:rPr lang="en-CA" dirty="0"/>
-              <a:t>The Orchestration Client is the entry point (starter function). Notice the </a:t>
-            </a:r>
-            <a:r>
-              <a:rPr lang="en-CA" b="1" dirty="0" err="1"/>
-              <a:t>OrchestrationClient</a:t>
-            </a:r>
-            <a:r>
-              <a:rPr lang="en-CA" dirty="0"/>
-              <a:t> attribute.</a:t>
-            </a:r>
-          </a:p>
-          <a:p>
-            <a:pPr marL="0" indent="0">
-              <a:buNone/>
-            </a:pPr>
-            <a:endParaRPr lang="en-CA" dirty="0"/>
+              <a:t>The Orchestration Client is the entry point - starter function</a:t>
+            </a:r>
           </a:p>
         </p:txBody>
       </p:sp>
@@ -33456,8 +34423,8 @@
           </a:p>
         </p:txBody>
       </p:sp>
-      <mc:AlternateContent xmlns:mc="http://schemas.openxmlformats.org/markup-compatibility/2006">
-        <mc:Choice xmlns:p14="http://schemas.microsoft.com/office/powerpoint/2010/main" Requires="p14">
+      <mc:AlternateContent xmlns:mc="http://schemas.openxmlformats.org/markup-compatibility/2006" xmlns:p14="http://schemas.microsoft.com/office/powerpoint/2010/main">
+        <mc:Choice Requires="p14">
           <p:contentPart p14:bwMode="auto" r:id="rId4">
             <p14:nvContentPartPr>
               <p14:cNvPr id="9" name="Ink 8">
@@ -33476,7 +34443,7 @@
             </p14:xfrm>
           </p:contentPart>
         </mc:Choice>
-        <mc:Fallback>
+        <mc:Fallback xmlns="">
           <p:pic>
             <p:nvPicPr>
               <p:cNvPr id="9" name="Ink 8">
@@ -33507,8 +34474,8 @@
           </p:pic>
         </mc:Fallback>
       </mc:AlternateContent>
-      <mc:AlternateContent xmlns:mc="http://schemas.openxmlformats.org/markup-compatibility/2006">
-        <mc:Choice xmlns:p14="http://schemas.microsoft.com/office/powerpoint/2010/main" Requires="p14">
+      <mc:AlternateContent xmlns:mc="http://schemas.openxmlformats.org/markup-compatibility/2006" xmlns:p14="http://schemas.microsoft.com/office/powerpoint/2010/main">
+        <mc:Choice Requires="p14">
           <p:contentPart p14:bwMode="auto" r:id="rId6">
             <p14:nvContentPartPr>
               <p14:cNvPr id="13" name="Ink 12">
@@ -33527,7 +34494,7 @@
             </p14:xfrm>
           </p:contentPart>
         </mc:Choice>
-        <mc:Fallback>
+        <mc:Fallback xmlns="">
           <p:pic>
             <p:nvPicPr>
               <p:cNvPr id="13" name="Ink 12">
@@ -33558,8 +34525,8 @@
           </p:pic>
         </mc:Fallback>
       </mc:AlternateContent>
-      <mc:AlternateContent xmlns:mc="http://schemas.openxmlformats.org/markup-compatibility/2006">
-        <mc:Choice xmlns:p14="http://schemas.microsoft.com/office/powerpoint/2010/main" Requires="p14">
+      <mc:AlternateContent xmlns:mc="http://schemas.openxmlformats.org/markup-compatibility/2006" xmlns:p14="http://schemas.microsoft.com/office/powerpoint/2010/main">
+        <mc:Choice Requires="p14">
           <p:contentPart p14:bwMode="auto" r:id="rId8">
             <p14:nvContentPartPr>
               <p14:cNvPr id="14" name="Ink 13">
@@ -33578,7 +34545,7 @@
             </p14:xfrm>
           </p:contentPart>
         </mc:Choice>
-        <mc:Fallback>
+        <mc:Fallback xmlns="">
           <p:pic>
             <p:nvPicPr>
               <p:cNvPr id="14" name="Ink 13">
@@ -33609,8 +34576,8 @@
           </p:pic>
         </mc:Fallback>
       </mc:AlternateContent>
-      <mc:AlternateContent xmlns:mc="http://schemas.openxmlformats.org/markup-compatibility/2006">
-        <mc:Choice xmlns:p14="http://schemas.microsoft.com/office/powerpoint/2010/main" Requires="p14">
+      <mc:AlternateContent xmlns:mc="http://schemas.openxmlformats.org/markup-compatibility/2006" xmlns:p14="http://schemas.microsoft.com/office/powerpoint/2010/main">
+        <mc:Choice Requires="p14">
           <p:contentPart p14:bwMode="auto" r:id="rId10">
             <p14:nvContentPartPr>
               <p14:cNvPr id="22" name="Ink 21">
@@ -33629,7 +34596,7 @@
             </p14:xfrm>
           </p:contentPart>
         </mc:Choice>
-        <mc:Fallback>
+        <mc:Fallback xmlns="">
           <p:pic>
             <p:nvPicPr>
               <p:cNvPr id="22" name="Ink 21">
@@ -33670,13 +34637,13 @@
   <p:clrMapOvr>
     <a:masterClrMapping/>
   </p:clrMapOvr>
-  <mc:AlternateContent xmlns:mc="http://schemas.openxmlformats.org/markup-compatibility/2006">
-    <mc:Choice xmlns:p14="http://schemas.microsoft.com/office/powerpoint/2010/main" Requires="p14">
+  <mc:AlternateContent xmlns:mc="http://schemas.openxmlformats.org/markup-compatibility/2006" xmlns:p14="http://schemas.microsoft.com/office/powerpoint/2010/main">
+    <mc:Choice Requires="p14">
       <p:transition spd="med" p14:dur="700">
         <p:fade/>
       </p:transition>
     </mc:Choice>
-    <mc:Fallback>
+    <mc:Fallback xmlns="">
       <p:transition spd="med">
         <p:fade/>
       </p:transition>
@@ -33686,6 +34653,157 @@
 </file>
 
 <file path=ppt/slides/slide21.xml><?xml version="1.0" encoding="utf-8"?>
+<p:sld xmlns:a="http://schemas.openxmlformats.org/drawingml/2006/main" xmlns:r="http://schemas.openxmlformats.org/officeDocument/2006/relationships" xmlns:p="http://schemas.openxmlformats.org/presentationml/2006/main">
+  <p:cSld>
+    <p:spTree>
+      <p:nvGrpSpPr>
+        <p:cNvPr id="1" name=""/>
+        <p:cNvGrpSpPr/>
+        <p:nvPr/>
+      </p:nvGrpSpPr>
+      <p:grpSpPr>
+        <a:xfrm>
+          <a:off x="0" y="0"/>
+          <a:ext cx="0" cy="0"/>
+          <a:chOff x="0" y="0"/>
+          <a:chExt cx="0" cy="0"/>
+        </a:xfrm>
+      </p:grpSpPr>
+      <p:sp>
+        <p:nvSpPr>
+          <p:cNvPr id="2" name="Title 1">
+            <a:extLst>
+              <a:ext uri="{FF2B5EF4-FFF2-40B4-BE49-F238E27FC236}">
+                <a16:creationId xmlns:a16="http://schemas.microsoft.com/office/drawing/2014/main" id="{060EA0BF-0C4D-4A88-AAF5-5E30C0829FB5}"/>
+              </a:ext>
+            </a:extLst>
+          </p:cNvPr>
+          <p:cNvSpPr>
+            <a:spLocks noGrp="1"/>
+          </p:cNvSpPr>
+          <p:nvPr>
+            <p:ph type="title"/>
+          </p:nvPr>
+        </p:nvSpPr>
+        <p:spPr/>
+        <p:txBody>
+          <a:bodyPr/>
+          <a:lstStyle/>
+          <a:p>
+            <a:r>
+              <a:rPr lang="en-CA" dirty="0"/>
+              <a:t>URLs for checking status of execution</a:t>
+            </a:r>
+          </a:p>
+        </p:txBody>
+      </p:sp>
+      <p:sp>
+        <p:nvSpPr>
+          <p:cNvPr id="3" name="Content Placeholder 2">
+            <a:extLst>
+              <a:ext uri="{FF2B5EF4-FFF2-40B4-BE49-F238E27FC236}">
+                <a16:creationId xmlns:a16="http://schemas.microsoft.com/office/drawing/2014/main" id="{D7C19211-4512-4F86-931C-2C87F1ECB13F}"/>
+              </a:ext>
+            </a:extLst>
+          </p:cNvPr>
+          <p:cNvSpPr>
+            <a:spLocks noGrp="1"/>
+          </p:cNvSpPr>
+          <p:nvPr>
+            <p:ph idx="1"/>
+          </p:nvPr>
+        </p:nvSpPr>
+        <p:spPr/>
+        <p:txBody>
+          <a:bodyPr>
+            <a:normAutofit/>
+          </a:bodyPr>
+          <a:lstStyle/>
+          <a:p>
+            <a:r>
+              <a:rPr lang="en-US" dirty="0" err="1"/>
+              <a:t>StatusQueryGetUri</a:t>
+            </a:r>
+            <a:endParaRPr lang="en-US" dirty="0"/>
+          </a:p>
+          <a:p>
+            <a:r>
+              <a:rPr lang="en-US" dirty="0" err="1"/>
+              <a:t>SendEventPostUri</a:t>
+            </a:r>
+            <a:endParaRPr lang="en-US" dirty="0"/>
+          </a:p>
+          <a:p>
+            <a:r>
+              <a:rPr lang="en-US" dirty="0" err="1"/>
+              <a:t>TerminatePostUri</a:t>
+            </a:r>
+            <a:endParaRPr lang="en-US" dirty="0"/>
+          </a:p>
+          <a:p>
+            <a:r>
+              <a:rPr lang="en-US" dirty="0" err="1"/>
+              <a:t>RewindPostUri</a:t>
+            </a:r>
+            <a:endParaRPr lang="en-CA" dirty="0"/>
+          </a:p>
+        </p:txBody>
+      </p:sp>
+      <p:sp>
+        <p:nvSpPr>
+          <p:cNvPr id="4" name="Slide Number Placeholder 3">
+            <a:extLst>
+              <a:ext uri="{FF2B5EF4-FFF2-40B4-BE49-F238E27FC236}">
+                <a16:creationId xmlns:a16="http://schemas.microsoft.com/office/drawing/2014/main" id="{D856F01B-F87C-432C-A7C1-926C596E3188}"/>
+              </a:ext>
+            </a:extLst>
+          </p:cNvPr>
+          <p:cNvSpPr>
+            <a:spLocks noGrp="1"/>
+          </p:cNvSpPr>
+          <p:nvPr>
+            <p:ph type="sldNum" sz="quarter" idx="12"/>
+          </p:nvPr>
+        </p:nvSpPr>
+        <p:spPr/>
+        <p:txBody>
+          <a:bodyPr/>
+          <a:lstStyle/>
+          <a:p>
+            <a:fld id="{0A164282-434E-41D4-9582-783D542A7B68}" type="slidenum">
+              <a:rPr lang="en-US" smtClean="0"/>
+              <a:t>21</a:t>
+            </a:fld>
+            <a:endParaRPr lang="en-US" dirty="0"/>
+          </a:p>
+        </p:txBody>
+      </p:sp>
+    </p:spTree>
+    <p:extLst>
+      <p:ext uri="{BB962C8B-B14F-4D97-AF65-F5344CB8AC3E}">
+        <p14:creationId xmlns:p14="http://schemas.microsoft.com/office/powerpoint/2010/main" val="2169545009"/>
+      </p:ext>
+    </p:extLst>
+  </p:cSld>
+  <p:clrMapOvr>
+    <a:masterClrMapping/>
+  </p:clrMapOvr>
+  <mc:AlternateContent xmlns:mc="http://schemas.openxmlformats.org/markup-compatibility/2006" xmlns:p14="http://schemas.microsoft.com/office/powerpoint/2010/main">
+    <mc:Choice Requires="p14">
+      <p:transition spd="med" p14:dur="700">
+        <p:fade/>
+      </p:transition>
+    </mc:Choice>
+    <mc:Fallback xmlns="">
+      <p:transition spd="med">
+        <p:fade/>
+      </p:transition>
+    </mc:Fallback>
+  </mc:AlternateContent>
+</p:sld>
+</file>
+
+<file path=ppt/slides/slide22.xml><?xml version="1.0" encoding="utf-8"?>
 <p:sld xmlns:a="http://schemas.openxmlformats.org/drawingml/2006/main" xmlns:r="http://schemas.openxmlformats.org/officeDocument/2006/relationships" xmlns:p="http://schemas.openxmlformats.org/presentationml/2006/main">
   <p:cSld>
     <p:spTree>
@@ -33785,7 +34903,7 @@
           <a:p>
             <a:fld id="{0A164282-434E-41D4-9582-783D542A7B68}" type="slidenum">
               <a:rPr lang="en-US" smtClean="0"/>
-              <a:t>21</a:t>
+              <a:t>22</a:t>
             </a:fld>
             <a:endParaRPr lang="en-US" dirty="0"/>
           </a:p>
@@ -33821,8 +34939,8 @@
           </a:prstGeom>
         </p:spPr>
       </p:pic>
-      <mc:AlternateContent xmlns:mc="http://schemas.openxmlformats.org/markup-compatibility/2006">
-        <mc:Choice xmlns:p14="http://schemas.microsoft.com/office/powerpoint/2010/main" Requires="p14">
+      <mc:AlternateContent xmlns:mc="http://schemas.openxmlformats.org/markup-compatibility/2006" xmlns:p14="http://schemas.microsoft.com/office/powerpoint/2010/main">
+        <mc:Choice Requires="p14">
           <p:contentPart p14:bwMode="auto" r:id="rId4">
             <p14:nvContentPartPr>
               <p14:cNvPr id="10" name="Ink 9">
@@ -33841,7 +34959,7 @@
             </p14:xfrm>
           </p:contentPart>
         </mc:Choice>
-        <mc:Fallback>
+        <mc:Fallback xmlns="">
           <p:pic>
             <p:nvPicPr>
               <p:cNvPr id="10" name="Ink 9">
@@ -33872,8 +34990,8 @@
           </p:pic>
         </mc:Fallback>
       </mc:AlternateContent>
-      <mc:AlternateContent xmlns:mc="http://schemas.openxmlformats.org/markup-compatibility/2006">
-        <mc:Choice xmlns:p14="http://schemas.microsoft.com/office/powerpoint/2010/main" Requires="p14">
+      <mc:AlternateContent xmlns:mc="http://schemas.openxmlformats.org/markup-compatibility/2006" xmlns:p14="http://schemas.microsoft.com/office/powerpoint/2010/main">
+        <mc:Choice Requires="p14">
           <p:contentPart p14:bwMode="auto" r:id="rId6">
             <p14:nvContentPartPr>
               <p14:cNvPr id="14" name="Ink 13">
@@ -33892,7 +35010,7 @@
             </p14:xfrm>
           </p:contentPart>
         </mc:Choice>
-        <mc:Fallback>
+        <mc:Fallback xmlns="">
           <p:pic>
             <p:nvPicPr>
               <p:cNvPr id="14" name="Ink 13">
@@ -33933,13 +35051,13 @@
   <p:clrMapOvr>
     <a:masterClrMapping/>
   </p:clrMapOvr>
-  <mc:AlternateContent xmlns:mc="http://schemas.openxmlformats.org/markup-compatibility/2006">
-    <mc:Choice xmlns:p14="http://schemas.microsoft.com/office/powerpoint/2010/main" Requires="p14">
+  <mc:AlternateContent xmlns:mc="http://schemas.openxmlformats.org/markup-compatibility/2006" xmlns:p14="http://schemas.microsoft.com/office/powerpoint/2010/main">
+    <mc:Choice Requires="p14">
       <p:transition spd="med" p14:dur="700">
         <p:fade/>
       </p:transition>
     </mc:Choice>
-    <mc:Fallback>
+    <mc:Fallback xmlns="">
       <p:transition spd="med">
         <p:fade/>
       </p:transition>
@@ -33948,7 +35066,7 @@
 </p:sld>
 </file>
 
-<file path=ppt/slides/slide22.xml><?xml version="1.0" encoding="utf-8"?>
+<file path=ppt/slides/slide23.xml><?xml version="1.0" encoding="utf-8"?>
 <p:sld xmlns:a="http://schemas.openxmlformats.org/drawingml/2006/main" xmlns:r="http://schemas.openxmlformats.org/officeDocument/2006/relationships" xmlns:p="http://schemas.openxmlformats.org/presentationml/2006/main">
   <p:cSld>
     <p:spTree>
@@ -34019,7 +35137,7 @@
             </a:pPr>
             <a:r>
               <a:rPr lang="en-CA" dirty="0"/>
-              <a:t>The activity function is the equivalent of a regular Azure Function with the difference – invoked by a durable orchestrator. </a:t>
+              <a:t>The activity function is the equivalent of a regular Azure Function with one difference – it was invoked by a durable orchestrator</a:t>
             </a:r>
           </a:p>
         </p:txBody>
@@ -34047,7 +35165,7 @@
           <a:p>
             <a:fld id="{0A164282-434E-41D4-9582-783D542A7B68}" type="slidenum">
               <a:rPr lang="en-US" smtClean="0"/>
-              <a:t>22</a:t>
+              <a:t>23</a:t>
             </a:fld>
             <a:endParaRPr lang="en-US" dirty="0"/>
           </a:p>
@@ -34083,8 +35201,8 @@
           </a:prstGeom>
         </p:spPr>
       </p:pic>
-      <mc:AlternateContent xmlns:mc="http://schemas.openxmlformats.org/markup-compatibility/2006">
-        <mc:Choice xmlns:p14="http://schemas.microsoft.com/office/powerpoint/2010/main" Requires="p14">
+      <mc:AlternateContent xmlns:mc="http://schemas.openxmlformats.org/markup-compatibility/2006" xmlns:p14="http://schemas.microsoft.com/office/powerpoint/2010/main">
+        <mc:Choice Requires="p14">
           <p:contentPart p14:bwMode="auto" r:id="rId4">
             <p14:nvContentPartPr>
               <p14:cNvPr id="11" name="Ink 10">
@@ -34103,7 +35221,7 @@
             </p14:xfrm>
           </p:contentPart>
         </mc:Choice>
-        <mc:Fallback>
+        <mc:Fallback xmlns="">
           <p:pic>
             <p:nvPicPr>
               <p:cNvPr id="11" name="Ink 10">
@@ -34134,8 +35252,8 @@
           </p:pic>
         </mc:Fallback>
       </mc:AlternateContent>
-      <mc:AlternateContent xmlns:mc="http://schemas.openxmlformats.org/markup-compatibility/2006">
-        <mc:Choice xmlns:p14="http://schemas.microsoft.com/office/powerpoint/2010/main" Requires="p14">
+      <mc:AlternateContent xmlns:mc="http://schemas.openxmlformats.org/markup-compatibility/2006" xmlns:p14="http://schemas.microsoft.com/office/powerpoint/2010/main">
+        <mc:Choice Requires="p14">
           <p:contentPart p14:bwMode="auto" r:id="rId6">
             <p14:nvContentPartPr>
               <p14:cNvPr id="14" name="Ink 13">
@@ -34154,7 +35272,7 @@
             </p14:xfrm>
           </p:contentPart>
         </mc:Choice>
-        <mc:Fallback>
+        <mc:Fallback xmlns="">
           <p:pic>
             <p:nvPicPr>
               <p:cNvPr id="14" name="Ink 13">
@@ -34195,13 +35313,13 @@
   <p:clrMapOvr>
     <a:masterClrMapping/>
   </p:clrMapOvr>
-  <mc:AlternateContent xmlns:mc="http://schemas.openxmlformats.org/markup-compatibility/2006">
-    <mc:Choice xmlns:p14="http://schemas.microsoft.com/office/powerpoint/2010/main" Requires="p14">
+  <mc:AlternateContent xmlns:mc="http://schemas.openxmlformats.org/markup-compatibility/2006" xmlns:p14="http://schemas.microsoft.com/office/powerpoint/2010/main">
+    <mc:Choice Requires="p14">
       <p:transition spd="med" p14:dur="700">
         <p:fade/>
       </p:transition>
     </mc:Choice>
-    <mc:Fallback>
+    <mc:Fallback xmlns="">
       <p:transition spd="med">
         <p:fade/>
       </p:transition>
@@ -34210,7 +35328,7 @@
 </p:sld>
 </file>
 
-<file path=ppt/slides/slide23.xml><?xml version="1.0" encoding="utf-8"?>
+<file path=ppt/slides/slide24.xml><?xml version="1.0" encoding="utf-8"?>
 <p:sld xmlns:a="http://schemas.openxmlformats.org/drawingml/2006/main" xmlns:r="http://schemas.openxmlformats.org/officeDocument/2006/relationships" xmlns:p="http://schemas.openxmlformats.org/presentationml/2006/main">
   <p:cSld>
     <p:spTree>
@@ -34284,13 +35402,7 @@
               <a:rPr lang="en-CA" dirty="0">
                 <a:hlinkClick r:id="rId3"/>
               </a:rPr>
-              <a:t>Visual Studio </a:t>
-            </a:r>
-            <a:r>
-              <a:rPr lang="en-CA" dirty="0">
-                <a:hlinkClick r:id="rId3"/>
-              </a:rPr>
-              <a:t>2017/2019 </a:t>
+              <a:t>Visual Studio 2017/2019 </a:t>
             </a:r>
             <a:r>
               <a:rPr lang="en-CA" dirty="0"/>
@@ -34368,7 +35480,7 @@
           <a:p>
             <a:fld id="{0A164282-434E-41D4-9582-783D542A7B68}" type="slidenum">
               <a:rPr lang="en-US" smtClean="0"/>
-              <a:t>23</a:t>
+              <a:t>24</a:t>
             </a:fld>
             <a:endParaRPr lang="en-US" dirty="0"/>
           </a:p>
@@ -34399,7 +35511,7 @@
 </p:sld>
 </file>
 
-<file path=ppt/slides/slide24.xml><?xml version="1.0" encoding="utf-8"?>
+<file path=ppt/slides/slide25.xml><?xml version="1.0" encoding="utf-8"?>
 <p:sld xmlns:a="http://schemas.openxmlformats.org/drawingml/2006/main" xmlns:r="http://schemas.openxmlformats.org/officeDocument/2006/relationships" xmlns:p="http://schemas.openxmlformats.org/presentationml/2006/main">
   <p:cSld>
     <p:spTree>
@@ -34492,157 +35604,6 @@
     <p:extLst>
       <p:ext uri="{BB962C8B-B14F-4D97-AF65-F5344CB8AC3E}">
         <p14:creationId xmlns:p14="http://schemas.microsoft.com/office/powerpoint/2010/main" val="830037245"/>
-      </p:ext>
-    </p:extLst>
-  </p:cSld>
-  <p:clrMapOvr>
-    <a:masterClrMapping/>
-  </p:clrMapOvr>
-  <mc:AlternateContent xmlns:mc="http://schemas.openxmlformats.org/markup-compatibility/2006" xmlns:p14="http://schemas.microsoft.com/office/powerpoint/2010/main">
-    <mc:Choice Requires="p14">
-      <p:transition spd="med" p14:dur="700">
-        <p:fade/>
-      </p:transition>
-    </mc:Choice>
-    <mc:Fallback xmlns="">
-      <p:transition spd="med">
-        <p:fade/>
-      </p:transition>
-    </mc:Fallback>
-  </mc:AlternateContent>
-</p:sld>
-</file>
-
-<file path=ppt/slides/slide25.xml><?xml version="1.0" encoding="utf-8"?>
-<p:sld xmlns:a="http://schemas.openxmlformats.org/drawingml/2006/main" xmlns:r="http://schemas.openxmlformats.org/officeDocument/2006/relationships" xmlns:p="http://schemas.openxmlformats.org/presentationml/2006/main">
-  <p:cSld>
-    <p:spTree>
-      <p:nvGrpSpPr>
-        <p:cNvPr id="1" name=""/>
-        <p:cNvGrpSpPr/>
-        <p:nvPr/>
-      </p:nvGrpSpPr>
-      <p:grpSpPr>
-        <a:xfrm>
-          <a:off x="0" y="0"/>
-          <a:ext cx="0" cy="0"/>
-          <a:chOff x="0" y="0"/>
-          <a:chExt cx="0" cy="0"/>
-        </a:xfrm>
-      </p:grpSpPr>
-      <p:sp>
-        <p:nvSpPr>
-          <p:cNvPr id="2" name="Title 1">
-            <a:extLst>
-              <a:ext uri="{FF2B5EF4-FFF2-40B4-BE49-F238E27FC236}">
-                <a16:creationId xmlns:a16="http://schemas.microsoft.com/office/drawing/2014/main" id="{060EA0BF-0C4D-4A88-AAF5-5E30C0829FB5}"/>
-              </a:ext>
-            </a:extLst>
-          </p:cNvPr>
-          <p:cNvSpPr>
-            <a:spLocks noGrp="1"/>
-          </p:cNvSpPr>
-          <p:nvPr>
-            <p:ph type="title"/>
-          </p:nvPr>
-        </p:nvSpPr>
-        <p:spPr/>
-        <p:txBody>
-          <a:bodyPr/>
-          <a:lstStyle/>
-          <a:p>
-            <a:r>
-              <a:rPr lang="en-CA" dirty="0"/>
-              <a:t>URLs for checking status of execution</a:t>
-            </a:r>
-          </a:p>
-        </p:txBody>
-      </p:sp>
-      <p:sp>
-        <p:nvSpPr>
-          <p:cNvPr id="3" name="Content Placeholder 2">
-            <a:extLst>
-              <a:ext uri="{FF2B5EF4-FFF2-40B4-BE49-F238E27FC236}">
-                <a16:creationId xmlns:a16="http://schemas.microsoft.com/office/drawing/2014/main" id="{D7C19211-4512-4F86-931C-2C87F1ECB13F}"/>
-              </a:ext>
-            </a:extLst>
-          </p:cNvPr>
-          <p:cNvSpPr>
-            <a:spLocks noGrp="1"/>
-          </p:cNvSpPr>
-          <p:nvPr>
-            <p:ph idx="1"/>
-          </p:nvPr>
-        </p:nvSpPr>
-        <p:spPr/>
-        <p:txBody>
-          <a:bodyPr>
-            <a:normAutofit/>
-          </a:bodyPr>
-          <a:lstStyle/>
-          <a:p>
-            <a:r>
-              <a:rPr lang="en-US" dirty="0" err="1"/>
-              <a:t>StatusQueryGetUri</a:t>
-            </a:r>
-            <a:endParaRPr lang="en-US" dirty="0"/>
-          </a:p>
-          <a:p>
-            <a:r>
-              <a:rPr lang="en-US" dirty="0" err="1"/>
-              <a:t>SendEventPostUri</a:t>
-            </a:r>
-            <a:endParaRPr lang="en-US" dirty="0"/>
-          </a:p>
-          <a:p>
-            <a:r>
-              <a:rPr lang="en-US" dirty="0" err="1"/>
-              <a:t>TerminatePostUri</a:t>
-            </a:r>
-            <a:endParaRPr lang="en-US" dirty="0"/>
-          </a:p>
-          <a:p>
-            <a:r>
-              <a:rPr lang="en-US" dirty="0" err="1"/>
-              <a:t>RewindPostUri</a:t>
-            </a:r>
-            <a:endParaRPr lang="en-CA" dirty="0"/>
-          </a:p>
-        </p:txBody>
-      </p:sp>
-      <p:sp>
-        <p:nvSpPr>
-          <p:cNvPr id="4" name="Slide Number Placeholder 3">
-            <a:extLst>
-              <a:ext uri="{FF2B5EF4-FFF2-40B4-BE49-F238E27FC236}">
-                <a16:creationId xmlns:a16="http://schemas.microsoft.com/office/drawing/2014/main" id="{D856F01B-F87C-432C-A7C1-926C596E3188}"/>
-              </a:ext>
-            </a:extLst>
-          </p:cNvPr>
-          <p:cNvSpPr>
-            <a:spLocks noGrp="1"/>
-          </p:cNvSpPr>
-          <p:nvPr>
-            <p:ph type="sldNum" sz="quarter" idx="12"/>
-          </p:nvPr>
-        </p:nvSpPr>
-        <p:spPr/>
-        <p:txBody>
-          <a:bodyPr/>
-          <a:lstStyle/>
-          <a:p>
-            <a:fld id="{0A164282-434E-41D4-9582-783D542A7B68}" type="slidenum">
-              <a:rPr lang="en-US" smtClean="0"/>
-              <a:t>25</a:t>
-            </a:fld>
-            <a:endParaRPr lang="en-US" dirty="0"/>
-          </a:p>
-        </p:txBody>
-      </p:sp>
-    </p:spTree>
-    <p:extLst>
-      <p:ext uri="{BB962C8B-B14F-4D97-AF65-F5344CB8AC3E}">
-        <p14:creationId xmlns:p14="http://schemas.microsoft.com/office/powerpoint/2010/main" val="2169545009"/>
       </p:ext>
     </p:extLst>
   </p:cSld>
@@ -40059,8 +41020,8 @@
             </a:prstGeom>
           </p:spPr>
         </p:pic>
-        <mc:AlternateContent xmlns:mc="http://schemas.openxmlformats.org/markup-compatibility/2006">
-          <mc:Choice xmlns:p14="http://schemas.microsoft.com/office/powerpoint/2010/main" Requires="p14">
+        <mc:AlternateContent xmlns:mc="http://schemas.openxmlformats.org/markup-compatibility/2006" xmlns:p14="http://schemas.microsoft.com/office/powerpoint/2010/main">
+          <mc:Choice Requires="p14">
             <p:contentPart p14:bwMode="auto" r:id="rId3">
               <p14:nvContentPartPr>
                 <p14:cNvPr id="28" name="Ink 27">
@@ -40079,7 +41040,7 @@
               </p14:xfrm>
             </p:contentPart>
           </mc:Choice>
-          <mc:Fallback>
+          <mc:Fallback xmlns="">
             <p:pic>
               <p:nvPicPr>
                 <p:cNvPr id="28" name="Ink 27">
@@ -40167,8 +41128,8 @@
             </a:prstGeom>
           </p:spPr>
         </p:pic>
-        <mc:AlternateContent xmlns:mc="http://schemas.openxmlformats.org/markup-compatibility/2006">
-          <mc:Choice xmlns:p14="http://schemas.microsoft.com/office/powerpoint/2010/main" Requires="p14">
+        <mc:AlternateContent xmlns:mc="http://schemas.openxmlformats.org/markup-compatibility/2006" xmlns:p14="http://schemas.microsoft.com/office/powerpoint/2010/main">
+          <mc:Choice Requires="p14">
             <p:contentPart p14:bwMode="auto" r:id="rId6">
               <p14:nvContentPartPr>
                 <p14:cNvPr id="33" name="Ink 32">
@@ -40187,7 +41148,7 @@
               </p14:xfrm>
             </p:contentPart>
           </mc:Choice>
-          <mc:Fallback>
+          <mc:Fallback xmlns="">
             <p:pic>
               <p:nvPicPr>
                 <p:cNvPr id="33" name="Ink 32">
@@ -40275,8 +41236,8 @@
             </a:prstGeom>
           </p:spPr>
         </p:pic>
-        <mc:AlternateContent xmlns:mc="http://schemas.openxmlformats.org/markup-compatibility/2006">
-          <mc:Choice xmlns:p14="http://schemas.microsoft.com/office/powerpoint/2010/main" Requires="p14">
+        <mc:AlternateContent xmlns:mc="http://schemas.openxmlformats.org/markup-compatibility/2006" xmlns:p14="http://schemas.microsoft.com/office/powerpoint/2010/main">
+          <mc:Choice Requires="p14">
             <p:contentPart p14:bwMode="auto" r:id="rId8">
               <p14:nvContentPartPr>
                 <p14:cNvPr id="38" name="Ink 37">
@@ -40295,7 +41256,7 @@
               </p14:xfrm>
             </p:contentPart>
           </mc:Choice>
-          <mc:Fallback>
+          <mc:Fallback xmlns="">
             <p:pic>
               <p:nvPicPr>
                 <p:cNvPr id="38" name="Ink 37">
@@ -40362,8 +41323,8 @@
           </a:xfrm>
         </p:spPr>
       </p:pic>
-      <mc:AlternateContent xmlns:mc="http://schemas.openxmlformats.org/markup-compatibility/2006">
-        <mc:Choice xmlns:p14="http://schemas.microsoft.com/office/powerpoint/2010/main" Requires="p14">
+      <mc:AlternateContent xmlns:mc="http://schemas.openxmlformats.org/markup-compatibility/2006" xmlns:p14="http://schemas.microsoft.com/office/powerpoint/2010/main">
+        <mc:Choice Requires="p14">
           <p:contentPart p14:bwMode="auto" r:id="rId10">
             <p14:nvContentPartPr>
               <p14:cNvPr id="62" name="Ink 61">
@@ -40382,7 +41343,7 @@
             </p14:xfrm>
           </p:contentPart>
         </mc:Choice>
-        <mc:Fallback>
+        <mc:Fallback xmlns="">
           <p:pic>
             <p:nvPicPr>
               <p:cNvPr id="62" name="Ink 61">
@@ -40605,8 +41566,8 @@
           </a:p>
         </p:txBody>
       </p:sp>
-      <mc:AlternateContent xmlns:mc="http://schemas.openxmlformats.org/markup-compatibility/2006">
-        <mc:Choice xmlns:p14="http://schemas.microsoft.com/office/powerpoint/2010/main" Requires="p14">
+      <mc:AlternateContent xmlns:mc="http://schemas.openxmlformats.org/markup-compatibility/2006" xmlns:p14="http://schemas.microsoft.com/office/powerpoint/2010/main">
+        <mc:Choice Requires="p14">
           <p:contentPart p14:bwMode="auto" r:id="rId12">
             <p14:nvContentPartPr>
               <p14:cNvPr id="71" name="Ink 70">
@@ -40625,7 +41586,7 @@
             </p14:xfrm>
           </p:contentPart>
         </mc:Choice>
-        <mc:Fallback>
+        <mc:Fallback xmlns="">
           <p:pic>
             <p:nvPicPr>
               <p:cNvPr id="71" name="Ink 70">
@@ -40656,8 +41617,8 @@
           </p:pic>
         </mc:Fallback>
       </mc:AlternateContent>
-      <mc:AlternateContent xmlns:mc="http://schemas.openxmlformats.org/markup-compatibility/2006">
-        <mc:Choice xmlns:p14="http://schemas.microsoft.com/office/powerpoint/2010/main" Requires="p14">
+      <mc:AlternateContent xmlns:mc="http://schemas.openxmlformats.org/markup-compatibility/2006" xmlns:p14="http://schemas.microsoft.com/office/powerpoint/2010/main">
+        <mc:Choice Requires="p14">
           <p:contentPart p14:bwMode="auto" r:id="rId14">
             <p14:nvContentPartPr>
               <p14:cNvPr id="74" name="Ink 73">
@@ -40676,7 +41637,7 @@
             </p14:xfrm>
           </p:contentPart>
         </mc:Choice>
-        <mc:Fallback>
+        <mc:Fallback xmlns="">
           <p:pic>
             <p:nvPicPr>
               <p:cNvPr id="74" name="Ink 73">
@@ -40707,8 +41668,8 @@
           </p:pic>
         </mc:Fallback>
       </mc:AlternateContent>
-      <mc:AlternateContent xmlns:mc="http://schemas.openxmlformats.org/markup-compatibility/2006">
-        <mc:Choice xmlns:p14="http://schemas.microsoft.com/office/powerpoint/2010/main" Requires="p14">
+      <mc:AlternateContent xmlns:mc="http://schemas.openxmlformats.org/markup-compatibility/2006" xmlns:p14="http://schemas.microsoft.com/office/powerpoint/2010/main">
+        <mc:Choice Requires="p14">
           <p:contentPart p14:bwMode="auto" r:id="rId16">
             <p14:nvContentPartPr>
               <p14:cNvPr id="77" name="Ink 76">
@@ -40727,7 +41688,7 @@
             </p14:xfrm>
           </p:contentPart>
         </mc:Choice>
-        <mc:Fallback>
+        <mc:Fallback xmlns="">
           <p:pic>
             <p:nvPicPr>
               <p:cNvPr id="77" name="Ink 76">
@@ -40758,8 +41719,8 @@
           </p:pic>
         </mc:Fallback>
       </mc:AlternateContent>
-      <mc:AlternateContent xmlns:mc="http://schemas.openxmlformats.org/markup-compatibility/2006">
-        <mc:Choice xmlns:p14="http://schemas.microsoft.com/office/powerpoint/2010/main" Requires="p14">
+      <mc:AlternateContent xmlns:mc="http://schemas.openxmlformats.org/markup-compatibility/2006" xmlns:p14="http://schemas.microsoft.com/office/powerpoint/2010/main">
+        <mc:Choice Requires="p14">
           <p:contentPart p14:bwMode="auto" r:id="rId18">
             <p14:nvContentPartPr>
               <p14:cNvPr id="15" name="Ink 14">
@@ -40778,7 +41739,7 @@
             </p14:xfrm>
           </p:contentPart>
         </mc:Choice>
-        <mc:Fallback>
+        <mc:Fallback xmlns="">
           <p:pic>
             <p:nvPicPr>
               <p:cNvPr id="15" name="Ink 14">
@@ -40809,8 +41770,8 @@
           </p:pic>
         </mc:Fallback>
       </mc:AlternateContent>
-      <mc:AlternateContent xmlns:mc="http://schemas.openxmlformats.org/markup-compatibility/2006">
-        <mc:Choice xmlns:p14="http://schemas.microsoft.com/office/powerpoint/2010/main" Requires="p14">
+      <mc:AlternateContent xmlns:mc="http://schemas.openxmlformats.org/markup-compatibility/2006" xmlns:p14="http://schemas.microsoft.com/office/powerpoint/2010/main">
+        <mc:Choice Requires="p14">
           <p:contentPart p14:bwMode="auto" r:id="rId20">
             <p14:nvContentPartPr>
               <p14:cNvPr id="18" name="Ink 17">
@@ -40829,7 +41790,7 @@
             </p14:xfrm>
           </p:contentPart>
         </mc:Choice>
-        <mc:Fallback>
+        <mc:Fallback xmlns="">
           <p:pic>
             <p:nvPicPr>
               <p:cNvPr id="18" name="Ink 17">
@@ -40870,6 +41831,18 @@
   <p:clrMapOvr>
     <a:masterClrMapping/>
   </p:clrMapOvr>
+  <mc:AlternateContent xmlns:mc="http://schemas.openxmlformats.org/markup-compatibility/2006">
+    <mc:Choice xmlns:p14="http://schemas.microsoft.com/office/powerpoint/2010/main" Requires="p14">
+      <p:transition spd="med" p14:dur="700">
+        <p:fade/>
+      </p:transition>
+    </mc:Choice>
+    <mc:Fallback>
+      <p:transition spd="med">
+        <p:fade/>
+      </p:transition>
+    </mc:Fallback>
+  </mc:AlternateContent>
 </p:sld>
 </file>
 
@@ -41223,6 +42196,18 @@
   <p:clrMapOvr>
     <a:masterClrMapping/>
   </p:clrMapOvr>
+  <mc:AlternateContent xmlns:mc="http://schemas.openxmlformats.org/markup-compatibility/2006">
+    <mc:Choice xmlns:p14="http://schemas.microsoft.com/office/powerpoint/2010/main" Requires="p14">
+      <p:transition spd="med" p14:dur="700">
+        <p:fade/>
+      </p:transition>
+    </mc:Choice>
+    <mc:Fallback>
+      <p:transition spd="med">
+        <p:fade/>
+      </p:transition>
+    </mc:Fallback>
+  </mc:AlternateContent>
 </p:sld>
 </file>
 
@@ -41625,8 +42610,8 @@
             </a:prstGeom>
           </p:spPr>
         </p:pic>
-        <mc:AlternateContent xmlns:mc="http://schemas.openxmlformats.org/markup-compatibility/2006">
-          <mc:Choice xmlns:p14="http://schemas.microsoft.com/office/powerpoint/2010/main" Requires="p14">
+        <mc:AlternateContent xmlns:mc="http://schemas.openxmlformats.org/markup-compatibility/2006" xmlns:p14="http://schemas.microsoft.com/office/powerpoint/2010/main">
+          <mc:Choice Requires="p14">
             <p:contentPart p14:bwMode="auto" r:id="rId3">
               <p14:nvContentPartPr>
                 <p14:cNvPr id="28" name="Ink 27">
@@ -41645,7 +42630,7 @@
               </p14:xfrm>
             </p:contentPart>
           </mc:Choice>
-          <mc:Fallback>
+          <mc:Fallback xmlns="">
             <p:pic>
               <p:nvPicPr>
                 <p:cNvPr id="28" name="Ink 27">
@@ -41733,8 +42718,8 @@
             </a:prstGeom>
           </p:spPr>
         </p:pic>
-        <mc:AlternateContent xmlns:mc="http://schemas.openxmlformats.org/markup-compatibility/2006">
-          <mc:Choice xmlns:p14="http://schemas.microsoft.com/office/powerpoint/2010/main" Requires="p14">
+        <mc:AlternateContent xmlns:mc="http://schemas.openxmlformats.org/markup-compatibility/2006" xmlns:p14="http://schemas.microsoft.com/office/powerpoint/2010/main">
+          <mc:Choice Requires="p14">
             <p:contentPart p14:bwMode="auto" r:id="rId6">
               <p14:nvContentPartPr>
                 <p14:cNvPr id="33" name="Ink 32">
@@ -41753,7 +42738,7 @@
               </p14:xfrm>
             </p:contentPart>
           </mc:Choice>
-          <mc:Fallback>
+          <mc:Fallback xmlns="">
             <p:pic>
               <p:nvPicPr>
                 <p:cNvPr id="33" name="Ink 32">
@@ -41841,8 +42826,8 @@
             </a:prstGeom>
           </p:spPr>
         </p:pic>
-        <mc:AlternateContent xmlns:mc="http://schemas.openxmlformats.org/markup-compatibility/2006">
-          <mc:Choice xmlns:p14="http://schemas.microsoft.com/office/powerpoint/2010/main" Requires="p14">
+        <mc:AlternateContent xmlns:mc="http://schemas.openxmlformats.org/markup-compatibility/2006" xmlns:p14="http://schemas.microsoft.com/office/powerpoint/2010/main">
+          <mc:Choice Requires="p14">
             <p:contentPart p14:bwMode="auto" r:id="rId8">
               <p14:nvContentPartPr>
                 <p14:cNvPr id="38" name="Ink 37">
@@ -41861,7 +42846,7 @@
               </p14:xfrm>
             </p:contentPart>
           </mc:Choice>
-          <mc:Fallback>
+          <mc:Fallback xmlns="">
             <p:pic>
               <p:nvPicPr>
                 <p:cNvPr id="38" name="Ink 37">
@@ -41928,8 +42913,8 @@
           </a:xfrm>
         </p:spPr>
       </p:pic>
-      <mc:AlternateContent xmlns:mc="http://schemas.openxmlformats.org/markup-compatibility/2006">
-        <mc:Choice xmlns:p14="http://schemas.microsoft.com/office/powerpoint/2010/main" Requires="p14">
+      <mc:AlternateContent xmlns:mc="http://schemas.openxmlformats.org/markup-compatibility/2006" xmlns:p14="http://schemas.microsoft.com/office/powerpoint/2010/main">
+        <mc:Choice Requires="p14">
           <p:contentPart p14:bwMode="auto" r:id="rId10">
             <p14:nvContentPartPr>
               <p14:cNvPr id="62" name="Ink 61">
@@ -41948,7 +42933,7 @@
             </p14:xfrm>
           </p:contentPart>
         </mc:Choice>
-        <mc:Fallback>
+        <mc:Fallback xmlns="">
           <p:pic>
             <p:nvPicPr>
               <p:cNvPr id="62" name="Ink 61">
@@ -42177,8 +43162,8 @@
           </a:p>
         </p:txBody>
       </p:sp>
-      <mc:AlternateContent xmlns:mc="http://schemas.openxmlformats.org/markup-compatibility/2006">
-        <mc:Choice xmlns:p14="http://schemas.microsoft.com/office/powerpoint/2010/main" Requires="p14">
+      <mc:AlternateContent xmlns:mc="http://schemas.openxmlformats.org/markup-compatibility/2006" xmlns:p14="http://schemas.microsoft.com/office/powerpoint/2010/main">
+        <mc:Choice Requires="p14">
           <p:contentPart p14:bwMode="auto" r:id="rId12">
             <p14:nvContentPartPr>
               <p14:cNvPr id="71" name="Ink 70">
@@ -42197,7 +43182,7 @@
             </p14:xfrm>
           </p:contentPart>
         </mc:Choice>
-        <mc:Fallback>
+        <mc:Fallback xmlns="">
           <p:pic>
             <p:nvPicPr>
               <p:cNvPr id="71" name="Ink 70">
@@ -42228,8 +43213,8 @@
           </p:pic>
         </mc:Fallback>
       </mc:AlternateContent>
-      <mc:AlternateContent xmlns:mc="http://schemas.openxmlformats.org/markup-compatibility/2006">
-        <mc:Choice xmlns:p14="http://schemas.microsoft.com/office/powerpoint/2010/main" Requires="p14">
+      <mc:AlternateContent xmlns:mc="http://schemas.openxmlformats.org/markup-compatibility/2006" xmlns:p14="http://schemas.microsoft.com/office/powerpoint/2010/main">
+        <mc:Choice Requires="p14">
           <p:contentPart p14:bwMode="auto" r:id="rId14">
             <p14:nvContentPartPr>
               <p14:cNvPr id="74" name="Ink 73">
@@ -42248,7 +43233,7 @@
             </p14:xfrm>
           </p:contentPart>
         </mc:Choice>
-        <mc:Fallback>
+        <mc:Fallback xmlns="">
           <p:pic>
             <p:nvPicPr>
               <p:cNvPr id="74" name="Ink 73">
@@ -42279,8 +43264,8 @@
           </p:pic>
         </mc:Fallback>
       </mc:AlternateContent>
-      <mc:AlternateContent xmlns:mc="http://schemas.openxmlformats.org/markup-compatibility/2006">
-        <mc:Choice xmlns:p14="http://schemas.microsoft.com/office/powerpoint/2010/main" Requires="p14">
+      <mc:AlternateContent xmlns:mc="http://schemas.openxmlformats.org/markup-compatibility/2006" xmlns:p14="http://schemas.microsoft.com/office/powerpoint/2010/main">
+        <mc:Choice Requires="p14">
           <p:contentPart p14:bwMode="auto" r:id="rId16">
             <p14:nvContentPartPr>
               <p14:cNvPr id="77" name="Ink 76">
@@ -42299,7 +43284,7 @@
             </p14:xfrm>
           </p:contentPart>
         </mc:Choice>
-        <mc:Fallback>
+        <mc:Fallback xmlns="">
           <p:pic>
             <p:nvPicPr>
               <p:cNvPr id="77" name="Ink 76">
@@ -42330,8 +43315,8 @@
           </p:pic>
         </mc:Fallback>
       </mc:AlternateContent>
-      <mc:AlternateContent xmlns:mc="http://schemas.openxmlformats.org/markup-compatibility/2006">
-        <mc:Choice xmlns:p14="http://schemas.microsoft.com/office/powerpoint/2010/main" Requires="p14">
+      <mc:AlternateContent xmlns:mc="http://schemas.openxmlformats.org/markup-compatibility/2006" xmlns:p14="http://schemas.microsoft.com/office/powerpoint/2010/main">
+        <mc:Choice Requires="p14">
           <p:contentPart p14:bwMode="auto" r:id="rId18">
             <p14:nvContentPartPr>
               <p14:cNvPr id="80" name="Ink 79">
@@ -42350,7 +43335,7 @@
             </p14:xfrm>
           </p:contentPart>
         </mc:Choice>
-        <mc:Fallback>
+        <mc:Fallback xmlns="">
           <p:pic>
             <p:nvPicPr>
               <p:cNvPr id="80" name="Ink 79">
@@ -42381,8 +43366,8 @@
           </p:pic>
         </mc:Fallback>
       </mc:AlternateContent>
-      <mc:AlternateContent xmlns:mc="http://schemas.openxmlformats.org/markup-compatibility/2006">
-        <mc:Choice xmlns:p14="http://schemas.microsoft.com/office/powerpoint/2010/main" Requires="p14">
+      <mc:AlternateContent xmlns:mc="http://schemas.openxmlformats.org/markup-compatibility/2006" xmlns:p14="http://schemas.microsoft.com/office/powerpoint/2010/main">
+        <mc:Choice Requires="p14">
           <p:contentPart p14:bwMode="auto" r:id="rId20">
             <p14:nvContentPartPr>
               <p14:cNvPr id="81" name="Ink 80">
@@ -42401,7 +43386,7 @@
             </p14:xfrm>
           </p:contentPart>
         </mc:Choice>
-        <mc:Fallback>
+        <mc:Fallback xmlns="">
           <p:pic>
             <p:nvPicPr>
               <p:cNvPr id="81" name="Ink 80">
@@ -42442,6 +43427,18 @@
   <p:clrMapOvr>
     <a:masterClrMapping/>
   </p:clrMapOvr>
+  <mc:AlternateContent xmlns:mc="http://schemas.openxmlformats.org/markup-compatibility/2006">
+    <mc:Choice xmlns:p14="http://schemas.microsoft.com/office/powerpoint/2010/main" Requires="p14">
+      <p:transition spd="med" p14:dur="700">
+        <p:fade/>
+      </p:transition>
+    </mc:Choice>
+    <mc:Fallback>
+      <p:transition spd="med">
+        <p:fade/>
+      </p:transition>
+    </mc:Fallback>
+  </mc:AlternateContent>
 </p:sld>
 </file>
 
@@ -43121,6 +44118,18 @@
   <p:clrMapOvr>
     <a:masterClrMapping/>
   </p:clrMapOvr>
+  <mc:AlternateContent xmlns:mc="http://schemas.openxmlformats.org/markup-compatibility/2006">
+    <mc:Choice xmlns:p14="http://schemas.microsoft.com/office/powerpoint/2010/main" Requires="p14">
+      <p:transition spd="med" p14:dur="700">
+        <p:fade/>
+      </p:transition>
+    </mc:Choice>
+    <mc:Fallback>
+      <p:transition spd="med">
+        <p:fade/>
+      </p:transition>
+    </mc:Fallback>
+  </mc:AlternateContent>
 </p:sld>
 </file>
 
@@ -44268,7 +45277,7 @@
 </file>
 
 <file path=ppt/slides/slide8.xml><?xml version="1.0" encoding="utf-8"?>
-<p:sld xmlns:a="http://schemas.openxmlformats.org/drawingml/2006/main" xmlns:r="http://schemas.openxmlformats.org/officeDocument/2006/relationships" xmlns:p="http://schemas.openxmlformats.org/presentationml/2006/main">
+<p:sld xmlns:a="http://schemas.openxmlformats.org/drawingml/2006/main" xmlns:r="http://schemas.openxmlformats.org/officeDocument/2006/relationships" xmlns:p="http://schemas.openxmlformats.org/presentationml/2006/main" show="0">
   <p:cSld>
     <p:spTree>
       <p:nvGrpSpPr>
@@ -45351,13 +46360,13 @@
   <p:clrMapOvr>
     <a:masterClrMapping/>
   </p:clrMapOvr>
-  <mc:AlternateContent xmlns:mc="http://schemas.openxmlformats.org/markup-compatibility/2006" xmlns:p14="http://schemas.microsoft.com/office/powerpoint/2010/main">
-    <mc:Choice Requires="p14">
+  <mc:AlternateContent xmlns:mc="http://schemas.openxmlformats.org/markup-compatibility/2006">
+    <mc:Choice xmlns:p14="http://schemas.microsoft.com/office/powerpoint/2010/main" Requires="p14">
       <p:transition spd="med" p14:dur="700">
         <p:fade/>
       </p:transition>
     </mc:Choice>
-    <mc:Fallback xmlns="">
+    <mc:Fallback>
       <p:transition spd="med">
         <p:fade/>
       </p:transition>

</xml_diff>

<commit_message>
Updates from Global Azure Bootcamp presentation
</commit_message>
<xml_diff>
--- a/docs/Serverless Orchestration with Durable Functions.pptx
+++ b/docs/Serverless Orchestration with Durable Functions.pptx
@@ -249,30 +249,6 @@
 <pc:chgInfo xmlns:a="http://schemas.openxmlformats.org/drawingml/2006/main" xmlns:r="http://schemas.openxmlformats.org/officeDocument/2006/relationships" xmlns:ac="http://schemas.microsoft.com/office/drawing/2013/main/command" xmlns:pc="http://schemas.microsoft.com/office/powerpoint/2013/main/command">
   <pc:docChgLst>
     <pc:chgData name="Callon Campbell" userId="c0fd8b2c1dc026c3" providerId="LiveId" clId="{58AA0A0C-21B3-4E8C-8DB6-122F01C8166D}"/>
-  </pc:docChgLst>
-  <pc:docChgLst>
-    <pc:chgData name="Callon Campbell" userId="c0fd8b2c1dc026c3" providerId="LiveId" clId="{5A5E49AA-F409-4D3E-967B-AFD0CBAF23D1}"/>
-    <pc:docChg chg="modSld">
-      <pc:chgData name="Callon Campbell" userId="c0fd8b2c1dc026c3" providerId="LiveId" clId="{5A5E49AA-F409-4D3E-967B-AFD0CBAF23D1}" dt="2019-03-29T04:30:32.763" v="0" actId="207"/>
-      <pc:docMkLst>
-        <pc:docMk/>
-      </pc:docMkLst>
-      <pc:sldChg chg="modSp">
-        <pc:chgData name="Callon Campbell" userId="c0fd8b2c1dc026c3" providerId="LiveId" clId="{5A5E49AA-F409-4D3E-967B-AFD0CBAF23D1}" dt="2019-03-29T04:30:32.763" v="0" actId="207"/>
-        <pc:sldMkLst>
-          <pc:docMk/>
-          <pc:sldMk cId="3674603976" sldId="256"/>
-        </pc:sldMkLst>
-        <pc:spChg chg="mod">
-          <ac:chgData name="Callon Campbell" userId="c0fd8b2c1dc026c3" providerId="LiveId" clId="{5A5E49AA-F409-4D3E-967B-AFD0CBAF23D1}" dt="2019-03-29T04:30:32.763" v="0" actId="207"/>
-          <ac:spMkLst>
-            <pc:docMk/>
-            <pc:sldMk cId="3674603976" sldId="256"/>
-            <ac:spMk id="2" creationId="{00000000-0000-0000-0000-000000000000}"/>
-          </ac:spMkLst>
-        </pc:spChg>
-      </pc:sldChg>
-    </pc:docChg>
   </pc:docChgLst>
   <pc:docChgLst>
     <pc:chgData name="Callon Campbell" userId="c0fd8b2c1dc026c3" providerId="LiveId" clId="{FA73BD0D-4098-4852-B2DE-5FFB0D1B488E}"/>
@@ -2709,6 +2685,30 @@
     </pc:docChg>
   </pc:docChgLst>
   <pc:docChgLst>
+    <pc:chgData name="Callon Campbell" userId="c0fd8b2c1dc026c3" providerId="LiveId" clId="{5A5E49AA-F409-4D3E-967B-AFD0CBAF23D1}"/>
+    <pc:docChg chg="modSld">
+      <pc:chgData name="Callon Campbell" userId="c0fd8b2c1dc026c3" providerId="LiveId" clId="{5A5E49AA-F409-4D3E-967B-AFD0CBAF23D1}" dt="2019-03-29T04:30:32.763" v="0" actId="207"/>
+      <pc:docMkLst>
+        <pc:docMk/>
+      </pc:docMkLst>
+      <pc:sldChg chg="modSp">
+        <pc:chgData name="Callon Campbell" userId="c0fd8b2c1dc026c3" providerId="LiveId" clId="{5A5E49AA-F409-4D3E-967B-AFD0CBAF23D1}" dt="2019-03-29T04:30:32.763" v="0" actId="207"/>
+        <pc:sldMkLst>
+          <pc:docMk/>
+          <pc:sldMk cId="3674603976" sldId="256"/>
+        </pc:sldMkLst>
+        <pc:spChg chg="mod">
+          <ac:chgData name="Callon Campbell" userId="c0fd8b2c1dc026c3" providerId="LiveId" clId="{5A5E49AA-F409-4D3E-967B-AFD0CBAF23D1}" dt="2019-03-29T04:30:32.763" v="0" actId="207"/>
+          <ac:spMkLst>
+            <pc:docMk/>
+            <pc:sldMk cId="3674603976" sldId="256"/>
+            <ac:spMk id="2" creationId="{00000000-0000-0000-0000-000000000000}"/>
+          </ac:spMkLst>
+        </pc:spChg>
+      </pc:sldChg>
+    </pc:docChg>
+  </pc:docChgLst>
+  <pc:docChgLst>
     <pc:chgData name="Callon Campbell" userId="c0fd8b2c1dc026c3" providerId="LiveId" clId="{DE851591-31E6-4535-B49A-64561468A233}"/>
   </pc:docChgLst>
   <pc:docChgLst>
@@ -3308,7 +3308,7 @@
   </inkml:definitions>
   <inkml:trace contextRef="#ctx0" brushRef="#br0">10 1291 3808,'0'8'1281,"0"-16"1160,0 8-1534,0 0-235,0 7 1611,-1-50-305,-4-33-1978,2 44 240,2-1 0,3-20-240,-1-3 75,10-490 896,-11 537-952,0-6-2,0 1-1,1 0 0,1 0 0,0 0-16,-1 9 0,0 0 0,1 1-1,0-1 1,-1 1 0,1-1-1,1 1 1,-1 0-1,1 0 1,0 0 0,0 0-1,0 0 1,0 1 0,3-3 0,58-46 87,3 2 0,31-15-87,12-9-57,-107 72 10,68-44-1311,-63 41 645,2 1-1,-1 0 0,0 0 1,1 1-1,0 0 1,0 0-1,0 1 714,3 1-4245</inkml:trace>
   <inkml:trace contextRef="#ctx0" brushRef="#br0" timeOffset="348.994">47 782 6720,'-10'-2'1258,"-11"-4"689,19 0-1100,11-2 141,33-15-780,0 2 0,2 1 0,22-5-208,7-3 32,-16 3-107,-31 12-246,0 2 1,1 1-1,0 1 0,0 1 0,1 1 0,1 2 321,-10 4-5264</inkml:trace>
-  <inkml:trace contextRef="#ctx0" brushRef="#br0" timeOffset="2036.891">789 1147 3232,'-5'1'1140,"16"2"-772,14-2-15,-17-6-214,-8 5-133,1 0 1,-1 0 0,0 0-1,0 0 1,0-1 0,1 1-1,-1 0 1,0 0 0,0 0-1,0 0 1,1 0-1,-1 0 1,0 0 0,0 0-1,0-1 1,0 1 0,1 0-1,-1 0 1,0 0-1,0 0 1,0-1 0,0 1-1,0 0 1,1 0 0,-1 0-1,0 0 1,0-1 0,0 1-1,0 0 1,0 0-1,0 0 1,0-1 0,0 1-1,0 0 1,0 0 0,0-1-1,0 1-6,0-1 651,0 1-616,0 0-1,0 0 1,0-1 0,0 1-1,0 0 1,-1 0 0,1 0 0,0 0-1,0 0 1,0 0 0,0 0-1,0 0 1,0 0 0,0 0 0,-1 0-1,1 0 1,0 0 0,0-1-1,0 1 1,0 0 0,0 0 0,-1 0-1,1 0 1,0 0 0,0 0-1,0 0 1,0 0 0,0 0 0,-1 1-1,1-1 1,0 0 0,0 0-1,0 0 1,0 0 0,0 0 0,0 0-1,0 0 1,-1 0 0,1 0-1,0 0 1,0 0 0,0 0 0,0 1-1,0-1 1,0 0 0,0 0-1,0 0 1,0 0 0,-1 0 0,1 0-1,0 1 1,0-1 0,0 0-1,0 0 1,0 0-35,-2 6 251,2-5-214,-1 0 1,1 0-1,-1 1 0,1-1 1,-1 0-1,1 0 0,-1 0 1,0 0-1,0 0 0,1 0 0,-1 0 1,0 0-1,0 0 0,0-1 1,0 1-1,0 0 0,0 0 1,0-1-1,0 1 0,-1-1 1,1 1-1,0-1-37,-13 7 72,2-1 0,-1 2 0,1 0 0,0 0 0,0 1 0,1 0 0,1 1 0,-1 1 0,2-1 0,-1 1 0,2 1 0,-1 0 0,1 0 0,-2 6-72,7-12 18,0 1 0,0-1 1,1 0-1,0 1 0,0 0 0,0 1-18,1-5 25,1 1-1,0-1 0,0 0 0,1 0 0,-1 1 1,0-1-1,1 0 0,0 0 0,0 0 0,0 0 0,0 0 1,1 0-1,-1 0 0,2 2-24,0 0 18,1 0 0,-1-1-1,1 0 1,0 0 0,0 0 0,0 0 0,1-1 0,-1 0-1,1 1 1,0-2 0,3 3-18,14 5 22,-1-1 1,6 1-23,-7-3-17,-15-5 37,-1-1 0,1 0 0,0 0 0,-1 0-1,1-1 1,0 1 0,0-1 0,-1 0 0,1-1 0,0 1 0,0-1 0,-1 0 0,1 0-1,-1 0 1,3-2-20,5-2 197,0 0-1,-1-1 0,0 0 1,0-1-1,0-1-196,-6 4 67,-1 0 0,0 0 0,0-1 0,0 1 0,0-1 0,-1 0 0,0 0-1,0 0 1,0-1 0,-1 1 0,2-4-67,1-6 194,0 0 0,-1 0-1,2-12-193,-5 20 152,0 0-1,0 0 0,-1 0 1,0-1-1,0 1 1,-1 0-1,0 0 0,0 0 1,-1 0-1,0 0 1,0 0-1,0 0 0,-4-6-151,4 10 82,0-1-1,0 1 1,-1 0-1,1-1 1,-1 1-1,0 0 1,0 0-1,0 1 1,0-1-1,0 0 1,-1 1-1,1 0 1,-1 0-1,0 0 1,1 0-1,-1 1 1,0 0-1,0-1 1,0 1-1,0 1 1,0-1-1,0 0 0,0 1 1,-1 0-1,1 0-81,-7 1 33,0 0-1,0 1 0,0 0 0,0 1 1,0 0-1,0 0 0,-9 6-32,-3 1-1513,1 2-1,0 0 1,-2 4 1513,-13 10-2421</inkml:trace>
+  <inkml:trace contextRef="#ctx0" brushRef="#br0" timeOffset="2036.89">789 1147 3232,'-5'1'1140,"16"2"-772,14-2-15,-17-6-214,-8 5-133,1 0 1,-1 0 0,0 0-1,0 0 1,0-1 0,1 1-1,-1 0 1,0 0 0,0 0-1,0 0 1,1 0-1,-1 0 1,0 0 0,0 0-1,0-1 1,0 1 0,1 0-1,-1 0 1,0 0-1,0 0 1,0-1 0,0 1-1,0 0 1,1 0 0,-1 0-1,0 0 1,0-1 0,0 1-1,0 0 1,0 0-1,0 0 1,0-1 0,0 1-1,0 0 1,0 0 0,0-1-1,0 1-6,0-1 651,0 1-616,0 0-1,0 0 1,0-1 0,0 1-1,0 0 1,-1 0 0,1 0 0,0 0-1,0 0 1,0 0 0,0 0-1,0 0 1,0 0 0,0 0 0,-1 0-1,1 0 1,0 0 0,0-1-1,0 1 1,0 0 0,0 0 0,-1 0-1,1 0 1,0 0 0,0 0-1,0 0 1,0 0 0,0 0 0,-1 1-1,1-1 1,0 0 0,0 0-1,0 0 1,0 0 0,0 0 0,0 0-1,0 0 1,-1 0 0,1 0-1,0 0 1,0 0 0,0 0 0,0 1-1,0-1 1,0 0 0,0 0-1,0 0 1,0 0 0,-1 0 0,1 0-1,0 1 1,0-1 0,0 0-1,0 0 1,0 0-35,-2 6 251,2-5-214,-1 0 1,1 0-1,-1 1 0,1-1 1,-1 0-1,1 0 0,-1 0 1,0 0-1,0 0 0,1 0 0,-1 0 1,0 0-1,0 0 0,0-1 1,0 1-1,0 0 0,0 0 1,0-1-1,0 1 0,-1-1 1,1 1-1,0-1-37,-13 7 72,2-1 0,-1 2 0,1 0 0,0 0 0,0 1 0,1 0 0,1 1 0,-1 1 0,2-1 0,-1 1 0,2 1 0,-1 0 0,1 0 0,-2 6-72,7-12 18,0 1 0,0-1 1,1 0-1,0 1 0,0 0 0,0 1-18,1-5 25,1 1-1,0-1 0,0 0 0,1 0 0,-1 1 1,0-1-1,1 0 0,0 0 0,0 0 0,0 0 0,0 0 1,1 0-1,-1 0 0,2 2-24,0 0 18,1 0 0,-1-1-1,1 0 1,0 0 0,0 0 0,0 0 0,1-1 0,-1 0-1,1 1 1,0-2 0,3 3-18,14 5 22,-1-1 1,6 1-23,-7-3-17,-15-5 37,-1-1 0,1 0 0,0 0 0,-1 0-1,1-1 1,0 1 0,0-1 0,-1 0 0,1-1 0,0 1 0,0-1 0,-1 0 0,1 0-1,-1 0 1,3-2-20,5-2 197,0 0-1,-1-1 0,0 0 1,0-1-1,0-1-196,-6 4 67,-1 0 0,0 0 0,0-1 0,0 1 0,0-1 0,-1 0 0,0 0-1,0 0 1,0-1 0,-1 1 0,2-4-67,1-6 194,0 0 0,-1 0-1,2-12-193,-5 20 152,0 0-1,0 0 0,-1 0 1,0-1-1,0 1 1,-1 0-1,0 0 0,0 0 1,-1 0-1,0 0 1,0 0-1,0 0 0,-4-6-151,4 10 82,0-1-1,0 1 1,-1 0-1,1-1 1,-1 1-1,0 0 1,0 0-1,0 1 1,0-1-1,0 0 1,-1 1-1,1 0 1,-1 0-1,0 0 1,1 0-1,-1 1 1,0 0-1,0-1 1,0 1-1,0 1 1,0-1-1,0 0 0,0 1 1,-1 0-1,1 0-81,-7 1 33,0 0-1,0 1 0,0 0 0,0 1 1,0 0-1,0 0 0,-9 6-32,-3 1-1513,1 2-1,0 0 1,-2 4 1513,-13 10-2421</inkml:trace>
 </inkml:ink>
 </file>
 
@@ -3605,7 +3605,7 @@
   </inkml:definitions>
   <inkml:trace contextRef="#ctx0" brushRef="#br0">10 1291 3808,'0'8'1281,"0"-16"1160,0 8-1534,0 0-235,0 7 1611,-1-50-305,-4-33-1978,2 44 240,2-1 0,3-20-240,-1-3 75,10-490 896,-11 537-952,0-6-2,0 1-1,1 0 0,1 0 0,0 0-16,-1 9 0,0 0 0,1 1-1,0-1 1,-1 1 0,1-1-1,1 1 1,-1 0-1,1 0 1,0 0 0,0 0-1,0 0 1,0 1 0,3-3 0,58-46 87,3 2 0,31-15-87,12-9-57,-107 72 10,68-44-1311,-63 41 645,2 1-1,-1 0 0,0 0 1,1 1-1,0 0 1,0 0-1,0 1 714,3 1-4245</inkml:trace>
   <inkml:trace contextRef="#ctx0" brushRef="#br0" timeOffset="348.994">47 782 6720,'-10'-2'1258,"-11"-4"689,19 0-1100,11-2 141,33-15-780,0 2 0,2 1 0,22-5-208,7-3 32,-16 3-107,-31 12-246,0 2 1,1 1-1,0 1 0,0 1 0,1 1 0,1 2 321,-10 4-5264</inkml:trace>
-  <inkml:trace contextRef="#ctx0" brushRef="#br0" timeOffset="2036.891">789 1147 3232,'-5'1'1140,"16"2"-772,14-2-15,-17-6-214,-8 5-133,1 0 1,-1 0 0,0 0-1,0 0 1,0-1 0,1 1-1,-1 0 1,0 0 0,0 0-1,0 0 1,1 0-1,-1 0 1,0 0 0,0 0-1,0-1 1,0 1 0,1 0-1,-1 0 1,0 0-1,0 0 1,0-1 0,0 1-1,0 0 1,1 0 0,-1 0-1,0 0 1,0-1 0,0 1-1,0 0 1,0 0-1,0 0 1,0-1 0,0 1-1,0 0 1,0 0 0,0-1-1,0 1-6,0-1 651,0 1-616,0 0-1,0 0 1,0-1 0,0 1-1,0 0 1,-1 0 0,1 0 0,0 0-1,0 0 1,0 0 0,0 0-1,0 0 1,0 0 0,0 0 0,-1 0-1,1 0 1,0 0 0,0-1-1,0 1 1,0 0 0,0 0 0,-1 0-1,1 0 1,0 0 0,0 0-1,0 0 1,0 0 0,0 0 0,-1 1-1,1-1 1,0 0 0,0 0-1,0 0 1,0 0 0,0 0 0,0 0-1,0 0 1,-1 0 0,1 0-1,0 0 1,0 0 0,0 0 0,0 1-1,0-1 1,0 0 0,0 0-1,0 0 1,0 0 0,-1 0 0,1 0-1,0 1 1,0-1 0,0 0-1,0 0 1,0 0-35,-2 6 251,2-5-214,-1 0 1,1 0-1,-1 1 0,1-1 1,-1 0-1,1 0 0,-1 0 1,0 0-1,0 0 0,1 0 0,-1 0 1,0 0-1,0 0 0,0-1 1,0 1-1,0 0 0,0 0 1,0-1-1,0 1 0,-1-1 1,1 1-1,0-1-37,-13 7 72,2-1 0,-1 2 0,1 0 0,0 0 0,0 1 0,1 0 0,1 1 0,-1 1 0,2-1 0,-1 1 0,2 1 0,-1 0 0,1 0 0,-2 6-72,7-12 18,0 1 0,0-1 1,1 0-1,0 1 0,0 0 0,0 1-18,1-5 25,1 1-1,0-1 0,0 0 0,1 0 0,-1 1 1,0-1-1,1 0 0,0 0 0,0 0 0,0 0 0,0 0 1,1 0-1,-1 0 0,2 2-24,0 0 18,1 0 0,-1-1-1,1 0 1,0 0 0,0 0 0,0 0 0,1-1 0,-1 0-1,1 1 1,0-2 0,3 3-18,14 5 22,-1-1 1,6 1-23,-7-3-17,-15-5 37,-1-1 0,1 0 0,0 0 0,-1 0-1,1-1 1,0 1 0,0-1 0,-1 0 0,1-1 0,0 1 0,0-1 0,-1 0 0,1 0-1,-1 0 1,3-2-20,5-2 197,0 0-1,-1-1 0,0 0 1,0-1-1,0-1-196,-6 4 67,-1 0 0,0 0 0,0-1 0,0 1 0,0-1 0,-1 0 0,0 0-1,0 0 1,0-1 0,-1 1 0,2-4-67,1-6 194,0 0 0,-1 0-1,2-12-193,-5 20 152,0 0-1,0 0 0,-1 0 1,0-1-1,0 1 1,-1 0-1,0 0 0,0 0 1,-1 0-1,0 0 1,0 0-1,0 0 0,-4-6-151,4 10 82,0-1-1,0 1 1,-1 0-1,1-1 1,-1 1-1,0 0 1,0 0-1,0 1 1,0-1-1,0 0 1,-1 1-1,1 0 1,-1 0-1,0 0 1,1 0-1,-1 1 1,0 0-1,0-1 1,0 1-1,0 1 1,0-1-1,0 0 0,0 1 1,-1 0-1,1 0-81,-7 1 33,0 0-1,0 1 0,0 0 0,0 1 1,0 0-1,0 0 0,-9 6-32,-3 1-1513,1 2-1,0 0 1,-2 4 1513,-13 10-2421</inkml:trace>
+  <inkml:trace contextRef="#ctx0" brushRef="#br0" timeOffset="2036.89">789 1147 3232,'-5'1'1140,"16"2"-772,14-2-15,-17-6-214,-8 5-133,1 0 1,-1 0 0,0 0-1,0 0 1,0-1 0,1 1-1,-1 0 1,0 0 0,0 0-1,0 0 1,1 0-1,-1 0 1,0 0 0,0 0-1,0-1 1,0 1 0,1 0-1,-1 0 1,0 0-1,0 0 1,0-1 0,0 1-1,0 0 1,1 0 0,-1 0-1,0 0 1,0-1 0,0 1-1,0 0 1,0 0-1,0 0 1,0-1 0,0 1-1,0 0 1,0 0 0,0-1-1,0 1-6,0-1 651,0 1-616,0 0-1,0 0 1,0-1 0,0 1-1,0 0 1,-1 0 0,1 0 0,0 0-1,0 0 1,0 0 0,0 0-1,0 0 1,0 0 0,0 0 0,-1 0-1,1 0 1,0 0 0,0-1-1,0 1 1,0 0 0,0 0 0,-1 0-1,1 0 1,0 0 0,0 0-1,0 0 1,0 0 0,0 0 0,-1 1-1,1-1 1,0 0 0,0 0-1,0 0 1,0 0 0,0 0 0,0 0-1,0 0 1,-1 0 0,1 0-1,0 0 1,0 0 0,0 0 0,0 1-1,0-1 1,0 0 0,0 0-1,0 0 1,0 0 0,-1 0 0,1 0-1,0 1 1,0-1 0,0 0-1,0 0 1,0 0-35,-2 6 251,2-5-214,-1 0 1,1 0-1,-1 1 0,1-1 1,-1 0-1,1 0 0,-1 0 1,0 0-1,0 0 0,1 0 0,-1 0 1,0 0-1,0 0 0,0-1 1,0 1-1,0 0 0,0 0 1,0-1-1,0 1 0,-1-1 1,1 1-1,0-1-37,-13 7 72,2-1 0,-1 2 0,1 0 0,0 0 0,0 1 0,1 0 0,1 1 0,-1 1 0,2-1 0,-1 1 0,2 1 0,-1 0 0,1 0 0,-2 6-72,7-12 18,0 1 0,0-1 1,1 0-1,0 1 0,0 0 0,0 1-18,1-5 25,1 1-1,0-1 0,0 0 0,1 0 0,-1 1 1,0-1-1,1 0 0,0 0 0,0 0 0,0 0 0,0 0 1,1 0-1,-1 0 0,2 2-24,0 0 18,1 0 0,-1-1-1,1 0 1,0 0 0,0 0 0,0 0 0,1-1 0,-1 0-1,1 1 1,0-2 0,3 3-18,14 5 22,-1-1 1,6 1-23,-7-3-17,-15-5 37,-1-1 0,1 0 0,0 0 0,-1 0-1,1-1 1,0 1 0,0-1 0,-1 0 0,1-1 0,0 1 0,0-1 0,-1 0 0,1 0-1,-1 0 1,3-2-20,5-2 197,0 0-1,-1-1 0,0 0 1,0-1-1,0-1-196,-6 4 67,-1 0 0,0 0 0,0-1 0,0 1 0,0-1 0,-1 0 0,0 0-1,0 0 1,0-1 0,-1 1 0,2-4-67,1-6 194,0 0 0,-1 0-1,2-12-193,-5 20 152,0 0-1,0 0 0,-1 0 1,0-1-1,0 1 1,-1 0-1,0 0 0,0 0 1,-1 0-1,0 0 1,0 0-1,0 0 0,-4-6-151,4 10 82,0-1-1,0 1 1,-1 0-1,1-1 1,-1 1-1,0 0 1,0 0-1,0 1 1,0-1-1,0 0 1,-1 1-1,1 0 1,-1 0-1,0 0 1,1 0-1,-1 1 1,0 0-1,0-1 1,0 1-1,0 1 1,0-1-1,0 0 0,0 1 1,-1 0-1,1 0-81,-7 1 33,0 0-1,0 1 0,0 0 0,0 1 1,0 0-1,0 0 0,-9 6-32,-3 1-1513,1 2-1,0 0 1,-2 4 1513,-13 10-2421</inkml:trace>
 </inkml:ink>
 </file>
 
@@ -3943,7 +3943,7 @@
   </inkml:definitions>
   <inkml:trace contextRef="#ctx0" brushRef="#br0">582 247 4064,'-1'0'48,"1"0"0,-1 0 0,0 0 1,0 0-1,0 0 0,1 0 0,-1-1 0,0 1 1,0 0-1,1-1 0,-1 1 0,0 0 0,1-1 0,-1 1 1,1-1-1,-1 1 0,0-1 0,1 1 0,-1-1 0,1 0 1,-1 1-1,1-1 0,0 0 0,-1 1 0,1-1 1,0 0-1,-1 1 0,1-1 0,0 0 0,0 0 0,-1 1 1,1-1-1,0 0 0,0 0-48,-4-16 490,0 15-322,0-1 1,0 1-1,0 0 0,-1 1 1,1-1-1,-1 1 0,-3-1-168,-2 2 109,-1 0 0,1 0 0,-1 1 0,1 0 0,0 1 0,0 0 0,-1 0 0,2 1 0,-6 2-109,11-3 38,-109 41 810,82-32-762,-1 2 0,2 2 0,0 0-1,-1 3-85,18-10-11,0 1-1,1 0 1,0 1-1,0 0 1,1 1-1,0 0 1,1 1 0,0 0-1,-7 13 12,14-17-3,-1-1 0,1 1 1,0 1-1,1-1 0,0 0 0,0 1 1,0-1-1,1 1 0,1-1 0,0 1 0,0-1 1,0 1-1,1 0 0,0-1 0,1 1 0,0-1 1,0 0-1,1 0 0,0 0 0,0 0 1,5 7 2,-1-1-24,1 0 1,1 0 0,0-1-1,1 0 1,0-1 0,1 0 0,1-1-1,-1 0 1,2 0 0,-1-2-1,5 3 24,-2-3-349,1-1 0,0-1-1,1 0 1,-1-1 0,1-1-1,10 2 350,41 6-3610</inkml:trace>
   <inkml:trace contextRef="#ctx0" brushRef="#br0" timeOffset="489.885">971 538 3552,'-5'0'83,"0"0"0,0 0 0,0 0 0,0 1 0,0-1 0,0 1 0,1 0 0,-1 1 0,0-1 0,1 1 0,-1 0 0,1 0 0,-1 0 0,1 1 0,0 0 0,0 0 0,0 0 0,1 0 0,-1 0 0,1 1 0,-1-1 0,1 1 0,0 0 0,1 0-1,-1 1-82,-16 27 9,10-18 1,0 0-1,1 1 0,1 0 0,0 0 0,2 0 0,-5 16-9,4-3 199,-7 35 362,12-58-523,1 0 0,0 0 0,0 0 0,0 0 0,0 0 1,1-1-1,0 1 0,0 0 0,0 0 0,0-1 0,2 2-38,-2-4 9,0 0 0,0-1 0,0 1 0,0-1 0,0 1 0,0-1 0,1 0 0,-1 1 0,1-1 0,-1 0-1,1 0 1,-1 0 0,1 0 0,0 0 0,-1 0 0,1-1 0,0 1 0,0 0 0,-1-1 0,1 0 0,0 1 0,0-1 0,0 0 0,0 0 0,0 0 0,0 0 0,0 0 0,-1 0-1,1-1 1,0 1 0,0-1 0,1 0-9,4-1 61,1 0-1,-1-1 1,0 0-1,0 0 1,0-1-1,0 0 0,1-1-60,-1-1 79,1 1 0,-1-2 0,-1 1 0,0-1 0,1 0 0,-2 0 0,1 0 0,-1-1 0,-1 0 0,1 0 0,-1 0 0,0-1 0,-1 1 0,0-1 0,-1 0-1,0 0 1,0 0 0,0-5-79,0-4-7,-1 0-1,-1-1 0,-1 1 1,0 0-1,-1 0 1,-2 0-1,1 0 0,-7-16 8,4 13-725,5 4-1920</inkml:trace>
-  <inkml:trace contextRef="#ctx0" brushRef="#br0" timeOffset="1102.89">1350 885 3392,'-1'0'30,"-23"4"1578,12-6-561,12 2-1025,0 0-1,0 0 1,-1 0 0,1 0 0,0 0-1,0-1 1,0 1 0,-1 0-1,1 0 1,0 0 0,0-1-1,0 1 1,0 0 0,0 0 0,0-1-1,-1 1 1,1 0 0,0 0-1,0-1 1,0 1 0,0 0-1,0 0 1,0-1 0,0 1-1,0 0 1,0 0 0,0-1 0,0 1-1,0 0 1,0 0 0,0-1-1,1 1 1,-1 0 0,0 0-1,0 0 1,0-1 0,0 1-22,11-30 566,-2 0-1,-1 0 1,4-30-566,6-23 324,-12 63-341,0 0-1,2 0 1,0 1 0,10-16 17,-18 34-1,0 1 0,0 0 1,1 0-1,-1 0 0,0 0 0,0-1 1,0 1-1,0 0 0,0 0 1,1 0-1,-1 0 0,0 0 0,0 0 1,0-1-1,0 1 0,1 0 1,-1 0-1,0 0 0,0 0 0,0 0 1,1 0-1,-1 0 0,0 0 1,0 0-1,0 0 0,1 0 0,-1 0 1,0 0-1,0 0 0,0 0 0,1 0 1,-1 0-1,0 0 0,0 0 1,0 0-1,0 0 0,1 0 0,-1 1 1,0-1-1,0 0 0,0 0 1,0 0-1,1 0 0,-1 0 0,0 1 1,0-1 0,11 13-76,9 24-64,-18-32 133,6 11-21,1-1 0,0 0 0,1 0 0,5 4 28,-12-14 10,1-1 0,0 0 0,1 1 0,-1-1-1,1-1 1,0 1 0,-1-1 0,2 0 0,-1 0 0,0 0 0,1-1 0,-1 1 0,1-1-1,2 0-9,-5-2 10,-1 1 0,1-1-1,-1 0 1,1 0 0,-1-1-1,0 1 1,1 0 0,-1-1 0,1 0-1,-1 1 1,0-1 0,1 0-1,-1 0 1,0 0 0,0-1-1,0 1 1,0 0 0,0-1-1,0 0 1,1-1-10,5-5-13,0 0 0,-1-1 0,0 0 0,0-3 13,8-7 77,-5 5-32,-6 8-70,0 1-1,1-1 1,-1 1-1,1 0 1,1 0-1,-1 0 1,1 1 25,-5 3-128,0 2 127,0 0-1,0 1 1,-1-1 0,1 0 0,-1 1 0,1-1 0,-1 0-1,0 1 1,0-1 0,1 1 0,-1-1 0,0 1 0,0-1-1,0 1 1,0-1 0,-1 2 1,1-1-3,1 8 17,0-1-1,0 1 1,1-1-1,0 0 1,1 0-1,0 0 1,1 0-1,-1 0 1,2-1-14,3 8-894,1 0-1,0-1 1,1-1 0,6 6 894,-3-8-1440,4 0-571</inkml:trace>
+  <inkml:trace contextRef="#ctx0" brushRef="#br0" timeOffset="1102.889">1350 885 3392,'-1'0'30,"-23"4"1578,12-6-561,12 2-1025,0 0-1,0 0 1,-1 0 0,1 0 0,0 0-1,0-1 1,0 1 0,-1 0-1,1 0 1,0 0 0,0-1-1,0 1 1,0 0 0,0 0 0,0-1-1,-1 1 1,1 0 0,0 0-1,0-1 1,0 1 0,0 0-1,0 0 1,0-1 0,0 1-1,0 0 1,0 0 0,0-1 0,0 1-1,0 0 1,0 0 0,0-1-1,1 1 1,-1 0 0,0 0-1,0 0 1,0-1 0,0 1-22,11-30 566,-2 0-1,-1 0 1,4-30-566,6-23 324,-12 63-341,0 0-1,2 0 1,0 1 0,10-16 17,-18 34-1,0 1 0,0 0 1,1 0-1,-1 0 0,0 0 0,0-1 1,0 1-1,0 0 0,0 0 1,1 0-1,-1 0 0,0 0 0,0 0 1,0-1-1,0 1 0,1 0 1,-1 0-1,0 0 0,0 0 0,0 0 1,1 0-1,-1 0 0,0 0 1,0 0-1,0 0 0,1 0 0,-1 0 1,0 0-1,0 0 0,0 0 0,1 0 1,-1 0-1,0 0 0,0 0 1,0 0-1,0 0 0,1 0 0,-1 1 1,0-1-1,0 0 0,0 0 1,0 0-1,1 0 0,-1 0 0,0 1 1,0-1 0,11 13-76,9 24-64,-18-32 133,6 11-21,1-1 0,0 0 0,1 0 0,5 4 28,-12-14 10,1-1 0,0 0 0,1 1 0,-1-1-1,1-1 1,0 1 0,-1-1 0,2 0 0,-1 0 0,0 0 0,1-1 0,-1 1 0,1-1-1,2 0-9,-5-2 10,-1 1 0,1-1-1,-1 0 1,1 0 0,-1-1-1,0 1 1,1 0 0,-1-1 0,1 0-1,-1 1 1,0-1 0,1 0-1,-1 0 1,0 0 0,0-1-1,0 1 1,0 0 0,0-1-1,0 0 1,1-1-10,5-5-13,0 0 0,-1-1 0,0 0 0,0-3 13,8-7 77,-5 5-32,-6 8-70,0 1-1,1-1 1,-1 1-1,1 0 1,1 0-1,-1 0 1,1 1 25,-5 3-128,0 2 127,0 0-1,0 1 1,-1-1 0,1 0 0,-1 1 0,1-1 0,-1 0-1,0 1 1,0-1 0,1 1 0,-1-1 0,0 1 0,0-1-1,0 1 1,0-1 0,-1 2 1,1-1-3,1 8 17,0-1-1,0 1 1,1-1-1,0 0 1,1 0-1,0 0 1,1 0-1,-1 0 1,2-1-14,3 8-894,1 0-1,0-1 1,1-1 0,6 6 894,-3-8-1440,4 0-571</inkml:trace>
   <inkml:trace contextRef="#ctx0" brushRef="#br0" timeOffset="1647.317">2231 582 3328,'-1'0'59,"0"0"0,-1 0 1,1 0-1,0 0 0,-1 0 0,1 0 0,0 1 1,-1-1-1,1 0 0,0 1 0,0-1 1,-1 0-1,1 1 0,0 0 0,0-1 0,0 1 1,0 0-1,0 0 0,0-1 0,0 1 0,0 0 1,0 0-1,0 0 0,0 0 0,0 0 1,1 0-1,-1 1 0,0-1 0,1 0 0,-1 0 1,1 0-1,-1 1 0,1-1-59,-5 11 123,0 0 1,1 0-1,-1 7-123,0-4 257,-15 61 193,2 0-1,1 26-449,-3 9 445,4-21-232,1 27-213,14-43 1430,3-177-1346,4 0 0,5 0 1,5 2-1,4 0 0,7-11-84,-25 103-24,8-25-54,0-1 0,7-9 78,-13 35-19,0 0 0,1 0-1,0 0 1,0 1-1,1 0 1,0 0 0,1 0-1,0 1 1,0 0 0,5-4 19,-9 9-6,1-1 1,-1 1 0,1-1 0,-1 1-1,1 0 1,0 1 0,0-1-1,0 1 1,0-1 0,0 1 0,0 1-1,1-1 1,-1 0 0,0 1-1,0 0 1,1 0 0,-1 0 0,0 1-1,0-1 1,0 1 0,1 0-1,-1 0 1,0 1 0,0-1 0,0 1-1,-1 0 1,1 0 0,1 1 5,0 0-6,1 2 1,-1-1-1,0 1 1,0-1 0,0 1-1,-1 1 1,0-1-1,0 1 1,0-1 0,-1 1-1,0 0 1,0 1-1,0-1 1,-1 0 0,0 1-1,0-1 1,0 5 5,0-4 22,-1 1 1,-1 0-1,0 0 1,0 0-1,0 0 1,-1 0 0,0 0-1,0-1 1,-1 1-1,0 0 1,0-1-1,-1 1 1,-1 0-23,-1 3 81,-1 0 0,0-1 1,-1 0-1,0-1 1,-1 1-1,0-1 0,0-1 1,-4 3-82,-12 9 168,0-2 0,-2-1 0,0-1 0,-1-1 0,0-1 0,-15 4-168,30-13 24,3 0-32,-1-1-1,0 0 1,-1 0 0,1-1-1,-1-1 1,1 1-1,-1-2 1,-1 0 8,10-1-97,0 0 0,0 0 0,1-1 0,-1 1 0,0 0 0,1-1 0,-1 0 0,0 1-1,1-1 1,-1 0 0,1 0 0,-1 0 0,1 0 0,0 0 0,-1 0 0,1 0 0,0-1 0,0 1 0,0 0 0,0-1 0,0 1 0,0-1 0,0 1-1,0-1 1,1 1 0,-1-1 0,1 0 0,-1 1 0,1-1 0,-1 0 0,1 0 0,0 1 0,0-1 0,0 0 0,0-1 97,-1-24-3760</inkml:trace>
   <inkml:trace contextRef="#ctx0" brushRef="#br0" timeOffset="2086.406">2722 6 4384,'0'-1'44,"0"1"-1,0 0 1,0 0 0,0-1-1,0 1 1,-1 0 0,1 0-1,0-1 1,0 1 0,0 0-1,0 0 1,0 0 0,-1-1 0,1 1-1,0 0 1,0 0 0,0 0-1,-1 0 1,1-1 0,0 1-1,0 0 1,0 0 0,-1 0-1,1 0 1,0 0 0,0 0 0,-1 0-1,1 0 1,0 0 0,0 0-1,-1 0 1,1 0 0,0 0-1,0 0 1,-1 0 0,1 0-1,0 0 1,0 0 0,-1 0 0,1 0-1,0 0 1,0 0 0,-1 0-1,1 0 1,0 1 0,0-1-1,0 0 1,-1 0 0,1 0-1,0 0 1,0 1 0,-1-1-44,4 44 810,-5-30-589,1 0 0,1 0 0,0 1 0,2 4-221,0 29 338,-8 94 1140,-23 123-1478,21-194 42,-18 175 214,26-235-505,-1-1 0,2 1 0,-1-1 0,2 1 0,-1-1 0,2 4 249,4 10-874</inkml:trace>
   <inkml:trace contextRef="#ctx0" brushRef="#br0" timeOffset="2485.368">2878 738 3488,'1'4'154,"1"0"-1,0 0 1,0 0 0,1-1 0,-1 1 0,1-1-1,0 0 1,-1 0 0,1 0 0,1 0 0,-1 0-1,0 0 1,1-1 0,-1 0 0,1 0 0,0 0-1,0 0 1,0 0 0,0-1 0,2 1-154,-1 0 68,1-1 1,-1 0-1,0-1 0,0 1 1,1-1-1,-1 0 1,0 0-1,1-1 0,-1 1 1,0-1-1,0 0 1,1-1-1,-1 1 1,0-1-1,0 0 0,2-2-68,-6 4 7,0-1-1,0 0 1,0 1-1,1-1 1,-1 0-1,0 0 1,0 0-1,0 0 0,-1 0 1,1 0-1,0 0 1,0 0-1,0-1 1,-1 1-1,1 0 1,-1 0-1,1-1 0,-1 1 1,1 0-1,-1 0 1,0-1-1,0 1 1,1-1-1,-1 1 1,0 0-1,0-1 0,0 1 1,-1 0-1,1-1 1,0 1-1,0 0 1,-1-1-1,1 1 1,-1 0-1,1 0 0,-1-1 1,0 1-1,1 0 1,-1 0-1,0 0 1,0 0-1,0-1-6,-3-4 12,-1 1-1,1-1 1,-1 1 0,0 0-1,-1 1 1,1-1-1,-6-3-11,2 2 37,0 1-1,-1 0 1,1 0-1,-1 1 1,0 0-1,0 1 0,0 0 1,-1 0-1,-2 1-36,7 1-1,0 1-1,0 0 1,0 0 0,1 1-1,-1-1 1,0 1-1,0 1 1,1-1 0,-1 1-1,0 0 1,1 0-1,0 0 1,-1 1 0,1 0-1,0 0 1,1 0-1,-3 3 2,-6 5-3,1 0 0,1 2-1,0-1 1,1 1-1,0 1 1,1 0-1,0 0 1,2 1-1,-1 0 1,2 1-1,0-1 1,1 1 0,0 0-1,1 0 1,1 1-1,1-1 1,0 11 3,2-21 10,0 1 0,1-1 1,-1 0-1,1 0 0,1 0 0,-1 0 1,1-1-1,0 1 0,1 0 0,-1-1 1,1 1-1,0-1 0,0 0 0,1 0 1,-1 0-1,1 0 0,1 0-10,-2-2-43,1 0 0,0 0 1,0 0-1,0-1 0,0 1 0,0-1 0,0 0 0,1 0 1,-1 0-1,1-1 0,-1 0 0,1 1 0,0-2 0,-1 1 1,1 0-1,0-1 0,-1 0 0,1 0 0,0-1 0,0 1 1,-1-1-1,1 0 43,43-14-576</inkml:trace>
@@ -6760,7 +6760,104 @@
                 <a:ea typeface="+mn-ea"/>
                 <a:cs typeface="+mn-cs"/>
               </a:rPr>
-              <a:t>Serverless is the culmination of several iterations of cloud platforms. The evolution began with physical metal in the data center and progressed through Infrastructure as a Service (IaaS) and Platform as a Service (PaaS).</a:t>
+              <a:t>Serverless is the culmination of several iterations of cloud platforms. </a:t>
+            </a:r>
+          </a:p>
+          <a:p>
+            <a:endParaRPr lang="en-US" sz="1200" b="0" i="0" u="none" strike="noStrike" kern="1200" dirty="0">
+              <a:solidFill>
+                <a:schemeClr val="tx1"/>
+              </a:solidFill>
+              <a:effectLst/>
+              <a:latin typeface="+mn-lt"/>
+              <a:ea typeface="+mn-ea"/>
+              <a:cs typeface="+mn-cs"/>
+            </a:endParaRPr>
+          </a:p>
+          <a:p>
+            <a:r>
+              <a:rPr lang="en-US" sz="1200" b="0" i="0" u="none" strike="noStrike" kern="1200" dirty="0">
+                <a:solidFill>
+                  <a:schemeClr val="tx1"/>
+                </a:solidFill>
+                <a:effectLst/>
+                <a:latin typeface="+mn-lt"/>
+                <a:ea typeface="+mn-ea"/>
+                <a:cs typeface="+mn-cs"/>
+              </a:rPr>
+              <a:t>The evolution began with physical metal in the data center and progressed through…</a:t>
+            </a:r>
+          </a:p>
+          <a:p>
+            <a:pPr marL="171450" indent="-171450">
+              <a:buFontTx/>
+              <a:buChar char="-"/>
+            </a:pPr>
+            <a:r>
+              <a:rPr lang="en-US" sz="1200" b="0" i="0" u="none" strike="noStrike" kern="1200" dirty="0">
+                <a:solidFill>
+                  <a:schemeClr val="tx1"/>
+                </a:solidFill>
+                <a:effectLst/>
+                <a:latin typeface="+mn-lt"/>
+                <a:ea typeface="+mn-ea"/>
+                <a:cs typeface="+mn-cs"/>
+              </a:rPr>
+              <a:t>Infrastructure as a Service (IaaS)</a:t>
+            </a:r>
+          </a:p>
+          <a:p>
+            <a:pPr marL="171450" indent="-171450">
+              <a:buFontTx/>
+              <a:buChar char="-"/>
+            </a:pPr>
+            <a:r>
+              <a:rPr lang="en-US" sz="1200" b="0" i="0" u="none" strike="noStrike" kern="1200" dirty="0">
+                <a:solidFill>
+                  <a:schemeClr val="tx1"/>
+                </a:solidFill>
+                <a:effectLst/>
+                <a:latin typeface="+mn-lt"/>
+                <a:ea typeface="+mn-ea"/>
+                <a:cs typeface="+mn-cs"/>
+              </a:rPr>
+              <a:t>Containers as a Service (CaaS)</a:t>
+            </a:r>
+          </a:p>
+          <a:p>
+            <a:pPr marL="171450" indent="-171450">
+              <a:buFontTx/>
+              <a:buChar char="-"/>
+            </a:pPr>
+            <a:r>
+              <a:rPr lang="en-US" sz="1200" b="0" i="0" u="none" strike="noStrike" kern="1200" dirty="0">
+                <a:solidFill>
+                  <a:schemeClr val="tx1"/>
+                </a:solidFill>
+                <a:effectLst/>
+                <a:latin typeface="+mn-lt"/>
+                <a:ea typeface="+mn-ea"/>
+                <a:cs typeface="+mn-cs"/>
+              </a:rPr>
+              <a:t>Platform as a Service (PaaS)</a:t>
+            </a:r>
+          </a:p>
+          <a:p>
+            <a:pPr marL="171450" indent="-171450">
+              <a:buFontTx/>
+              <a:buChar char="-"/>
+            </a:pPr>
+            <a:r>
+              <a:rPr lang="en-US" sz="1200" b="0" i="0" u="none" strike="noStrike" kern="1200" dirty="0">
+                <a:solidFill>
+                  <a:schemeClr val="tx1"/>
+                </a:solidFill>
+                <a:effectLst/>
+                <a:latin typeface="+mn-lt"/>
+                <a:ea typeface="+mn-ea"/>
+                <a:cs typeface="+mn-cs"/>
+              </a:rPr>
+              <a:t>Serverless</a:t>
             </a:r>
           </a:p>
         </p:txBody>
@@ -6863,10 +6960,6 @@
               <a:defRPr/>
             </a:pPr>
             <a:r>
-              <a:rPr lang="en-CA" dirty="0"/>
-              <a:t>1. </a:t>
-            </a:r>
-            <a:r>
               <a:rPr lang="en-US" sz="1200" b="0" i="0" u="none" strike="noStrike" kern="1200" dirty="0">
                 <a:solidFill>
                   <a:schemeClr val="tx1"/>
@@ -6878,81 +6971,6 @@
               </a:rPr>
               <a:t>With serverless, infrastructure is abstracted. It’s not that there are no servers, just none you need to worry about.</a:t>
             </a:r>
-          </a:p>
-          <a:p>
-            <a:pPr marL="0" marR="0" lvl="0" indent="0" algn="l" defTabSz="914400" rtl="0" eaLnBrk="1" fontAlgn="auto" latinLnBrk="0" hangingPunct="1">
-              <a:lnSpc>
-                <a:spcPct val="100000"/>
-              </a:lnSpc>
-              <a:spcBef>
-                <a:spcPts val="0"/>
-              </a:spcBef>
-              <a:spcAft>
-                <a:spcPts val="0"/>
-              </a:spcAft>
-              <a:buClrTx/>
-              <a:buSzTx/>
-              <a:buFontTx/>
-              <a:buNone/>
-              <a:tabLst/>
-              <a:defRPr/>
-            </a:pPr>
-            <a:r>
-              <a:rPr lang="en-CA" dirty="0"/>
-              <a:t>2. </a:t>
-            </a:r>
-            <a:r>
-              <a:rPr lang="en-US" sz="1200" b="0" i="0" u="none" strike="noStrike" kern="1200" dirty="0">
-                <a:solidFill>
-                  <a:schemeClr val="tx1"/>
-                </a:solidFill>
-                <a:effectLst/>
-                <a:latin typeface="+mn-lt"/>
-                <a:ea typeface="+mn-ea"/>
-                <a:cs typeface="+mn-cs"/>
-              </a:rPr>
-              <a:t>Serverless further abstracts servers by focusing on event-driven code. This allows you to </a:t>
-            </a:r>
-            <a:r>
-              <a:rPr lang="en-CA" dirty="0"/>
-              <a:t>dynamically and elastically scale to meet demand. </a:t>
-            </a:r>
-          </a:p>
-          <a:p>
-            <a:pPr marL="0" marR="0" lvl="0" indent="0" algn="l" defTabSz="914400" rtl="0" eaLnBrk="1" fontAlgn="auto" latinLnBrk="0" hangingPunct="1">
-              <a:lnSpc>
-                <a:spcPct val="100000"/>
-              </a:lnSpc>
-              <a:spcBef>
-                <a:spcPts val="0"/>
-              </a:spcBef>
-              <a:spcAft>
-                <a:spcPts val="0"/>
-              </a:spcAft>
-              <a:buClrTx/>
-              <a:buSzTx/>
-              <a:buFontTx/>
-              <a:buNone/>
-              <a:tabLst/>
-              <a:defRPr/>
-            </a:pPr>
-            <a:r>
-              <a:rPr lang="en-CA" dirty="0"/>
-              <a:t>3. </a:t>
-            </a:r>
-            <a:r>
-              <a:rPr lang="en-US" sz="1200" b="0" i="0" u="none" strike="noStrike" kern="1200" dirty="0">
-                <a:solidFill>
-                  <a:schemeClr val="tx1"/>
-                </a:solidFill>
-                <a:effectLst/>
-                <a:latin typeface="+mn-lt"/>
-                <a:ea typeface="+mn-ea"/>
-                <a:cs typeface="+mn-cs"/>
-              </a:rPr>
-              <a:t>Serverless is micro-billing, there is no wasted resources and you’re only paying for what you use.</a:t>
-            </a:r>
-            <a:endParaRPr lang="en-CA" dirty="0"/>
           </a:p>
           <a:p>
             <a:pPr marL="0" marR="0" lvl="0" indent="0" algn="l" defTabSz="914400" rtl="0" eaLnBrk="1" fontAlgn="auto" latinLnBrk="0" hangingPunct="1">
@@ -6975,9 +6993,116 @@
             <a:endParaRPr lang="en-CA" dirty="0"/>
           </a:p>
           <a:p>
+            <a:pPr marL="0" marR="0" lvl="0" indent="0" algn="l" defTabSz="914400" rtl="0" eaLnBrk="1" fontAlgn="auto" latinLnBrk="0" hangingPunct="1">
+              <a:lnSpc>
+                <a:spcPct val="100000"/>
+              </a:lnSpc>
+              <a:spcBef>
+                <a:spcPts val="0"/>
+              </a:spcBef>
+              <a:spcAft>
+                <a:spcPts val="0"/>
+              </a:spcAft>
+              <a:buClrTx/>
+              <a:buSzTx/>
+              <a:buFontTx/>
+              <a:buNone/>
+              <a:tabLst/>
+              <a:defRPr/>
+            </a:pPr>
+            <a:r>
+              <a:rPr lang="en-US" sz="1200" b="0" i="0" u="none" strike="noStrike" kern="1200" dirty="0">
+                <a:solidFill>
+                  <a:schemeClr val="tx1"/>
+                </a:solidFill>
+                <a:effectLst/>
+                <a:latin typeface="+mn-lt"/>
+                <a:ea typeface="+mn-ea"/>
+                <a:cs typeface="+mn-cs"/>
+              </a:rPr>
+              <a:t>Serverless further abstracts servers by focusing on event-driven code. This allows you to </a:t>
+            </a:r>
             <a:r>
               <a:rPr lang="en-CA" dirty="0"/>
-              <a:t>Allows you as the developer get to focus on the fun stuff…your code and business logic. Everything else is taken cared for you.  This drastically increases time to market.</a:t>
+              <a:t>dynamically and elastically scale to meet demand. </a:t>
+            </a:r>
+          </a:p>
+          <a:p>
+            <a:pPr marL="0" marR="0" lvl="0" indent="0" algn="l" defTabSz="914400" rtl="0" eaLnBrk="1" fontAlgn="auto" latinLnBrk="0" hangingPunct="1">
+              <a:lnSpc>
+                <a:spcPct val="100000"/>
+              </a:lnSpc>
+              <a:spcBef>
+                <a:spcPts val="0"/>
+              </a:spcBef>
+              <a:spcAft>
+                <a:spcPts val="0"/>
+              </a:spcAft>
+              <a:buClrTx/>
+              <a:buSzTx/>
+              <a:buFontTx/>
+              <a:buNone/>
+              <a:tabLst/>
+              <a:defRPr/>
+            </a:pPr>
+            <a:endParaRPr lang="en-CA" dirty="0"/>
+          </a:p>
+          <a:p>
+            <a:pPr marL="0" marR="0" lvl="0" indent="0" algn="l" defTabSz="914400" rtl="0" eaLnBrk="1" fontAlgn="auto" latinLnBrk="0" hangingPunct="1">
+              <a:lnSpc>
+                <a:spcPct val="100000"/>
+              </a:lnSpc>
+              <a:spcBef>
+                <a:spcPts val="0"/>
+              </a:spcBef>
+              <a:spcAft>
+                <a:spcPts val="0"/>
+              </a:spcAft>
+              <a:buClrTx/>
+              <a:buSzTx/>
+              <a:buFontTx/>
+              <a:buNone/>
+              <a:tabLst/>
+              <a:defRPr/>
+            </a:pPr>
+            <a:r>
+              <a:rPr lang="en-US" sz="1200" b="0" i="0" u="none" strike="noStrike" kern="1200" dirty="0">
+                <a:solidFill>
+                  <a:schemeClr val="tx1"/>
+                </a:solidFill>
+                <a:effectLst/>
+                <a:latin typeface="+mn-lt"/>
+                <a:ea typeface="+mn-ea"/>
+                <a:cs typeface="+mn-cs"/>
+              </a:rPr>
+              <a:t>Serverless is micro-billing, there is no wasted resources and you’re only paying for what you use.</a:t>
+            </a:r>
+            <a:endParaRPr lang="en-CA" dirty="0"/>
+          </a:p>
+          <a:p>
+            <a:pPr marL="0" marR="0" lvl="0" indent="0" algn="l" defTabSz="914400" rtl="0" eaLnBrk="1" fontAlgn="auto" latinLnBrk="0" hangingPunct="1">
+              <a:lnSpc>
+                <a:spcPct val="100000"/>
+              </a:lnSpc>
+              <a:spcBef>
+                <a:spcPts val="0"/>
+              </a:spcBef>
+              <a:spcAft>
+                <a:spcPts val="0"/>
+              </a:spcAft>
+              <a:buClrTx/>
+              <a:buSzTx/>
+              <a:buFontTx/>
+              <a:buNone/>
+              <a:tabLst/>
+              <a:defRPr/>
+            </a:pPr>
+            <a:endParaRPr lang="en-CA" dirty="0"/>
+          </a:p>
+          <a:p>
+            <a:r>
+              <a:rPr lang="en-CA" dirty="0"/>
+              <a:t>Allows you as the developer get to focus on the fun stuff…your code and business logic. Everything else is taken cared for you, and it drastically increases time to market.</a:t>
             </a:r>
           </a:p>
           <a:p>
@@ -7120,7 +7245,7 @@
           <a:p>
             <a:r>
               <a:rPr lang="en-CA" dirty="0"/>
-              <a:t>Break it up into single responsibility.</a:t>
+              <a:t>Functions should be single purposed and single responsibility pattern.</a:t>
             </a:r>
           </a:p>
           <a:p>
@@ -7409,7 +7534,7 @@
                 <a:tabLst/>
                 <a:defRPr/>
               </a:pPr>
-              <a:t>4/27/2019 11:12 AM</a:t>
+              <a:t>4/27/2019 11:31 AM</a:t>
             </a:fld>
             <a:endParaRPr kumimoji="0" lang="en-US" sz="1200" b="0" i="0" u="none" strike="noStrike" kern="1200" cap="none" spc="0" normalizeH="0" baseline="0" noProof="0">
               <a:ln>

</xml_diff>